<commit_message>
발산정리 pic 2 upload
</commit_message>
<xml_diff>
--- a/pics/2020-08-23-divergence_theorem_3D/pics.pptx
+++ b/pics/2020-08-23-divergence_theorem_3D/pics.pptx
@@ -5,7 +5,8 @@
     <p:sldMasterId id="2147483648" r:id="rId1"/>
   </p:sldMasterIdLst>
   <p:sldIdLst>
-    <p:sldId id="256" r:id="rId2"/>
+    <p:sldId id="257" r:id="rId2"/>
+    <p:sldId id="256" r:id="rId3"/>
   </p:sldIdLst>
   <p:sldSz cx="9144000" cy="6858000" type="screen4x3"/>
   <p:notesSz cx="6858000" cy="9144000"/>
@@ -104,6 +105,22 @@
       </a:defRPr>
     </a:lvl9pPr>
   </p:defaultTextStyle>
+  <p:extLst>
+    <p:ext uri="{EFAFB233-063F-42B5-8137-9DF3F51BA10A}">
+      <p15:sldGuideLst xmlns:p15="http://schemas.microsoft.com/office/powerpoint/2012/main">
+        <p15:guide id="1" orient="horz" pos="2160">
+          <p15:clr>
+            <a:srgbClr val="A4A3A4"/>
+          </p15:clr>
+        </p15:guide>
+        <p15:guide id="2" pos="2880">
+          <p15:clr>
+            <a:srgbClr val="A4A3A4"/>
+          </p15:clr>
+        </p15:guide>
+      </p15:sldGuideLst>
+    </p:ext>
+  </p:extLst>
 </p:presentation>
 </file>
 
@@ -145,10 +162,9 @@
           <a:lstStyle/>
           <a:p>
             <a:r>
-              <a:rPr lang="ko-KR" altLang="en-US" smtClean="0"/>
+              <a:rPr lang="ko-KR" altLang="en-US"/>
               <a:t>마스터 제목 스타일 편집</a:t>
             </a:r>
-            <a:endParaRPr lang="ko-KR" altLang="en-US"/>
           </a:p>
         </p:txBody>
       </p:sp>
@@ -264,10 +280,9 @@
           </a:lstStyle>
           <a:p>
             <a:r>
-              <a:rPr lang="ko-KR" altLang="en-US" smtClean="0"/>
+              <a:rPr lang="ko-KR" altLang="en-US"/>
               <a:t>마스터 부제목 스타일 편집</a:t>
             </a:r>
-            <a:endParaRPr lang="ko-KR" altLang="en-US"/>
           </a:p>
         </p:txBody>
       </p:sp>
@@ -288,7 +303,7 @@
           <a:p>
             <a:fld id="{FB30EDBD-1C2D-4C1E-B459-B60219FAB484}" type="datetimeFigureOut">
               <a:rPr lang="ko-KR" altLang="en-US" smtClean="0"/>
-              <a:t>2020-08-31</a:t>
+              <a:t>2020-09-01</a:t>
             </a:fld>
             <a:endParaRPr lang="ko-KR" altLang="en-US"/>
           </a:p>
@@ -377,10 +392,9 @@
           <a:lstStyle/>
           <a:p>
             <a:r>
-              <a:rPr lang="ko-KR" altLang="en-US" smtClean="0"/>
+              <a:rPr lang="ko-KR" altLang="en-US"/>
               <a:t>마스터 제목 스타일 편집</a:t>
             </a:r>
-            <a:endParaRPr lang="ko-KR" altLang="en-US"/>
           </a:p>
         </p:txBody>
       </p:sp>
@@ -401,38 +415,37 @@
           <a:p>
             <a:pPr lvl="0"/>
             <a:r>
-              <a:rPr lang="ko-KR" altLang="en-US" smtClean="0"/>
+              <a:rPr lang="ko-KR" altLang="en-US"/>
               <a:t>마스터 텍스트 스타일을 편집합니다</a:t>
             </a:r>
           </a:p>
           <a:p>
             <a:pPr lvl="1"/>
             <a:r>
-              <a:rPr lang="ko-KR" altLang="en-US" smtClean="0"/>
+              <a:rPr lang="ko-KR" altLang="en-US"/>
               <a:t>둘째 수준</a:t>
             </a:r>
           </a:p>
           <a:p>
             <a:pPr lvl="2"/>
             <a:r>
-              <a:rPr lang="ko-KR" altLang="en-US" smtClean="0"/>
+              <a:rPr lang="ko-KR" altLang="en-US"/>
               <a:t>셋째 수준</a:t>
             </a:r>
           </a:p>
           <a:p>
             <a:pPr lvl="3"/>
             <a:r>
-              <a:rPr lang="ko-KR" altLang="en-US" smtClean="0"/>
+              <a:rPr lang="ko-KR" altLang="en-US"/>
               <a:t>넷째 수준</a:t>
             </a:r>
           </a:p>
           <a:p>
             <a:pPr lvl="4"/>
             <a:r>
-              <a:rPr lang="ko-KR" altLang="en-US" smtClean="0"/>
+              <a:rPr lang="ko-KR" altLang="en-US"/>
               <a:t>다섯째 수준</a:t>
             </a:r>
-            <a:endParaRPr lang="ko-KR" altLang="en-US"/>
           </a:p>
         </p:txBody>
       </p:sp>
@@ -453,7 +466,7 @@
           <a:p>
             <a:fld id="{FB30EDBD-1C2D-4C1E-B459-B60219FAB484}" type="datetimeFigureOut">
               <a:rPr lang="ko-KR" altLang="en-US" smtClean="0"/>
-              <a:t>2020-08-31</a:t>
+              <a:t>2020-09-01</a:t>
             </a:fld>
             <a:endParaRPr lang="ko-KR" altLang="en-US"/>
           </a:p>
@@ -547,10 +560,9 @@
           <a:lstStyle/>
           <a:p>
             <a:r>
-              <a:rPr lang="ko-KR" altLang="en-US" smtClean="0"/>
+              <a:rPr lang="ko-KR" altLang="en-US"/>
               <a:t>마스터 제목 스타일 편집</a:t>
             </a:r>
-            <a:endParaRPr lang="ko-KR" altLang="en-US"/>
           </a:p>
         </p:txBody>
       </p:sp>
@@ -576,38 +588,37 @@
           <a:p>
             <a:pPr lvl="0"/>
             <a:r>
-              <a:rPr lang="ko-KR" altLang="en-US" smtClean="0"/>
+              <a:rPr lang="ko-KR" altLang="en-US"/>
               <a:t>마스터 텍스트 스타일을 편집합니다</a:t>
             </a:r>
           </a:p>
           <a:p>
             <a:pPr lvl="1"/>
             <a:r>
-              <a:rPr lang="ko-KR" altLang="en-US" smtClean="0"/>
+              <a:rPr lang="ko-KR" altLang="en-US"/>
               <a:t>둘째 수준</a:t>
             </a:r>
           </a:p>
           <a:p>
             <a:pPr lvl="2"/>
             <a:r>
-              <a:rPr lang="ko-KR" altLang="en-US" smtClean="0"/>
+              <a:rPr lang="ko-KR" altLang="en-US"/>
               <a:t>셋째 수준</a:t>
             </a:r>
           </a:p>
           <a:p>
             <a:pPr lvl="3"/>
             <a:r>
-              <a:rPr lang="ko-KR" altLang="en-US" smtClean="0"/>
+              <a:rPr lang="ko-KR" altLang="en-US"/>
               <a:t>넷째 수준</a:t>
             </a:r>
           </a:p>
           <a:p>
             <a:pPr lvl="4"/>
             <a:r>
-              <a:rPr lang="ko-KR" altLang="en-US" smtClean="0"/>
+              <a:rPr lang="ko-KR" altLang="en-US"/>
               <a:t>다섯째 수준</a:t>
             </a:r>
-            <a:endParaRPr lang="ko-KR" altLang="en-US"/>
           </a:p>
         </p:txBody>
       </p:sp>
@@ -628,7 +639,7 @@
           <a:p>
             <a:fld id="{FB30EDBD-1C2D-4C1E-B459-B60219FAB484}" type="datetimeFigureOut">
               <a:rPr lang="ko-KR" altLang="en-US" smtClean="0"/>
-              <a:t>2020-08-31</a:t>
+              <a:t>2020-09-01</a:t>
             </a:fld>
             <a:endParaRPr lang="ko-KR" altLang="en-US"/>
           </a:p>
@@ -717,10 +728,9 @@
           <a:lstStyle/>
           <a:p>
             <a:r>
-              <a:rPr lang="ko-KR" altLang="en-US" smtClean="0"/>
+              <a:rPr lang="ko-KR" altLang="en-US"/>
               <a:t>마스터 제목 스타일 편집</a:t>
             </a:r>
-            <a:endParaRPr lang="ko-KR" altLang="en-US"/>
           </a:p>
         </p:txBody>
       </p:sp>
@@ -741,38 +751,37 @@
           <a:p>
             <a:pPr lvl="0"/>
             <a:r>
-              <a:rPr lang="ko-KR" altLang="en-US" smtClean="0"/>
+              <a:rPr lang="ko-KR" altLang="en-US"/>
               <a:t>마스터 텍스트 스타일을 편집합니다</a:t>
             </a:r>
           </a:p>
           <a:p>
             <a:pPr lvl="1"/>
             <a:r>
-              <a:rPr lang="ko-KR" altLang="en-US" smtClean="0"/>
+              <a:rPr lang="ko-KR" altLang="en-US"/>
               <a:t>둘째 수준</a:t>
             </a:r>
           </a:p>
           <a:p>
             <a:pPr lvl="2"/>
             <a:r>
-              <a:rPr lang="ko-KR" altLang="en-US" smtClean="0"/>
+              <a:rPr lang="ko-KR" altLang="en-US"/>
               <a:t>셋째 수준</a:t>
             </a:r>
           </a:p>
           <a:p>
             <a:pPr lvl="3"/>
             <a:r>
-              <a:rPr lang="ko-KR" altLang="en-US" smtClean="0"/>
+              <a:rPr lang="ko-KR" altLang="en-US"/>
               <a:t>넷째 수준</a:t>
             </a:r>
           </a:p>
           <a:p>
             <a:pPr lvl="4"/>
             <a:r>
-              <a:rPr lang="ko-KR" altLang="en-US" smtClean="0"/>
+              <a:rPr lang="ko-KR" altLang="en-US"/>
               <a:t>다섯째 수준</a:t>
             </a:r>
-            <a:endParaRPr lang="ko-KR" altLang="en-US"/>
           </a:p>
         </p:txBody>
       </p:sp>
@@ -793,7 +802,7 @@
           <a:p>
             <a:fld id="{FB30EDBD-1C2D-4C1E-B459-B60219FAB484}" type="datetimeFigureOut">
               <a:rPr lang="ko-KR" altLang="en-US" smtClean="0"/>
-              <a:t>2020-08-31</a:t>
+              <a:t>2020-09-01</a:t>
             </a:fld>
             <a:endParaRPr lang="ko-KR" altLang="en-US"/>
           </a:p>
@@ -891,10 +900,9 @@
           </a:lstStyle>
           <a:p>
             <a:r>
-              <a:rPr lang="ko-KR" altLang="en-US" smtClean="0"/>
+              <a:rPr lang="ko-KR" altLang="en-US"/>
               <a:t>마스터 제목 스타일 편집</a:t>
             </a:r>
-            <a:endParaRPr lang="ko-KR" altLang="en-US"/>
           </a:p>
         </p:txBody>
       </p:sp>
@@ -1011,7 +1019,7 @@
           <a:p>
             <a:pPr lvl="0"/>
             <a:r>
-              <a:rPr lang="ko-KR" altLang="en-US" smtClean="0"/>
+              <a:rPr lang="ko-KR" altLang="en-US"/>
               <a:t>마스터 텍스트 스타일을 편집합니다</a:t>
             </a:r>
           </a:p>
@@ -1034,7 +1042,7 @@
           <a:p>
             <a:fld id="{FB30EDBD-1C2D-4C1E-B459-B60219FAB484}" type="datetimeFigureOut">
               <a:rPr lang="ko-KR" altLang="en-US" smtClean="0"/>
-              <a:t>2020-08-31</a:t>
+              <a:t>2020-09-01</a:t>
             </a:fld>
             <a:endParaRPr lang="ko-KR" altLang="en-US"/>
           </a:p>
@@ -1123,10 +1131,9 @@
           <a:lstStyle/>
           <a:p>
             <a:r>
-              <a:rPr lang="ko-KR" altLang="en-US" smtClean="0"/>
+              <a:rPr lang="ko-KR" altLang="en-US"/>
               <a:t>마스터 제목 스타일 편집</a:t>
             </a:r>
-            <a:endParaRPr lang="ko-KR" altLang="en-US"/>
           </a:p>
         </p:txBody>
       </p:sp>
@@ -1180,38 +1187,37 @@
           <a:p>
             <a:pPr lvl="0"/>
             <a:r>
-              <a:rPr lang="ko-KR" altLang="en-US" smtClean="0"/>
+              <a:rPr lang="ko-KR" altLang="en-US"/>
               <a:t>마스터 텍스트 스타일을 편집합니다</a:t>
             </a:r>
           </a:p>
           <a:p>
             <a:pPr lvl="1"/>
             <a:r>
-              <a:rPr lang="ko-KR" altLang="en-US" smtClean="0"/>
+              <a:rPr lang="ko-KR" altLang="en-US"/>
               <a:t>둘째 수준</a:t>
             </a:r>
           </a:p>
           <a:p>
             <a:pPr lvl="2"/>
             <a:r>
-              <a:rPr lang="ko-KR" altLang="en-US" smtClean="0"/>
+              <a:rPr lang="ko-KR" altLang="en-US"/>
               <a:t>셋째 수준</a:t>
             </a:r>
           </a:p>
           <a:p>
             <a:pPr lvl="3"/>
             <a:r>
-              <a:rPr lang="ko-KR" altLang="en-US" smtClean="0"/>
+              <a:rPr lang="ko-KR" altLang="en-US"/>
               <a:t>넷째 수준</a:t>
             </a:r>
           </a:p>
           <a:p>
             <a:pPr lvl="4"/>
             <a:r>
-              <a:rPr lang="ko-KR" altLang="en-US" smtClean="0"/>
+              <a:rPr lang="ko-KR" altLang="en-US"/>
               <a:t>다섯째 수준</a:t>
             </a:r>
-            <a:endParaRPr lang="ko-KR" altLang="en-US"/>
           </a:p>
         </p:txBody>
       </p:sp>
@@ -1265,38 +1271,37 @@
           <a:p>
             <a:pPr lvl="0"/>
             <a:r>
-              <a:rPr lang="ko-KR" altLang="en-US" smtClean="0"/>
+              <a:rPr lang="ko-KR" altLang="en-US"/>
               <a:t>마스터 텍스트 스타일을 편집합니다</a:t>
             </a:r>
           </a:p>
           <a:p>
             <a:pPr lvl="1"/>
             <a:r>
-              <a:rPr lang="ko-KR" altLang="en-US" smtClean="0"/>
+              <a:rPr lang="ko-KR" altLang="en-US"/>
               <a:t>둘째 수준</a:t>
             </a:r>
           </a:p>
           <a:p>
             <a:pPr lvl="2"/>
             <a:r>
-              <a:rPr lang="ko-KR" altLang="en-US" smtClean="0"/>
+              <a:rPr lang="ko-KR" altLang="en-US"/>
               <a:t>셋째 수준</a:t>
             </a:r>
           </a:p>
           <a:p>
             <a:pPr lvl="3"/>
             <a:r>
-              <a:rPr lang="ko-KR" altLang="en-US" smtClean="0"/>
+              <a:rPr lang="ko-KR" altLang="en-US"/>
               <a:t>넷째 수준</a:t>
             </a:r>
           </a:p>
           <a:p>
             <a:pPr lvl="4"/>
             <a:r>
-              <a:rPr lang="ko-KR" altLang="en-US" smtClean="0"/>
+              <a:rPr lang="ko-KR" altLang="en-US"/>
               <a:t>다섯째 수준</a:t>
             </a:r>
-            <a:endParaRPr lang="ko-KR" altLang="en-US"/>
           </a:p>
         </p:txBody>
       </p:sp>
@@ -1317,7 +1322,7 @@
           <a:p>
             <a:fld id="{FB30EDBD-1C2D-4C1E-B459-B60219FAB484}" type="datetimeFigureOut">
               <a:rPr lang="ko-KR" altLang="en-US" smtClean="0"/>
-              <a:t>2020-08-31</a:t>
+              <a:t>2020-09-01</a:t>
             </a:fld>
             <a:endParaRPr lang="ko-KR" altLang="en-US"/>
           </a:p>
@@ -1410,10 +1415,9 @@
           </a:lstStyle>
           <a:p>
             <a:r>
-              <a:rPr lang="ko-KR" altLang="en-US" smtClean="0"/>
+              <a:rPr lang="ko-KR" altLang="en-US"/>
               <a:t>마스터 제목 스타일 편집</a:t>
             </a:r>
-            <a:endParaRPr lang="ko-KR" altLang="en-US"/>
           </a:p>
         </p:txBody>
       </p:sp>
@@ -1476,7 +1480,7 @@
           <a:p>
             <a:pPr lvl="0"/>
             <a:r>
-              <a:rPr lang="ko-KR" altLang="en-US" smtClean="0"/>
+              <a:rPr lang="ko-KR" altLang="en-US"/>
               <a:t>마스터 텍스트 스타일을 편집합니다</a:t>
             </a:r>
           </a:p>
@@ -1532,38 +1536,37 @@
           <a:p>
             <a:pPr lvl="0"/>
             <a:r>
-              <a:rPr lang="ko-KR" altLang="en-US" smtClean="0"/>
+              <a:rPr lang="ko-KR" altLang="en-US"/>
               <a:t>마스터 텍스트 스타일을 편집합니다</a:t>
             </a:r>
           </a:p>
           <a:p>
             <a:pPr lvl="1"/>
             <a:r>
-              <a:rPr lang="ko-KR" altLang="en-US" smtClean="0"/>
+              <a:rPr lang="ko-KR" altLang="en-US"/>
               <a:t>둘째 수준</a:t>
             </a:r>
           </a:p>
           <a:p>
             <a:pPr lvl="2"/>
             <a:r>
-              <a:rPr lang="ko-KR" altLang="en-US" smtClean="0"/>
+              <a:rPr lang="ko-KR" altLang="en-US"/>
               <a:t>셋째 수준</a:t>
             </a:r>
           </a:p>
           <a:p>
             <a:pPr lvl="3"/>
             <a:r>
-              <a:rPr lang="ko-KR" altLang="en-US" smtClean="0"/>
+              <a:rPr lang="ko-KR" altLang="en-US"/>
               <a:t>넷째 수준</a:t>
             </a:r>
           </a:p>
           <a:p>
             <a:pPr lvl="4"/>
             <a:r>
-              <a:rPr lang="ko-KR" altLang="en-US" smtClean="0"/>
+              <a:rPr lang="ko-KR" altLang="en-US"/>
               <a:t>다섯째 수준</a:t>
             </a:r>
-            <a:endParaRPr lang="ko-KR" altLang="en-US"/>
           </a:p>
         </p:txBody>
       </p:sp>
@@ -1626,7 +1629,7 @@
           <a:p>
             <a:pPr lvl="0"/>
             <a:r>
-              <a:rPr lang="ko-KR" altLang="en-US" smtClean="0"/>
+              <a:rPr lang="ko-KR" altLang="en-US"/>
               <a:t>마스터 텍스트 스타일을 편집합니다</a:t>
             </a:r>
           </a:p>
@@ -1682,38 +1685,37 @@
           <a:p>
             <a:pPr lvl="0"/>
             <a:r>
-              <a:rPr lang="ko-KR" altLang="en-US" smtClean="0"/>
+              <a:rPr lang="ko-KR" altLang="en-US"/>
               <a:t>마스터 텍스트 스타일을 편집합니다</a:t>
             </a:r>
           </a:p>
           <a:p>
             <a:pPr lvl="1"/>
             <a:r>
-              <a:rPr lang="ko-KR" altLang="en-US" smtClean="0"/>
+              <a:rPr lang="ko-KR" altLang="en-US"/>
               <a:t>둘째 수준</a:t>
             </a:r>
           </a:p>
           <a:p>
             <a:pPr lvl="2"/>
             <a:r>
-              <a:rPr lang="ko-KR" altLang="en-US" smtClean="0"/>
+              <a:rPr lang="ko-KR" altLang="en-US"/>
               <a:t>셋째 수준</a:t>
             </a:r>
           </a:p>
           <a:p>
             <a:pPr lvl="3"/>
             <a:r>
-              <a:rPr lang="ko-KR" altLang="en-US" smtClean="0"/>
+              <a:rPr lang="ko-KR" altLang="en-US"/>
               <a:t>넷째 수준</a:t>
             </a:r>
           </a:p>
           <a:p>
             <a:pPr lvl="4"/>
             <a:r>
-              <a:rPr lang="ko-KR" altLang="en-US" smtClean="0"/>
+              <a:rPr lang="ko-KR" altLang="en-US"/>
               <a:t>다섯째 수준</a:t>
             </a:r>
-            <a:endParaRPr lang="ko-KR" altLang="en-US"/>
           </a:p>
         </p:txBody>
       </p:sp>
@@ -1734,7 +1736,7 @@
           <a:p>
             <a:fld id="{FB30EDBD-1C2D-4C1E-B459-B60219FAB484}" type="datetimeFigureOut">
               <a:rPr lang="ko-KR" altLang="en-US" smtClean="0"/>
-              <a:t>2020-08-31</a:t>
+              <a:t>2020-09-01</a:t>
             </a:fld>
             <a:endParaRPr lang="ko-KR" altLang="en-US"/>
           </a:p>
@@ -1823,10 +1825,9 @@
           <a:lstStyle/>
           <a:p>
             <a:r>
-              <a:rPr lang="ko-KR" altLang="en-US" smtClean="0"/>
+              <a:rPr lang="ko-KR" altLang="en-US"/>
               <a:t>마스터 제목 스타일 편집</a:t>
             </a:r>
-            <a:endParaRPr lang="ko-KR" altLang="en-US"/>
           </a:p>
         </p:txBody>
       </p:sp>
@@ -1847,7 +1848,7 @@
           <a:p>
             <a:fld id="{FB30EDBD-1C2D-4C1E-B459-B60219FAB484}" type="datetimeFigureOut">
               <a:rPr lang="ko-KR" altLang="en-US" smtClean="0"/>
-              <a:t>2020-08-31</a:t>
+              <a:t>2020-09-01</a:t>
             </a:fld>
             <a:endParaRPr lang="ko-KR" altLang="en-US"/>
           </a:p>
@@ -1937,7 +1938,7 @@
           <a:p>
             <a:fld id="{FB30EDBD-1C2D-4C1E-B459-B60219FAB484}" type="datetimeFigureOut">
               <a:rPr lang="ko-KR" altLang="en-US" smtClean="0"/>
-              <a:t>2020-08-31</a:t>
+              <a:t>2020-09-01</a:t>
             </a:fld>
             <a:endParaRPr lang="ko-KR" altLang="en-US"/>
           </a:p>
@@ -2035,10 +2036,9 @@
           </a:lstStyle>
           <a:p>
             <a:r>
-              <a:rPr lang="ko-KR" altLang="en-US" smtClean="0"/>
+              <a:rPr lang="ko-KR" altLang="en-US"/>
               <a:t>마스터 제목 스타일 편집</a:t>
             </a:r>
-            <a:endParaRPr lang="ko-KR" altLang="en-US"/>
           </a:p>
         </p:txBody>
       </p:sp>
@@ -2092,38 +2092,37 @@
           <a:p>
             <a:pPr lvl="0"/>
             <a:r>
-              <a:rPr lang="ko-KR" altLang="en-US" smtClean="0"/>
+              <a:rPr lang="ko-KR" altLang="en-US"/>
               <a:t>마스터 텍스트 스타일을 편집합니다</a:t>
             </a:r>
           </a:p>
           <a:p>
             <a:pPr lvl="1"/>
             <a:r>
-              <a:rPr lang="ko-KR" altLang="en-US" smtClean="0"/>
+              <a:rPr lang="ko-KR" altLang="en-US"/>
               <a:t>둘째 수준</a:t>
             </a:r>
           </a:p>
           <a:p>
             <a:pPr lvl="2"/>
             <a:r>
-              <a:rPr lang="ko-KR" altLang="en-US" smtClean="0"/>
+              <a:rPr lang="ko-KR" altLang="en-US"/>
               <a:t>셋째 수준</a:t>
             </a:r>
           </a:p>
           <a:p>
             <a:pPr lvl="3"/>
             <a:r>
-              <a:rPr lang="ko-KR" altLang="en-US" smtClean="0"/>
+              <a:rPr lang="ko-KR" altLang="en-US"/>
               <a:t>넷째 수준</a:t>
             </a:r>
           </a:p>
           <a:p>
             <a:pPr lvl="4"/>
             <a:r>
-              <a:rPr lang="ko-KR" altLang="en-US" smtClean="0"/>
+              <a:rPr lang="ko-KR" altLang="en-US"/>
               <a:t>다섯째 수준</a:t>
             </a:r>
-            <a:endParaRPr lang="ko-KR" altLang="en-US"/>
           </a:p>
         </p:txBody>
       </p:sp>
@@ -2186,7 +2185,7 @@
           <a:p>
             <a:pPr lvl="0"/>
             <a:r>
-              <a:rPr lang="ko-KR" altLang="en-US" smtClean="0"/>
+              <a:rPr lang="ko-KR" altLang="en-US"/>
               <a:t>마스터 텍스트 스타일을 편집합니다</a:t>
             </a:r>
           </a:p>
@@ -2209,7 +2208,7 @@
           <a:p>
             <a:fld id="{FB30EDBD-1C2D-4C1E-B459-B60219FAB484}" type="datetimeFigureOut">
               <a:rPr lang="ko-KR" altLang="en-US" smtClean="0"/>
-              <a:t>2020-08-31</a:t>
+              <a:t>2020-09-01</a:t>
             </a:fld>
             <a:endParaRPr lang="ko-KR" altLang="en-US"/>
           </a:p>
@@ -2307,10 +2306,9 @@
           </a:lstStyle>
           <a:p>
             <a:r>
-              <a:rPr lang="ko-KR" altLang="en-US" smtClean="0"/>
+              <a:rPr lang="ko-KR" altLang="en-US"/>
               <a:t>마스터 제목 스타일 편집</a:t>
             </a:r>
-            <a:endParaRPr lang="ko-KR" altLang="en-US"/>
           </a:p>
         </p:txBody>
       </p:sp>
@@ -2434,7 +2432,7 @@
           <a:p>
             <a:pPr lvl="0"/>
             <a:r>
-              <a:rPr lang="ko-KR" altLang="en-US" smtClean="0"/>
+              <a:rPr lang="ko-KR" altLang="en-US"/>
               <a:t>마스터 텍스트 스타일을 편집합니다</a:t>
             </a:r>
           </a:p>
@@ -2457,7 +2455,7 @@
           <a:p>
             <a:fld id="{FB30EDBD-1C2D-4C1E-B459-B60219FAB484}" type="datetimeFigureOut">
               <a:rPr lang="ko-KR" altLang="en-US" smtClean="0"/>
-              <a:t>2020-08-31</a:t>
+              <a:t>2020-09-01</a:t>
             </a:fld>
             <a:endParaRPr lang="ko-KR" altLang="en-US"/>
           </a:p>
@@ -2561,10 +2559,9 @@
           <a:lstStyle/>
           <a:p>
             <a:r>
-              <a:rPr lang="ko-KR" altLang="en-US" smtClean="0"/>
+              <a:rPr lang="ko-KR" altLang="en-US"/>
               <a:t>마스터 제목 스타일 편집</a:t>
             </a:r>
-            <a:endParaRPr lang="ko-KR" altLang="en-US"/>
           </a:p>
         </p:txBody>
       </p:sp>
@@ -2595,38 +2592,37 @@
           <a:p>
             <a:pPr lvl="0"/>
             <a:r>
-              <a:rPr lang="ko-KR" altLang="en-US" smtClean="0"/>
+              <a:rPr lang="ko-KR" altLang="en-US"/>
               <a:t>마스터 텍스트 스타일을 편집합니다</a:t>
             </a:r>
           </a:p>
           <a:p>
             <a:pPr lvl="1"/>
             <a:r>
-              <a:rPr lang="ko-KR" altLang="en-US" smtClean="0"/>
+              <a:rPr lang="ko-KR" altLang="en-US"/>
               <a:t>둘째 수준</a:t>
             </a:r>
           </a:p>
           <a:p>
             <a:pPr lvl="2"/>
             <a:r>
-              <a:rPr lang="ko-KR" altLang="en-US" smtClean="0"/>
+              <a:rPr lang="ko-KR" altLang="en-US"/>
               <a:t>셋째 수준</a:t>
             </a:r>
           </a:p>
           <a:p>
             <a:pPr lvl="3"/>
             <a:r>
-              <a:rPr lang="ko-KR" altLang="en-US" smtClean="0"/>
+              <a:rPr lang="ko-KR" altLang="en-US"/>
               <a:t>넷째 수준</a:t>
             </a:r>
           </a:p>
           <a:p>
             <a:pPr lvl="4"/>
             <a:r>
-              <a:rPr lang="ko-KR" altLang="en-US" smtClean="0"/>
+              <a:rPr lang="ko-KR" altLang="en-US"/>
               <a:t>다섯째 수준</a:t>
             </a:r>
-            <a:endParaRPr lang="ko-KR" altLang="en-US"/>
           </a:p>
         </p:txBody>
       </p:sp>
@@ -2665,7 +2661,7 @@
           <a:p>
             <a:fld id="{FB30EDBD-1C2D-4C1E-B459-B60219FAB484}" type="datetimeFigureOut">
               <a:rPr lang="ko-KR" altLang="en-US" smtClean="0"/>
-              <a:t>2020-08-31</a:t>
+              <a:t>2020-09-01</a:t>
             </a:fld>
             <a:endParaRPr lang="ko-KR" altLang="en-US"/>
           </a:p>
@@ -3035,6 +3031,2049 @@
           <a:chExt cx="0" cy="0"/>
         </a:xfrm>
       </p:grpSpPr>
+      <p:grpSp>
+        <p:nvGrpSpPr>
+          <p:cNvPr id="10" name="그룹 9">
+            <a:extLst>
+              <a:ext uri="{FF2B5EF4-FFF2-40B4-BE49-F238E27FC236}">
+                <a16:creationId xmlns:a16="http://schemas.microsoft.com/office/drawing/2014/main" id="{2CF0DD8C-F195-4200-BAE8-18405280BC9B}"/>
+              </a:ext>
+            </a:extLst>
+          </p:cNvPr>
+          <p:cNvGrpSpPr/>
+          <p:nvPr/>
+        </p:nvGrpSpPr>
+        <p:grpSpPr>
+          <a:xfrm>
+            <a:off x="471858" y="2185617"/>
+            <a:ext cx="8200284" cy="2486766"/>
+            <a:chOff x="755576" y="658527"/>
+            <a:chExt cx="8200284" cy="2486766"/>
+          </a:xfrm>
+        </p:grpSpPr>
+        <p:grpSp>
+          <p:nvGrpSpPr>
+            <p:cNvPr id="3" name="그룹 2">
+              <a:extLst>
+                <a:ext uri="{FF2B5EF4-FFF2-40B4-BE49-F238E27FC236}">
+                  <a16:creationId xmlns:a16="http://schemas.microsoft.com/office/drawing/2014/main" id="{00F04A40-C8C6-457F-B502-30AFC3435853}"/>
+                </a:ext>
+              </a:extLst>
+            </p:cNvPr>
+            <p:cNvGrpSpPr/>
+            <p:nvPr/>
+          </p:nvGrpSpPr>
+          <p:grpSpPr>
+            <a:xfrm>
+              <a:off x="755576" y="692696"/>
+              <a:ext cx="2708344" cy="2452597"/>
+              <a:chOff x="755576" y="692696"/>
+              <a:chExt cx="2708344" cy="2452597"/>
+            </a:xfrm>
+          </p:grpSpPr>
+          <p:sp>
+            <p:nvSpPr>
+              <p:cNvPr id="4" name="정육면체 3">
+                <a:extLst>
+                  <a:ext uri="{FF2B5EF4-FFF2-40B4-BE49-F238E27FC236}">
+                    <a16:creationId xmlns:a16="http://schemas.microsoft.com/office/drawing/2014/main" id="{79EABEC7-BBB9-4AF2-91EE-CDB9EFEB8A0C}"/>
+                  </a:ext>
+                </a:extLst>
+              </p:cNvPr>
+              <p:cNvSpPr/>
+              <p:nvPr/>
+            </p:nvSpPr>
+            <p:spPr>
+              <a:xfrm>
+                <a:off x="1353299" y="1461541"/>
+                <a:ext cx="1216152" cy="1216152"/>
+              </a:xfrm>
+              <a:prstGeom prst="cube">
+                <a:avLst/>
+              </a:prstGeom>
+              <a:noFill/>
+            </p:spPr>
+            <p:style>
+              <a:lnRef idx="2">
+                <a:schemeClr val="accent1">
+                  <a:shade val="50000"/>
+                </a:schemeClr>
+              </a:lnRef>
+              <a:fillRef idx="1">
+                <a:schemeClr val="accent1"/>
+              </a:fillRef>
+              <a:effectRef idx="0">
+                <a:schemeClr val="accent1"/>
+              </a:effectRef>
+              <a:fontRef idx="minor">
+                <a:schemeClr val="lt1"/>
+              </a:fontRef>
+            </p:style>
+            <p:txBody>
+              <a:bodyPr rtlCol="0" anchor="ctr"/>
+              <a:lstStyle/>
+              <a:p>
+                <a:pPr algn="ctr"/>
+                <a:endParaRPr lang="ko-KR" altLang="en-US" b="1"/>
+              </a:p>
+            </p:txBody>
+          </p:sp>
+          <p:cxnSp>
+            <p:nvCxnSpPr>
+              <p:cNvPr id="6" name="직선 화살표 연결선 5">
+                <a:extLst>
+                  <a:ext uri="{FF2B5EF4-FFF2-40B4-BE49-F238E27FC236}">
+                    <a16:creationId xmlns:a16="http://schemas.microsoft.com/office/drawing/2014/main" id="{97B66BE3-E845-41B7-8B0A-B78215A9A6C5}"/>
+                  </a:ext>
+                </a:extLst>
+              </p:cNvPr>
+              <p:cNvCxnSpPr>
+                <a:cxnSpLocks/>
+              </p:cNvCxnSpPr>
+              <p:nvPr/>
+            </p:nvCxnSpPr>
+            <p:spPr>
+              <a:xfrm>
+                <a:off x="1662999" y="2377325"/>
+                <a:ext cx="1490500" cy="0"/>
+              </a:xfrm>
+              <a:prstGeom prst="straightConnector1">
+                <a:avLst/>
+              </a:prstGeom>
+              <a:ln w="19050">
+                <a:solidFill>
+                  <a:schemeClr val="tx1"/>
+                </a:solidFill>
+                <a:tailEnd type="triangle"/>
+              </a:ln>
+            </p:spPr>
+            <p:style>
+              <a:lnRef idx="1">
+                <a:schemeClr val="accent1"/>
+              </a:lnRef>
+              <a:fillRef idx="0">
+                <a:schemeClr val="accent1"/>
+              </a:fillRef>
+              <a:effectRef idx="0">
+                <a:schemeClr val="accent1"/>
+              </a:effectRef>
+              <a:fontRef idx="minor">
+                <a:schemeClr val="tx1"/>
+              </a:fontRef>
+            </p:style>
+          </p:cxnSp>
+          <p:cxnSp>
+            <p:nvCxnSpPr>
+              <p:cNvPr id="7" name="직선 화살표 연결선 6">
+                <a:extLst>
+                  <a:ext uri="{FF2B5EF4-FFF2-40B4-BE49-F238E27FC236}">
+                    <a16:creationId xmlns:a16="http://schemas.microsoft.com/office/drawing/2014/main" id="{B7982D56-2BD5-4F46-B4F4-934A9DEF7E5E}"/>
+                  </a:ext>
+                </a:extLst>
+              </p:cNvPr>
+              <p:cNvCxnSpPr>
+                <a:cxnSpLocks/>
+              </p:cNvCxnSpPr>
+              <p:nvPr/>
+            </p:nvCxnSpPr>
+            <p:spPr>
+              <a:xfrm flipV="1">
+                <a:off x="1666731" y="692696"/>
+                <a:ext cx="0" cy="1684629"/>
+              </a:xfrm>
+              <a:prstGeom prst="straightConnector1">
+                <a:avLst/>
+              </a:prstGeom>
+              <a:ln w="19050">
+                <a:solidFill>
+                  <a:schemeClr val="tx1"/>
+                </a:solidFill>
+                <a:tailEnd type="triangle"/>
+              </a:ln>
+            </p:spPr>
+            <p:style>
+              <a:lnRef idx="1">
+                <a:schemeClr val="accent1"/>
+              </a:lnRef>
+              <a:fillRef idx="0">
+                <a:schemeClr val="accent1"/>
+              </a:fillRef>
+              <a:effectRef idx="0">
+                <a:schemeClr val="accent1"/>
+              </a:effectRef>
+              <a:fontRef idx="minor">
+                <a:schemeClr val="tx1"/>
+              </a:fontRef>
+            </p:style>
+          </p:cxnSp>
+          <p:cxnSp>
+            <p:nvCxnSpPr>
+              <p:cNvPr id="9" name="직선 화살표 연결선 8">
+                <a:extLst>
+                  <a:ext uri="{FF2B5EF4-FFF2-40B4-BE49-F238E27FC236}">
+                    <a16:creationId xmlns:a16="http://schemas.microsoft.com/office/drawing/2014/main" id="{28E9CB2E-D9C8-4F6A-A8AA-DC9CA5007914}"/>
+                  </a:ext>
+                </a:extLst>
+              </p:cNvPr>
+              <p:cNvCxnSpPr>
+                <a:cxnSpLocks/>
+              </p:cNvCxnSpPr>
+              <p:nvPr/>
+            </p:nvCxnSpPr>
+            <p:spPr>
+              <a:xfrm flipH="1">
+                <a:off x="904340" y="2377325"/>
+                <a:ext cx="758661" cy="767968"/>
+              </a:xfrm>
+              <a:prstGeom prst="straightConnector1">
+                <a:avLst/>
+              </a:prstGeom>
+              <a:ln w="19050">
+                <a:solidFill>
+                  <a:schemeClr val="tx1"/>
+                </a:solidFill>
+                <a:tailEnd type="triangle"/>
+              </a:ln>
+            </p:spPr>
+            <p:style>
+              <a:lnRef idx="1">
+                <a:schemeClr val="accent1"/>
+              </a:lnRef>
+              <a:fillRef idx="0">
+                <a:schemeClr val="accent1"/>
+              </a:fillRef>
+              <a:effectRef idx="0">
+                <a:schemeClr val="accent1"/>
+              </a:effectRef>
+              <a:fontRef idx="minor">
+                <a:schemeClr val="tx1"/>
+              </a:fontRef>
+            </p:style>
+          </p:cxnSp>
+          <mc:AlternateContent xmlns:mc="http://schemas.openxmlformats.org/markup-compatibility/2006">
+            <mc:Choice xmlns:a14="http://schemas.microsoft.com/office/drawing/2010/main" Requires="a14">
+              <p:sp>
+                <p:nvSpPr>
+                  <p:cNvPr id="17" name="TextBox 16">
+                    <a:extLst>
+                      <a:ext uri="{FF2B5EF4-FFF2-40B4-BE49-F238E27FC236}">
+                        <a16:creationId xmlns:a16="http://schemas.microsoft.com/office/drawing/2014/main" id="{192A37FC-F5F8-4CE6-BE69-2720A1572F41}"/>
+                      </a:ext>
+                    </a:extLst>
+                  </p:cNvPr>
+                  <p:cNvSpPr txBox="1"/>
+                  <p:nvPr/>
+                </p:nvSpPr>
+                <p:spPr>
+                  <a:xfrm>
+                    <a:off x="755576" y="2580371"/>
+                    <a:ext cx="396839" cy="369332"/>
+                  </a:xfrm>
+                  <a:prstGeom prst="rect">
+                    <a:avLst/>
+                  </a:prstGeom>
+                  <a:noFill/>
+                </p:spPr>
+                <p:txBody>
+                  <a:bodyPr wrap="none" rtlCol="0">
+                    <a:spAutoFit/>
+                  </a:bodyPr>
+                  <a:lstStyle/>
+                  <a:p>
+                    <a:pPr/>
+                    <a14:m>
+                      <m:oMathPara xmlns:m="http://schemas.openxmlformats.org/officeDocument/2006/math">
+                        <m:oMathParaPr>
+                          <m:jc m:val="centerGroup"/>
+                        </m:oMathParaPr>
+                        <m:oMath xmlns:m="http://schemas.openxmlformats.org/officeDocument/2006/math">
+                          <m:r>
+                            <a:rPr lang="en-US" altLang="ko-KR" b="1" i="1" smtClean="0">
+                              <a:latin typeface="Cambria Math" panose="02040503050406030204" pitchFamily="18" charset="0"/>
+                            </a:rPr>
+                            <m:t>𝒙</m:t>
+                          </m:r>
+                        </m:oMath>
+                      </m:oMathPara>
+                    </a14:m>
+                    <a:endParaRPr lang="ko-KR" altLang="en-US" b="1" dirty="0"/>
+                  </a:p>
+                </p:txBody>
+              </p:sp>
+            </mc:Choice>
+            <mc:Fallback>
+              <p:sp>
+                <p:nvSpPr>
+                  <p:cNvPr id="17" name="TextBox 16">
+                    <a:extLst>
+                      <a:ext uri="{FF2B5EF4-FFF2-40B4-BE49-F238E27FC236}">
+                        <a16:creationId xmlns:a16="http://schemas.microsoft.com/office/drawing/2014/main" id="{192A37FC-F5F8-4CE6-BE69-2720A1572F41}"/>
+                      </a:ext>
+                    </a:extLst>
+                  </p:cNvPr>
+                  <p:cNvSpPr txBox="1">
+                    <a:spLocks noRot="1" noChangeAspect="1" noMove="1" noResize="1" noEditPoints="1" noAdjustHandles="1" noChangeArrowheads="1" noChangeShapeType="1" noTextEdit="1"/>
+                  </p:cNvSpPr>
+                  <p:nvPr/>
+                </p:nvSpPr>
+                <p:spPr>
+                  <a:xfrm>
+                    <a:off x="755576" y="2580371"/>
+                    <a:ext cx="396839" cy="369332"/>
+                  </a:xfrm>
+                  <a:prstGeom prst="rect">
+                    <a:avLst/>
+                  </a:prstGeom>
+                  <a:blipFill>
+                    <a:blip r:embed="rId2"/>
+                    <a:stretch>
+                      <a:fillRect/>
+                    </a:stretch>
+                  </a:blipFill>
+                </p:spPr>
+                <p:txBody>
+                  <a:bodyPr/>
+                  <a:lstStyle/>
+                  <a:p>
+                    <a:r>
+                      <a:rPr lang="ko-KR" altLang="en-US">
+                        <a:noFill/>
+                      </a:rPr>
+                      <a:t> </a:t>
+                    </a:r>
+                  </a:p>
+                </p:txBody>
+              </p:sp>
+            </mc:Fallback>
+          </mc:AlternateContent>
+          <mc:AlternateContent xmlns:mc="http://schemas.openxmlformats.org/markup-compatibility/2006">
+            <mc:Choice xmlns:a14="http://schemas.microsoft.com/office/drawing/2010/main" Requires="a14">
+              <p:sp>
+                <p:nvSpPr>
+                  <p:cNvPr id="18" name="TextBox 17">
+                    <a:extLst>
+                      <a:ext uri="{FF2B5EF4-FFF2-40B4-BE49-F238E27FC236}">
+                        <a16:creationId xmlns:a16="http://schemas.microsoft.com/office/drawing/2014/main" id="{B3972BF5-318E-42E3-8C00-75E3D174F36F}"/>
+                      </a:ext>
+                    </a:extLst>
+                  </p:cNvPr>
+                  <p:cNvSpPr txBox="1"/>
+                  <p:nvPr/>
+                </p:nvSpPr>
+                <p:spPr>
+                  <a:xfrm>
+                    <a:off x="3059642" y="1973512"/>
+                    <a:ext cx="404278" cy="369332"/>
+                  </a:xfrm>
+                  <a:prstGeom prst="rect">
+                    <a:avLst/>
+                  </a:prstGeom>
+                  <a:noFill/>
+                </p:spPr>
+                <p:txBody>
+                  <a:bodyPr wrap="none" rtlCol="0">
+                    <a:spAutoFit/>
+                  </a:bodyPr>
+                  <a:lstStyle/>
+                  <a:p>
+                    <a:pPr/>
+                    <a14:m>
+                      <m:oMathPara xmlns:m="http://schemas.openxmlformats.org/officeDocument/2006/math">
+                        <m:oMathParaPr>
+                          <m:jc m:val="centerGroup"/>
+                        </m:oMathParaPr>
+                        <m:oMath xmlns:m="http://schemas.openxmlformats.org/officeDocument/2006/math">
+                          <m:r>
+                            <a:rPr lang="en-US" altLang="ko-KR" b="1" i="1" smtClean="0">
+                              <a:latin typeface="Cambria Math" panose="02040503050406030204" pitchFamily="18" charset="0"/>
+                            </a:rPr>
+                            <m:t>𝒚</m:t>
+                          </m:r>
+                        </m:oMath>
+                      </m:oMathPara>
+                    </a14:m>
+                    <a:endParaRPr lang="ko-KR" altLang="en-US" b="1" dirty="0"/>
+                  </a:p>
+                </p:txBody>
+              </p:sp>
+            </mc:Choice>
+            <mc:Fallback>
+              <p:sp>
+                <p:nvSpPr>
+                  <p:cNvPr id="18" name="TextBox 17">
+                    <a:extLst>
+                      <a:ext uri="{FF2B5EF4-FFF2-40B4-BE49-F238E27FC236}">
+                        <a16:creationId xmlns:a16="http://schemas.microsoft.com/office/drawing/2014/main" id="{B3972BF5-318E-42E3-8C00-75E3D174F36F}"/>
+                      </a:ext>
+                    </a:extLst>
+                  </p:cNvPr>
+                  <p:cNvSpPr txBox="1">
+                    <a:spLocks noRot="1" noChangeAspect="1" noMove="1" noResize="1" noEditPoints="1" noAdjustHandles="1" noChangeArrowheads="1" noChangeShapeType="1" noTextEdit="1"/>
+                  </p:cNvSpPr>
+                  <p:nvPr/>
+                </p:nvSpPr>
+                <p:spPr>
+                  <a:xfrm>
+                    <a:off x="3059642" y="1973512"/>
+                    <a:ext cx="404278" cy="369332"/>
+                  </a:xfrm>
+                  <a:prstGeom prst="rect">
+                    <a:avLst/>
+                  </a:prstGeom>
+                  <a:blipFill>
+                    <a:blip r:embed="rId3"/>
+                    <a:stretch>
+                      <a:fillRect b="-9836"/>
+                    </a:stretch>
+                  </a:blipFill>
+                </p:spPr>
+                <p:txBody>
+                  <a:bodyPr/>
+                  <a:lstStyle/>
+                  <a:p>
+                    <a:r>
+                      <a:rPr lang="ko-KR" altLang="en-US">
+                        <a:noFill/>
+                      </a:rPr>
+                      <a:t> </a:t>
+                    </a:r>
+                  </a:p>
+                </p:txBody>
+              </p:sp>
+            </mc:Fallback>
+          </mc:AlternateContent>
+          <mc:AlternateContent xmlns:mc="http://schemas.openxmlformats.org/markup-compatibility/2006">
+            <mc:Choice xmlns:a14="http://schemas.microsoft.com/office/drawing/2010/main" Requires="a14">
+              <p:sp>
+                <p:nvSpPr>
+                  <p:cNvPr id="19" name="TextBox 18">
+                    <a:extLst>
+                      <a:ext uri="{FF2B5EF4-FFF2-40B4-BE49-F238E27FC236}">
+                        <a16:creationId xmlns:a16="http://schemas.microsoft.com/office/drawing/2014/main" id="{873AF83E-4828-4515-93D3-1FAE2BBF7EE0}"/>
+                      </a:ext>
+                    </a:extLst>
+                  </p:cNvPr>
+                  <p:cNvSpPr txBox="1"/>
+                  <p:nvPr/>
+                </p:nvSpPr>
+                <p:spPr>
+                  <a:xfrm>
+                    <a:off x="1254470" y="692696"/>
+                    <a:ext cx="396839" cy="369332"/>
+                  </a:xfrm>
+                  <a:prstGeom prst="rect">
+                    <a:avLst/>
+                  </a:prstGeom>
+                  <a:noFill/>
+                </p:spPr>
+                <p:txBody>
+                  <a:bodyPr wrap="none" rtlCol="0">
+                    <a:spAutoFit/>
+                  </a:bodyPr>
+                  <a:lstStyle/>
+                  <a:p>
+                    <a:pPr/>
+                    <a14:m>
+                      <m:oMathPara xmlns:m="http://schemas.openxmlformats.org/officeDocument/2006/math">
+                        <m:oMathParaPr>
+                          <m:jc m:val="centerGroup"/>
+                        </m:oMathParaPr>
+                        <m:oMath xmlns:m="http://schemas.openxmlformats.org/officeDocument/2006/math">
+                          <m:r>
+                            <a:rPr lang="en-US" altLang="ko-KR" b="1" i="1" smtClean="0">
+                              <a:latin typeface="Cambria Math" panose="02040503050406030204" pitchFamily="18" charset="0"/>
+                            </a:rPr>
+                            <m:t>𝒛</m:t>
+                          </m:r>
+                        </m:oMath>
+                      </m:oMathPara>
+                    </a14:m>
+                    <a:endParaRPr lang="ko-KR" altLang="en-US" b="1" dirty="0"/>
+                  </a:p>
+                </p:txBody>
+              </p:sp>
+            </mc:Choice>
+            <mc:Fallback>
+              <p:sp>
+                <p:nvSpPr>
+                  <p:cNvPr id="19" name="TextBox 18">
+                    <a:extLst>
+                      <a:ext uri="{FF2B5EF4-FFF2-40B4-BE49-F238E27FC236}">
+                        <a16:creationId xmlns:a16="http://schemas.microsoft.com/office/drawing/2014/main" id="{873AF83E-4828-4515-93D3-1FAE2BBF7EE0}"/>
+                      </a:ext>
+                    </a:extLst>
+                  </p:cNvPr>
+                  <p:cNvSpPr txBox="1">
+                    <a:spLocks noRot="1" noChangeAspect="1" noMove="1" noResize="1" noEditPoints="1" noAdjustHandles="1" noChangeArrowheads="1" noChangeShapeType="1" noTextEdit="1"/>
+                  </p:cNvSpPr>
+                  <p:nvPr/>
+                </p:nvSpPr>
+                <p:spPr>
+                  <a:xfrm>
+                    <a:off x="1254470" y="692696"/>
+                    <a:ext cx="396839" cy="369332"/>
+                  </a:xfrm>
+                  <a:prstGeom prst="rect">
+                    <a:avLst/>
+                  </a:prstGeom>
+                  <a:blipFill>
+                    <a:blip r:embed="rId4"/>
+                    <a:stretch>
+                      <a:fillRect/>
+                    </a:stretch>
+                  </a:blipFill>
+                </p:spPr>
+                <p:txBody>
+                  <a:bodyPr/>
+                  <a:lstStyle/>
+                  <a:p>
+                    <a:r>
+                      <a:rPr lang="ko-KR" altLang="en-US">
+                        <a:noFill/>
+                      </a:rPr>
+                      <a:t> </a:t>
+                    </a:r>
+                  </a:p>
+                </p:txBody>
+              </p:sp>
+            </mc:Fallback>
+          </mc:AlternateContent>
+          <p:sp>
+            <p:nvSpPr>
+              <p:cNvPr id="20" name="직사각형 19">
+                <a:extLst>
+                  <a:ext uri="{FF2B5EF4-FFF2-40B4-BE49-F238E27FC236}">
+                    <a16:creationId xmlns:a16="http://schemas.microsoft.com/office/drawing/2014/main" id="{73FE66E7-7D25-4A40-9C9B-1419F7833F74}"/>
+                  </a:ext>
+                </a:extLst>
+              </p:cNvPr>
+              <p:cNvSpPr/>
+              <p:nvPr/>
+            </p:nvSpPr>
+            <p:spPr>
+              <a:xfrm>
+                <a:off x="1358228" y="1776556"/>
+                <a:ext cx="899577" cy="900825"/>
+              </a:xfrm>
+              <a:prstGeom prst="rect">
+                <a:avLst/>
+              </a:prstGeom>
+              <a:solidFill>
+                <a:schemeClr val="accent1">
+                  <a:alpha val="40000"/>
+                </a:schemeClr>
+              </a:solidFill>
+              <a:ln>
+                <a:noFill/>
+              </a:ln>
+            </p:spPr>
+            <p:style>
+              <a:lnRef idx="2">
+                <a:schemeClr val="accent1">
+                  <a:shade val="50000"/>
+                </a:schemeClr>
+              </a:lnRef>
+              <a:fillRef idx="1">
+                <a:schemeClr val="accent1"/>
+              </a:fillRef>
+              <a:effectRef idx="0">
+                <a:schemeClr val="accent1"/>
+              </a:effectRef>
+              <a:fontRef idx="minor">
+                <a:schemeClr val="lt1"/>
+              </a:fontRef>
+            </p:style>
+            <p:txBody>
+              <a:bodyPr rtlCol="0" anchor="ctr"/>
+              <a:lstStyle/>
+              <a:p>
+                <a:pPr algn="ctr"/>
+                <a:endParaRPr lang="ko-KR" altLang="en-US" b="1"/>
+              </a:p>
+            </p:txBody>
+          </p:sp>
+          <p:sp>
+            <p:nvSpPr>
+              <p:cNvPr id="21" name="직사각형 20">
+                <a:extLst>
+                  <a:ext uri="{FF2B5EF4-FFF2-40B4-BE49-F238E27FC236}">
+                    <a16:creationId xmlns:a16="http://schemas.microsoft.com/office/drawing/2014/main" id="{BB74164F-B477-4FDE-B59B-41336F7C5864}"/>
+                  </a:ext>
+                </a:extLst>
+              </p:cNvPr>
+              <p:cNvSpPr/>
+              <p:nvPr/>
+            </p:nvSpPr>
+            <p:spPr>
+              <a:xfrm>
+                <a:off x="1670464" y="1476188"/>
+                <a:ext cx="899577" cy="900825"/>
+              </a:xfrm>
+              <a:prstGeom prst="rect">
+                <a:avLst/>
+              </a:prstGeom>
+              <a:solidFill>
+                <a:schemeClr val="accent1">
+                  <a:alpha val="40000"/>
+                </a:schemeClr>
+              </a:solidFill>
+              <a:ln>
+                <a:noFill/>
+              </a:ln>
+            </p:spPr>
+            <p:style>
+              <a:lnRef idx="2">
+                <a:schemeClr val="accent1">
+                  <a:shade val="50000"/>
+                </a:schemeClr>
+              </a:lnRef>
+              <a:fillRef idx="1">
+                <a:schemeClr val="accent1"/>
+              </a:fillRef>
+              <a:effectRef idx="0">
+                <a:schemeClr val="accent1"/>
+              </a:effectRef>
+              <a:fontRef idx="minor">
+                <a:schemeClr val="lt1"/>
+              </a:fontRef>
+            </p:style>
+            <p:txBody>
+              <a:bodyPr rtlCol="0" anchor="ctr"/>
+              <a:lstStyle/>
+              <a:p>
+                <a:pPr algn="ctr"/>
+                <a:endParaRPr lang="ko-KR" altLang="en-US" b="1"/>
+              </a:p>
+            </p:txBody>
+          </p:sp>
+        </p:grpSp>
+        <p:grpSp>
+          <p:nvGrpSpPr>
+            <p:cNvPr id="5" name="그룹 4">
+              <a:extLst>
+                <a:ext uri="{FF2B5EF4-FFF2-40B4-BE49-F238E27FC236}">
+                  <a16:creationId xmlns:a16="http://schemas.microsoft.com/office/drawing/2014/main" id="{84E3DD46-AD25-49B2-BE94-48B471590B44}"/>
+                </a:ext>
+              </a:extLst>
+            </p:cNvPr>
+            <p:cNvGrpSpPr/>
+            <p:nvPr/>
+          </p:nvGrpSpPr>
+          <p:grpSpPr>
+            <a:xfrm>
+              <a:off x="3501546" y="658527"/>
+              <a:ext cx="2708344" cy="2452597"/>
+              <a:chOff x="3504093" y="658527"/>
+              <a:chExt cx="2708344" cy="2452597"/>
+            </a:xfrm>
+          </p:grpSpPr>
+          <p:sp>
+            <p:nvSpPr>
+              <p:cNvPr id="33" name="정육면체 32">
+                <a:extLst>
+                  <a:ext uri="{FF2B5EF4-FFF2-40B4-BE49-F238E27FC236}">
+                    <a16:creationId xmlns:a16="http://schemas.microsoft.com/office/drawing/2014/main" id="{BB4BA1F1-6D30-4D42-9798-EDFC8B29CBD9}"/>
+                  </a:ext>
+                </a:extLst>
+              </p:cNvPr>
+              <p:cNvSpPr/>
+              <p:nvPr/>
+            </p:nvSpPr>
+            <p:spPr>
+              <a:xfrm>
+                <a:off x="4101816" y="1427372"/>
+                <a:ext cx="1216152" cy="1216152"/>
+              </a:xfrm>
+              <a:prstGeom prst="cube">
+                <a:avLst/>
+              </a:prstGeom>
+              <a:noFill/>
+            </p:spPr>
+            <p:style>
+              <a:lnRef idx="2">
+                <a:schemeClr val="accent1">
+                  <a:shade val="50000"/>
+                </a:schemeClr>
+              </a:lnRef>
+              <a:fillRef idx="1">
+                <a:schemeClr val="accent1"/>
+              </a:fillRef>
+              <a:effectRef idx="0">
+                <a:schemeClr val="accent1"/>
+              </a:effectRef>
+              <a:fontRef idx="minor">
+                <a:schemeClr val="lt1"/>
+              </a:fontRef>
+            </p:style>
+            <p:txBody>
+              <a:bodyPr rtlCol="0" anchor="ctr"/>
+              <a:lstStyle/>
+              <a:p>
+                <a:pPr algn="ctr"/>
+                <a:endParaRPr lang="ko-KR" altLang="en-US" b="1"/>
+              </a:p>
+            </p:txBody>
+          </p:sp>
+          <p:cxnSp>
+            <p:nvCxnSpPr>
+              <p:cNvPr id="34" name="직선 화살표 연결선 33">
+                <a:extLst>
+                  <a:ext uri="{FF2B5EF4-FFF2-40B4-BE49-F238E27FC236}">
+                    <a16:creationId xmlns:a16="http://schemas.microsoft.com/office/drawing/2014/main" id="{581C093B-6ADB-47B1-BD7D-9E723EADC660}"/>
+                  </a:ext>
+                </a:extLst>
+              </p:cNvPr>
+              <p:cNvCxnSpPr>
+                <a:cxnSpLocks/>
+              </p:cNvCxnSpPr>
+              <p:nvPr/>
+            </p:nvCxnSpPr>
+            <p:spPr>
+              <a:xfrm>
+                <a:off x="4411516" y="2343156"/>
+                <a:ext cx="1490500" cy="0"/>
+              </a:xfrm>
+              <a:prstGeom prst="straightConnector1">
+                <a:avLst/>
+              </a:prstGeom>
+              <a:ln w="19050">
+                <a:solidFill>
+                  <a:schemeClr val="tx1"/>
+                </a:solidFill>
+                <a:tailEnd type="triangle"/>
+              </a:ln>
+            </p:spPr>
+            <p:style>
+              <a:lnRef idx="1">
+                <a:schemeClr val="accent1"/>
+              </a:lnRef>
+              <a:fillRef idx="0">
+                <a:schemeClr val="accent1"/>
+              </a:fillRef>
+              <a:effectRef idx="0">
+                <a:schemeClr val="accent1"/>
+              </a:effectRef>
+              <a:fontRef idx="minor">
+                <a:schemeClr val="tx1"/>
+              </a:fontRef>
+            </p:style>
+          </p:cxnSp>
+          <p:cxnSp>
+            <p:nvCxnSpPr>
+              <p:cNvPr id="35" name="직선 화살표 연결선 34">
+                <a:extLst>
+                  <a:ext uri="{FF2B5EF4-FFF2-40B4-BE49-F238E27FC236}">
+                    <a16:creationId xmlns:a16="http://schemas.microsoft.com/office/drawing/2014/main" id="{1F419E52-4105-45EA-B5B1-AF95CC330E3A}"/>
+                  </a:ext>
+                </a:extLst>
+              </p:cNvPr>
+              <p:cNvCxnSpPr>
+                <a:cxnSpLocks/>
+              </p:cNvCxnSpPr>
+              <p:nvPr/>
+            </p:nvCxnSpPr>
+            <p:spPr>
+              <a:xfrm flipV="1">
+                <a:off x="4415248" y="658527"/>
+                <a:ext cx="0" cy="1684629"/>
+              </a:xfrm>
+              <a:prstGeom prst="straightConnector1">
+                <a:avLst/>
+              </a:prstGeom>
+              <a:ln w="19050">
+                <a:solidFill>
+                  <a:schemeClr val="tx1"/>
+                </a:solidFill>
+                <a:tailEnd type="triangle"/>
+              </a:ln>
+            </p:spPr>
+            <p:style>
+              <a:lnRef idx="1">
+                <a:schemeClr val="accent1"/>
+              </a:lnRef>
+              <a:fillRef idx="0">
+                <a:schemeClr val="accent1"/>
+              </a:fillRef>
+              <a:effectRef idx="0">
+                <a:schemeClr val="accent1"/>
+              </a:effectRef>
+              <a:fontRef idx="minor">
+                <a:schemeClr val="tx1"/>
+              </a:fontRef>
+            </p:style>
+          </p:cxnSp>
+          <p:cxnSp>
+            <p:nvCxnSpPr>
+              <p:cNvPr id="36" name="직선 화살표 연결선 35">
+                <a:extLst>
+                  <a:ext uri="{FF2B5EF4-FFF2-40B4-BE49-F238E27FC236}">
+                    <a16:creationId xmlns:a16="http://schemas.microsoft.com/office/drawing/2014/main" id="{B3451782-A8D3-432F-A0C4-0BCE41597CF1}"/>
+                  </a:ext>
+                </a:extLst>
+              </p:cNvPr>
+              <p:cNvCxnSpPr>
+                <a:cxnSpLocks/>
+              </p:cNvCxnSpPr>
+              <p:nvPr/>
+            </p:nvCxnSpPr>
+            <p:spPr>
+              <a:xfrm flipH="1">
+                <a:off x="3652857" y="2343156"/>
+                <a:ext cx="758661" cy="767968"/>
+              </a:xfrm>
+              <a:prstGeom prst="straightConnector1">
+                <a:avLst/>
+              </a:prstGeom>
+              <a:ln w="19050">
+                <a:solidFill>
+                  <a:schemeClr val="tx1"/>
+                </a:solidFill>
+                <a:tailEnd type="triangle"/>
+              </a:ln>
+            </p:spPr>
+            <p:style>
+              <a:lnRef idx="1">
+                <a:schemeClr val="accent1"/>
+              </a:lnRef>
+              <a:fillRef idx="0">
+                <a:schemeClr val="accent1"/>
+              </a:fillRef>
+              <a:effectRef idx="0">
+                <a:schemeClr val="accent1"/>
+              </a:effectRef>
+              <a:fontRef idx="minor">
+                <a:schemeClr val="tx1"/>
+              </a:fontRef>
+            </p:style>
+          </p:cxnSp>
+          <mc:AlternateContent xmlns:mc="http://schemas.openxmlformats.org/markup-compatibility/2006">
+            <mc:Choice xmlns:a14="http://schemas.microsoft.com/office/drawing/2010/main" Requires="a14">
+              <p:sp>
+                <p:nvSpPr>
+                  <p:cNvPr id="37" name="TextBox 36">
+                    <a:extLst>
+                      <a:ext uri="{FF2B5EF4-FFF2-40B4-BE49-F238E27FC236}">
+                        <a16:creationId xmlns:a16="http://schemas.microsoft.com/office/drawing/2014/main" id="{A5B2D496-0AE7-4F5A-82B5-FF3EA656A24C}"/>
+                      </a:ext>
+                    </a:extLst>
+                  </p:cNvPr>
+                  <p:cNvSpPr txBox="1"/>
+                  <p:nvPr/>
+                </p:nvSpPr>
+                <p:spPr>
+                  <a:xfrm>
+                    <a:off x="3504093" y="2546202"/>
+                    <a:ext cx="396839" cy="369332"/>
+                  </a:xfrm>
+                  <a:prstGeom prst="rect">
+                    <a:avLst/>
+                  </a:prstGeom>
+                  <a:noFill/>
+                </p:spPr>
+                <p:txBody>
+                  <a:bodyPr wrap="none" rtlCol="0">
+                    <a:spAutoFit/>
+                  </a:bodyPr>
+                  <a:lstStyle/>
+                  <a:p>
+                    <a:pPr/>
+                    <a14:m>
+                      <m:oMathPara xmlns:m="http://schemas.openxmlformats.org/officeDocument/2006/math">
+                        <m:oMathParaPr>
+                          <m:jc m:val="centerGroup"/>
+                        </m:oMathParaPr>
+                        <m:oMath xmlns:m="http://schemas.openxmlformats.org/officeDocument/2006/math">
+                          <m:r>
+                            <a:rPr lang="en-US" altLang="ko-KR" b="1" i="1" smtClean="0">
+                              <a:latin typeface="Cambria Math" panose="02040503050406030204" pitchFamily="18" charset="0"/>
+                            </a:rPr>
+                            <m:t>𝒙</m:t>
+                          </m:r>
+                        </m:oMath>
+                      </m:oMathPara>
+                    </a14:m>
+                    <a:endParaRPr lang="ko-KR" altLang="en-US" b="1" dirty="0"/>
+                  </a:p>
+                </p:txBody>
+              </p:sp>
+            </mc:Choice>
+            <mc:Fallback>
+              <p:sp>
+                <p:nvSpPr>
+                  <p:cNvPr id="37" name="TextBox 36">
+                    <a:extLst>
+                      <a:ext uri="{FF2B5EF4-FFF2-40B4-BE49-F238E27FC236}">
+                        <a16:creationId xmlns:a16="http://schemas.microsoft.com/office/drawing/2014/main" id="{A5B2D496-0AE7-4F5A-82B5-FF3EA656A24C}"/>
+                      </a:ext>
+                    </a:extLst>
+                  </p:cNvPr>
+                  <p:cNvSpPr txBox="1">
+                    <a:spLocks noRot="1" noChangeAspect="1" noMove="1" noResize="1" noEditPoints="1" noAdjustHandles="1" noChangeArrowheads="1" noChangeShapeType="1" noTextEdit="1"/>
+                  </p:cNvSpPr>
+                  <p:nvPr/>
+                </p:nvSpPr>
+                <p:spPr>
+                  <a:xfrm>
+                    <a:off x="3504093" y="2546202"/>
+                    <a:ext cx="396839" cy="369332"/>
+                  </a:xfrm>
+                  <a:prstGeom prst="rect">
+                    <a:avLst/>
+                  </a:prstGeom>
+                  <a:blipFill>
+                    <a:blip r:embed="rId5"/>
+                    <a:stretch>
+                      <a:fillRect/>
+                    </a:stretch>
+                  </a:blipFill>
+                </p:spPr>
+                <p:txBody>
+                  <a:bodyPr/>
+                  <a:lstStyle/>
+                  <a:p>
+                    <a:r>
+                      <a:rPr lang="ko-KR" altLang="en-US">
+                        <a:noFill/>
+                      </a:rPr>
+                      <a:t> </a:t>
+                    </a:r>
+                  </a:p>
+                </p:txBody>
+              </p:sp>
+            </mc:Fallback>
+          </mc:AlternateContent>
+          <mc:AlternateContent xmlns:mc="http://schemas.openxmlformats.org/markup-compatibility/2006">
+            <mc:Choice xmlns:a14="http://schemas.microsoft.com/office/drawing/2010/main" Requires="a14">
+              <p:sp>
+                <p:nvSpPr>
+                  <p:cNvPr id="38" name="TextBox 37">
+                    <a:extLst>
+                      <a:ext uri="{FF2B5EF4-FFF2-40B4-BE49-F238E27FC236}">
+                        <a16:creationId xmlns:a16="http://schemas.microsoft.com/office/drawing/2014/main" id="{34206E17-8F44-49AA-8B1B-FDCA46BB027A}"/>
+                      </a:ext>
+                    </a:extLst>
+                  </p:cNvPr>
+                  <p:cNvSpPr txBox="1"/>
+                  <p:nvPr/>
+                </p:nvSpPr>
+                <p:spPr>
+                  <a:xfrm>
+                    <a:off x="5808159" y="1939343"/>
+                    <a:ext cx="404278" cy="369332"/>
+                  </a:xfrm>
+                  <a:prstGeom prst="rect">
+                    <a:avLst/>
+                  </a:prstGeom>
+                  <a:noFill/>
+                </p:spPr>
+                <p:txBody>
+                  <a:bodyPr wrap="none" rtlCol="0">
+                    <a:spAutoFit/>
+                  </a:bodyPr>
+                  <a:lstStyle/>
+                  <a:p>
+                    <a:pPr/>
+                    <a14:m>
+                      <m:oMathPara xmlns:m="http://schemas.openxmlformats.org/officeDocument/2006/math">
+                        <m:oMathParaPr>
+                          <m:jc m:val="centerGroup"/>
+                        </m:oMathParaPr>
+                        <m:oMath xmlns:m="http://schemas.openxmlformats.org/officeDocument/2006/math">
+                          <m:r>
+                            <a:rPr lang="en-US" altLang="ko-KR" b="1" i="1" smtClean="0">
+                              <a:latin typeface="Cambria Math" panose="02040503050406030204" pitchFamily="18" charset="0"/>
+                            </a:rPr>
+                            <m:t>𝒚</m:t>
+                          </m:r>
+                        </m:oMath>
+                      </m:oMathPara>
+                    </a14:m>
+                    <a:endParaRPr lang="ko-KR" altLang="en-US" b="1" dirty="0"/>
+                  </a:p>
+                </p:txBody>
+              </p:sp>
+            </mc:Choice>
+            <mc:Fallback>
+              <p:sp>
+                <p:nvSpPr>
+                  <p:cNvPr id="38" name="TextBox 37">
+                    <a:extLst>
+                      <a:ext uri="{FF2B5EF4-FFF2-40B4-BE49-F238E27FC236}">
+                        <a16:creationId xmlns:a16="http://schemas.microsoft.com/office/drawing/2014/main" id="{34206E17-8F44-49AA-8B1B-FDCA46BB027A}"/>
+                      </a:ext>
+                    </a:extLst>
+                  </p:cNvPr>
+                  <p:cNvSpPr txBox="1">
+                    <a:spLocks noRot="1" noChangeAspect="1" noMove="1" noResize="1" noEditPoints="1" noAdjustHandles="1" noChangeArrowheads="1" noChangeShapeType="1" noTextEdit="1"/>
+                  </p:cNvSpPr>
+                  <p:nvPr/>
+                </p:nvSpPr>
+                <p:spPr>
+                  <a:xfrm>
+                    <a:off x="5808159" y="1939343"/>
+                    <a:ext cx="404278" cy="369332"/>
+                  </a:xfrm>
+                  <a:prstGeom prst="rect">
+                    <a:avLst/>
+                  </a:prstGeom>
+                  <a:blipFill>
+                    <a:blip r:embed="rId6"/>
+                    <a:stretch>
+                      <a:fillRect b="-10000"/>
+                    </a:stretch>
+                  </a:blipFill>
+                </p:spPr>
+                <p:txBody>
+                  <a:bodyPr/>
+                  <a:lstStyle/>
+                  <a:p>
+                    <a:r>
+                      <a:rPr lang="ko-KR" altLang="en-US">
+                        <a:noFill/>
+                      </a:rPr>
+                      <a:t> </a:t>
+                    </a:r>
+                  </a:p>
+                </p:txBody>
+              </p:sp>
+            </mc:Fallback>
+          </mc:AlternateContent>
+          <mc:AlternateContent xmlns:mc="http://schemas.openxmlformats.org/markup-compatibility/2006">
+            <mc:Choice xmlns:a14="http://schemas.microsoft.com/office/drawing/2010/main" Requires="a14">
+              <p:sp>
+                <p:nvSpPr>
+                  <p:cNvPr id="39" name="TextBox 38">
+                    <a:extLst>
+                      <a:ext uri="{FF2B5EF4-FFF2-40B4-BE49-F238E27FC236}">
+                        <a16:creationId xmlns:a16="http://schemas.microsoft.com/office/drawing/2014/main" id="{52297665-65FE-4A79-B2B1-8E5381AEA4B1}"/>
+                      </a:ext>
+                    </a:extLst>
+                  </p:cNvPr>
+                  <p:cNvSpPr txBox="1"/>
+                  <p:nvPr/>
+                </p:nvSpPr>
+                <p:spPr>
+                  <a:xfrm>
+                    <a:off x="4002987" y="658527"/>
+                    <a:ext cx="396839" cy="369332"/>
+                  </a:xfrm>
+                  <a:prstGeom prst="rect">
+                    <a:avLst/>
+                  </a:prstGeom>
+                  <a:noFill/>
+                </p:spPr>
+                <p:txBody>
+                  <a:bodyPr wrap="none" rtlCol="0">
+                    <a:spAutoFit/>
+                  </a:bodyPr>
+                  <a:lstStyle/>
+                  <a:p>
+                    <a:pPr/>
+                    <a14:m>
+                      <m:oMathPara xmlns:m="http://schemas.openxmlformats.org/officeDocument/2006/math">
+                        <m:oMathParaPr>
+                          <m:jc m:val="centerGroup"/>
+                        </m:oMathParaPr>
+                        <m:oMath xmlns:m="http://schemas.openxmlformats.org/officeDocument/2006/math">
+                          <m:r>
+                            <a:rPr lang="en-US" altLang="ko-KR" b="1" i="1" smtClean="0">
+                              <a:latin typeface="Cambria Math" panose="02040503050406030204" pitchFamily="18" charset="0"/>
+                            </a:rPr>
+                            <m:t>𝒛</m:t>
+                          </m:r>
+                        </m:oMath>
+                      </m:oMathPara>
+                    </a14:m>
+                    <a:endParaRPr lang="ko-KR" altLang="en-US" b="1" dirty="0"/>
+                  </a:p>
+                </p:txBody>
+              </p:sp>
+            </mc:Choice>
+            <mc:Fallback>
+              <p:sp>
+                <p:nvSpPr>
+                  <p:cNvPr id="39" name="TextBox 38">
+                    <a:extLst>
+                      <a:ext uri="{FF2B5EF4-FFF2-40B4-BE49-F238E27FC236}">
+                        <a16:creationId xmlns:a16="http://schemas.microsoft.com/office/drawing/2014/main" id="{52297665-65FE-4A79-B2B1-8E5381AEA4B1}"/>
+                      </a:ext>
+                    </a:extLst>
+                  </p:cNvPr>
+                  <p:cNvSpPr txBox="1">
+                    <a:spLocks noRot="1" noChangeAspect="1" noMove="1" noResize="1" noEditPoints="1" noAdjustHandles="1" noChangeArrowheads="1" noChangeShapeType="1" noTextEdit="1"/>
+                  </p:cNvSpPr>
+                  <p:nvPr/>
+                </p:nvSpPr>
+                <p:spPr>
+                  <a:xfrm>
+                    <a:off x="4002987" y="658527"/>
+                    <a:ext cx="396839" cy="369332"/>
+                  </a:xfrm>
+                  <a:prstGeom prst="rect">
+                    <a:avLst/>
+                  </a:prstGeom>
+                  <a:blipFill>
+                    <a:blip r:embed="rId7"/>
+                    <a:stretch>
+                      <a:fillRect/>
+                    </a:stretch>
+                  </a:blipFill>
+                </p:spPr>
+                <p:txBody>
+                  <a:bodyPr/>
+                  <a:lstStyle/>
+                  <a:p>
+                    <a:r>
+                      <a:rPr lang="ko-KR" altLang="en-US">
+                        <a:noFill/>
+                      </a:rPr>
+                      <a:t> </a:t>
+                    </a:r>
+                  </a:p>
+                </p:txBody>
+              </p:sp>
+            </mc:Fallback>
+          </mc:AlternateContent>
+          <p:sp>
+            <p:nvSpPr>
+              <p:cNvPr id="42" name="자유형: 도형 41">
+                <a:extLst>
+                  <a:ext uri="{FF2B5EF4-FFF2-40B4-BE49-F238E27FC236}">
+                    <a16:creationId xmlns:a16="http://schemas.microsoft.com/office/drawing/2014/main" id="{EE9DD656-E6E3-4D71-B4E3-229E6500DEAD}"/>
+                  </a:ext>
+                </a:extLst>
+              </p:cNvPr>
+              <p:cNvSpPr/>
+              <p:nvPr/>
+            </p:nvSpPr>
+            <p:spPr>
+              <a:xfrm>
+                <a:off x="4107180" y="1428750"/>
+                <a:ext cx="308610" cy="1215390"/>
+              </a:xfrm>
+              <a:custGeom>
+                <a:avLst/>
+                <a:gdLst>
+                  <a:gd name="connsiteX0" fmla="*/ 300990 w 308610"/>
+                  <a:gd name="connsiteY0" fmla="*/ 0 h 1215390"/>
+                  <a:gd name="connsiteX1" fmla="*/ 0 w 308610"/>
+                  <a:gd name="connsiteY1" fmla="*/ 308610 h 1215390"/>
+                  <a:gd name="connsiteX2" fmla="*/ 0 w 308610"/>
+                  <a:gd name="connsiteY2" fmla="*/ 1215390 h 1215390"/>
+                  <a:gd name="connsiteX3" fmla="*/ 308610 w 308610"/>
+                  <a:gd name="connsiteY3" fmla="*/ 914400 h 1215390"/>
+                  <a:gd name="connsiteX4" fmla="*/ 300990 w 308610"/>
+                  <a:gd name="connsiteY4" fmla="*/ 0 h 1215390"/>
+                </a:gdLst>
+                <a:ahLst/>
+                <a:cxnLst>
+                  <a:cxn ang="0">
+                    <a:pos x="connsiteX0" y="connsiteY0"/>
+                  </a:cxn>
+                  <a:cxn ang="0">
+                    <a:pos x="connsiteX1" y="connsiteY1"/>
+                  </a:cxn>
+                  <a:cxn ang="0">
+                    <a:pos x="connsiteX2" y="connsiteY2"/>
+                  </a:cxn>
+                  <a:cxn ang="0">
+                    <a:pos x="connsiteX3" y="connsiteY3"/>
+                  </a:cxn>
+                  <a:cxn ang="0">
+                    <a:pos x="connsiteX4" y="connsiteY4"/>
+                  </a:cxn>
+                </a:cxnLst>
+                <a:rect l="l" t="t" r="r" b="b"/>
+                <a:pathLst>
+                  <a:path w="308610" h="1215390">
+                    <a:moveTo>
+                      <a:pt x="300990" y="0"/>
+                    </a:moveTo>
+                    <a:lnTo>
+                      <a:pt x="0" y="308610"/>
+                    </a:lnTo>
+                    <a:lnTo>
+                      <a:pt x="0" y="1215390"/>
+                    </a:lnTo>
+                    <a:lnTo>
+                      <a:pt x="308610" y="914400"/>
+                    </a:lnTo>
+                    <a:lnTo>
+                      <a:pt x="300990" y="0"/>
+                    </a:lnTo>
+                    <a:close/>
+                  </a:path>
+                </a:pathLst>
+              </a:custGeom>
+              <a:solidFill>
+                <a:schemeClr val="accent2">
+                  <a:alpha val="40000"/>
+                </a:schemeClr>
+              </a:solidFill>
+              <a:ln>
+                <a:noFill/>
+              </a:ln>
+            </p:spPr>
+            <p:style>
+              <a:lnRef idx="2">
+                <a:schemeClr val="accent1">
+                  <a:shade val="50000"/>
+                </a:schemeClr>
+              </a:lnRef>
+              <a:fillRef idx="1">
+                <a:schemeClr val="accent1"/>
+              </a:fillRef>
+              <a:effectRef idx="0">
+                <a:schemeClr val="accent1"/>
+              </a:effectRef>
+              <a:fontRef idx="minor">
+                <a:schemeClr val="lt1"/>
+              </a:fontRef>
+            </p:style>
+            <p:txBody>
+              <a:bodyPr rtlCol="0" anchor="ctr"/>
+              <a:lstStyle/>
+              <a:p>
+                <a:pPr algn="ctr"/>
+                <a:endParaRPr lang="ko-KR" altLang="en-US" b="1"/>
+              </a:p>
+            </p:txBody>
+          </p:sp>
+          <p:sp>
+            <p:nvSpPr>
+              <p:cNvPr id="22" name="자유형: 도형 21">
+                <a:extLst>
+                  <a:ext uri="{FF2B5EF4-FFF2-40B4-BE49-F238E27FC236}">
+                    <a16:creationId xmlns:a16="http://schemas.microsoft.com/office/drawing/2014/main" id="{C149BC22-E957-46EA-8F98-2C47CC8325B1}"/>
+                  </a:ext>
+                </a:extLst>
+              </p:cNvPr>
+              <p:cNvSpPr/>
+              <p:nvPr/>
+            </p:nvSpPr>
+            <p:spPr>
+              <a:xfrm>
+                <a:off x="5009629" y="1428750"/>
+                <a:ext cx="308610" cy="1215390"/>
+              </a:xfrm>
+              <a:custGeom>
+                <a:avLst/>
+                <a:gdLst>
+                  <a:gd name="connsiteX0" fmla="*/ 300990 w 308610"/>
+                  <a:gd name="connsiteY0" fmla="*/ 0 h 1215390"/>
+                  <a:gd name="connsiteX1" fmla="*/ 0 w 308610"/>
+                  <a:gd name="connsiteY1" fmla="*/ 308610 h 1215390"/>
+                  <a:gd name="connsiteX2" fmla="*/ 0 w 308610"/>
+                  <a:gd name="connsiteY2" fmla="*/ 1215390 h 1215390"/>
+                  <a:gd name="connsiteX3" fmla="*/ 308610 w 308610"/>
+                  <a:gd name="connsiteY3" fmla="*/ 914400 h 1215390"/>
+                  <a:gd name="connsiteX4" fmla="*/ 300990 w 308610"/>
+                  <a:gd name="connsiteY4" fmla="*/ 0 h 1215390"/>
+                </a:gdLst>
+                <a:ahLst/>
+                <a:cxnLst>
+                  <a:cxn ang="0">
+                    <a:pos x="connsiteX0" y="connsiteY0"/>
+                  </a:cxn>
+                  <a:cxn ang="0">
+                    <a:pos x="connsiteX1" y="connsiteY1"/>
+                  </a:cxn>
+                  <a:cxn ang="0">
+                    <a:pos x="connsiteX2" y="connsiteY2"/>
+                  </a:cxn>
+                  <a:cxn ang="0">
+                    <a:pos x="connsiteX3" y="connsiteY3"/>
+                  </a:cxn>
+                  <a:cxn ang="0">
+                    <a:pos x="connsiteX4" y="connsiteY4"/>
+                  </a:cxn>
+                </a:cxnLst>
+                <a:rect l="l" t="t" r="r" b="b"/>
+                <a:pathLst>
+                  <a:path w="308610" h="1215390">
+                    <a:moveTo>
+                      <a:pt x="300990" y="0"/>
+                    </a:moveTo>
+                    <a:lnTo>
+                      <a:pt x="0" y="308610"/>
+                    </a:lnTo>
+                    <a:lnTo>
+                      <a:pt x="0" y="1215390"/>
+                    </a:lnTo>
+                    <a:lnTo>
+                      <a:pt x="308610" y="914400"/>
+                    </a:lnTo>
+                    <a:lnTo>
+                      <a:pt x="300990" y="0"/>
+                    </a:lnTo>
+                    <a:close/>
+                  </a:path>
+                </a:pathLst>
+              </a:custGeom>
+              <a:solidFill>
+                <a:schemeClr val="accent2">
+                  <a:alpha val="40000"/>
+                </a:schemeClr>
+              </a:solidFill>
+              <a:ln>
+                <a:noFill/>
+              </a:ln>
+            </p:spPr>
+            <p:style>
+              <a:lnRef idx="2">
+                <a:schemeClr val="accent1">
+                  <a:shade val="50000"/>
+                </a:schemeClr>
+              </a:lnRef>
+              <a:fillRef idx="1">
+                <a:schemeClr val="accent1"/>
+              </a:fillRef>
+              <a:effectRef idx="0">
+                <a:schemeClr val="accent1"/>
+              </a:effectRef>
+              <a:fontRef idx="minor">
+                <a:schemeClr val="lt1"/>
+              </a:fontRef>
+            </p:style>
+            <p:txBody>
+              <a:bodyPr rtlCol="0" anchor="ctr"/>
+              <a:lstStyle/>
+              <a:p>
+                <a:pPr algn="ctr"/>
+                <a:endParaRPr lang="ko-KR" altLang="en-US" b="1"/>
+              </a:p>
+            </p:txBody>
+          </p:sp>
+        </p:grpSp>
+        <p:grpSp>
+          <p:nvGrpSpPr>
+            <p:cNvPr id="8" name="그룹 7">
+              <a:extLst>
+                <a:ext uri="{FF2B5EF4-FFF2-40B4-BE49-F238E27FC236}">
+                  <a16:creationId xmlns:a16="http://schemas.microsoft.com/office/drawing/2014/main" id="{424D334D-595E-484B-BB87-F925354CA244}"/>
+                </a:ext>
+              </a:extLst>
+            </p:cNvPr>
+            <p:cNvGrpSpPr/>
+            <p:nvPr/>
+          </p:nvGrpSpPr>
+          <p:grpSpPr>
+            <a:xfrm>
+              <a:off x="6247516" y="658527"/>
+              <a:ext cx="2708344" cy="2452597"/>
+              <a:chOff x="6247516" y="658527"/>
+              <a:chExt cx="2708344" cy="2452597"/>
+            </a:xfrm>
+          </p:grpSpPr>
+          <p:sp>
+            <p:nvSpPr>
+              <p:cNvPr id="23" name="정육면체 22">
+                <a:extLst>
+                  <a:ext uri="{FF2B5EF4-FFF2-40B4-BE49-F238E27FC236}">
+                    <a16:creationId xmlns:a16="http://schemas.microsoft.com/office/drawing/2014/main" id="{FEC80E16-9C4B-4DEA-A4DA-3341AFFF5DEB}"/>
+                  </a:ext>
+                </a:extLst>
+              </p:cNvPr>
+              <p:cNvSpPr/>
+              <p:nvPr/>
+            </p:nvSpPr>
+            <p:spPr>
+              <a:xfrm>
+                <a:off x="6845239" y="1427372"/>
+                <a:ext cx="1216152" cy="1216152"/>
+              </a:xfrm>
+              <a:prstGeom prst="cube">
+                <a:avLst/>
+              </a:prstGeom>
+              <a:noFill/>
+            </p:spPr>
+            <p:style>
+              <a:lnRef idx="2">
+                <a:schemeClr val="accent1">
+                  <a:shade val="50000"/>
+                </a:schemeClr>
+              </a:lnRef>
+              <a:fillRef idx="1">
+                <a:schemeClr val="accent1"/>
+              </a:fillRef>
+              <a:effectRef idx="0">
+                <a:schemeClr val="accent1"/>
+              </a:effectRef>
+              <a:fontRef idx="minor">
+                <a:schemeClr val="lt1"/>
+              </a:fontRef>
+            </p:style>
+            <p:txBody>
+              <a:bodyPr rtlCol="0" anchor="ctr"/>
+              <a:lstStyle/>
+              <a:p>
+                <a:pPr algn="ctr"/>
+                <a:endParaRPr lang="ko-KR" altLang="en-US" b="1"/>
+              </a:p>
+            </p:txBody>
+          </p:sp>
+          <p:cxnSp>
+            <p:nvCxnSpPr>
+              <p:cNvPr id="24" name="직선 화살표 연결선 23">
+                <a:extLst>
+                  <a:ext uri="{FF2B5EF4-FFF2-40B4-BE49-F238E27FC236}">
+                    <a16:creationId xmlns:a16="http://schemas.microsoft.com/office/drawing/2014/main" id="{06A3A62D-67D3-4F94-81FF-37CAD31525D3}"/>
+                  </a:ext>
+                </a:extLst>
+              </p:cNvPr>
+              <p:cNvCxnSpPr>
+                <a:cxnSpLocks/>
+              </p:cNvCxnSpPr>
+              <p:nvPr/>
+            </p:nvCxnSpPr>
+            <p:spPr>
+              <a:xfrm>
+                <a:off x="7154939" y="2343156"/>
+                <a:ext cx="1490500" cy="0"/>
+              </a:xfrm>
+              <a:prstGeom prst="straightConnector1">
+                <a:avLst/>
+              </a:prstGeom>
+              <a:ln w="19050">
+                <a:solidFill>
+                  <a:schemeClr val="tx1"/>
+                </a:solidFill>
+                <a:tailEnd type="triangle"/>
+              </a:ln>
+            </p:spPr>
+            <p:style>
+              <a:lnRef idx="1">
+                <a:schemeClr val="accent1"/>
+              </a:lnRef>
+              <a:fillRef idx="0">
+                <a:schemeClr val="accent1"/>
+              </a:fillRef>
+              <a:effectRef idx="0">
+                <a:schemeClr val="accent1"/>
+              </a:effectRef>
+              <a:fontRef idx="minor">
+                <a:schemeClr val="tx1"/>
+              </a:fontRef>
+            </p:style>
+          </p:cxnSp>
+          <p:cxnSp>
+            <p:nvCxnSpPr>
+              <p:cNvPr id="25" name="직선 화살표 연결선 24">
+                <a:extLst>
+                  <a:ext uri="{FF2B5EF4-FFF2-40B4-BE49-F238E27FC236}">
+                    <a16:creationId xmlns:a16="http://schemas.microsoft.com/office/drawing/2014/main" id="{3CEE1469-2880-4506-9E7B-2BB74359456A}"/>
+                  </a:ext>
+                </a:extLst>
+              </p:cNvPr>
+              <p:cNvCxnSpPr>
+                <a:cxnSpLocks/>
+              </p:cNvCxnSpPr>
+              <p:nvPr/>
+            </p:nvCxnSpPr>
+            <p:spPr>
+              <a:xfrm flipV="1">
+                <a:off x="7158671" y="658527"/>
+                <a:ext cx="0" cy="1684629"/>
+              </a:xfrm>
+              <a:prstGeom prst="straightConnector1">
+                <a:avLst/>
+              </a:prstGeom>
+              <a:ln w="19050">
+                <a:solidFill>
+                  <a:schemeClr val="tx1"/>
+                </a:solidFill>
+                <a:tailEnd type="triangle"/>
+              </a:ln>
+            </p:spPr>
+            <p:style>
+              <a:lnRef idx="1">
+                <a:schemeClr val="accent1"/>
+              </a:lnRef>
+              <a:fillRef idx="0">
+                <a:schemeClr val="accent1"/>
+              </a:fillRef>
+              <a:effectRef idx="0">
+                <a:schemeClr val="accent1"/>
+              </a:effectRef>
+              <a:fontRef idx="minor">
+                <a:schemeClr val="tx1"/>
+              </a:fontRef>
+            </p:style>
+          </p:cxnSp>
+          <p:cxnSp>
+            <p:nvCxnSpPr>
+              <p:cNvPr id="26" name="직선 화살표 연결선 25">
+                <a:extLst>
+                  <a:ext uri="{FF2B5EF4-FFF2-40B4-BE49-F238E27FC236}">
+                    <a16:creationId xmlns:a16="http://schemas.microsoft.com/office/drawing/2014/main" id="{6E19C15A-1A3D-4165-A509-573282343790}"/>
+                  </a:ext>
+                </a:extLst>
+              </p:cNvPr>
+              <p:cNvCxnSpPr>
+                <a:cxnSpLocks/>
+              </p:cNvCxnSpPr>
+              <p:nvPr/>
+            </p:nvCxnSpPr>
+            <p:spPr>
+              <a:xfrm flipH="1">
+                <a:off x="6396280" y="2343156"/>
+                <a:ext cx="758661" cy="767968"/>
+              </a:xfrm>
+              <a:prstGeom prst="straightConnector1">
+                <a:avLst/>
+              </a:prstGeom>
+              <a:ln w="19050">
+                <a:solidFill>
+                  <a:schemeClr val="tx1"/>
+                </a:solidFill>
+                <a:tailEnd type="triangle"/>
+              </a:ln>
+            </p:spPr>
+            <p:style>
+              <a:lnRef idx="1">
+                <a:schemeClr val="accent1"/>
+              </a:lnRef>
+              <a:fillRef idx="0">
+                <a:schemeClr val="accent1"/>
+              </a:fillRef>
+              <a:effectRef idx="0">
+                <a:schemeClr val="accent1"/>
+              </a:effectRef>
+              <a:fontRef idx="minor">
+                <a:schemeClr val="tx1"/>
+              </a:fontRef>
+            </p:style>
+          </p:cxnSp>
+          <mc:AlternateContent xmlns:mc="http://schemas.openxmlformats.org/markup-compatibility/2006">
+            <mc:Choice xmlns:a14="http://schemas.microsoft.com/office/drawing/2010/main" Requires="a14">
+              <p:sp>
+                <p:nvSpPr>
+                  <p:cNvPr id="27" name="TextBox 26">
+                    <a:extLst>
+                      <a:ext uri="{FF2B5EF4-FFF2-40B4-BE49-F238E27FC236}">
+                        <a16:creationId xmlns:a16="http://schemas.microsoft.com/office/drawing/2014/main" id="{9EE8B88F-3BBE-460B-8C31-24B3873FC655}"/>
+                      </a:ext>
+                    </a:extLst>
+                  </p:cNvPr>
+                  <p:cNvSpPr txBox="1"/>
+                  <p:nvPr/>
+                </p:nvSpPr>
+                <p:spPr>
+                  <a:xfrm>
+                    <a:off x="6247516" y="2546202"/>
+                    <a:ext cx="396839" cy="369332"/>
+                  </a:xfrm>
+                  <a:prstGeom prst="rect">
+                    <a:avLst/>
+                  </a:prstGeom>
+                  <a:noFill/>
+                </p:spPr>
+                <p:txBody>
+                  <a:bodyPr wrap="none" rtlCol="0">
+                    <a:spAutoFit/>
+                  </a:bodyPr>
+                  <a:lstStyle/>
+                  <a:p>
+                    <a:pPr/>
+                    <a14:m>
+                      <m:oMathPara xmlns:m="http://schemas.openxmlformats.org/officeDocument/2006/math">
+                        <m:oMathParaPr>
+                          <m:jc m:val="centerGroup"/>
+                        </m:oMathParaPr>
+                        <m:oMath xmlns:m="http://schemas.openxmlformats.org/officeDocument/2006/math">
+                          <m:r>
+                            <a:rPr lang="en-US" altLang="ko-KR" b="1" i="1" smtClean="0">
+                              <a:latin typeface="Cambria Math" panose="02040503050406030204" pitchFamily="18" charset="0"/>
+                            </a:rPr>
+                            <m:t>𝒙</m:t>
+                          </m:r>
+                        </m:oMath>
+                      </m:oMathPara>
+                    </a14:m>
+                    <a:endParaRPr lang="ko-KR" altLang="en-US" b="1" dirty="0"/>
+                  </a:p>
+                </p:txBody>
+              </p:sp>
+            </mc:Choice>
+            <mc:Fallback>
+              <p:sp>
+                <p:nvSpPr>
+                  <p:cNvPr id="27" name="TextBox 26">
+                    <a:extLst>
+                      <a:ext uri="{FF2B5EF4-FFF2-40B4-BE49-F238E27FC236}">
+                        <a16:creationId xmlns:a16="http://schemas.microsoft.com/office/drawing/2014/main" id="{9EE8B88F-3BBE-460B-8C31-24B3873FC655}"/>
+                      </a:ext>
+                    </a:extLst>
+                  </p:cNvPr>
+                  <p:cNvSpPr txBox="1">
+                    <a:spLocks noRot="1" noChangeAspect="1" noMove="1" noResize="1" noEditPoints="1" noAdjustHandles="1" noChangeArrowheads="1" noChangeShapeType="1" noTextEdit="1"/>
+                  </p:cNvSpPr>
+                  <p:nvPr/>
+                </p:nvSpPr>
+                <p:spPr>
+                  <a:xfrm>
+                    <a:off x="6247516" y="2546202"/>
+                    <a:ext cx="396839" cy="369332"/>
+                  </a:xfrm>
+                  <a:prstGeom prst="rect">
+                    <a:avLst/>
+                  </a:prstGeom>
+                  <a:blipFill>
+                    <a:blip r:embed="rId8"/>
+                    <a:stretch>
+                      <a:fillRect/>
+                    </a:stretch>
+                  </a:blipFill>
+                </p:spPr>
+                <p:txBody>
+                  <a:bodyPr/>
+                  <a:lstStyle/>
+                  <a:p>
+                    <a:r>
+                      <a:rPr lang="ko-KR" altLang="en-US">
+                        <a:noFill/>
+                      </a:rPr>
+                      <a:t> </a:t>
+                    </a:r>
+                  </a:p>
+                </p:txBody>
+              </p:sp>
+            </mc:Fallback>
+          </mc:AlternateContent>
+          <mc:AlternateContent xmlns:mc="http://schemas.openxmlformats.org/markup-compatibility/2006">
+            <mc:Choice xmlns:a14="http://schemas.microsoft.com/office/drawing/2010/main" Requires="a14">
+              <p:sp>
+                <p:nvSpPr>
+                  <p:cNvPr id="28" name="TextBox 27">
+                    <a:extLst>
+                      <a:ext uri="{FF2B5EF4-FFF2-40B4-BE49-F238E27FC236}">
+                        <a16:creationId xmlns:a16="http://schemas.microsoft.com/office/drawing/2014/main" id="{2ECAAD22-C39F-4D7E-959E-57A4A5A0BB1C}"/>
+                      </a:ext>
+                    </a:extLst>
+                  </p:cNvPr>
+                  <p:cNvSpPr txBox="1"/>
+                  <p:nvPr/>
+                </p:nvSpPr>
+                <p:spPr>
+                  <a:xfrm>
+                    <a:off x="8551582" y="1939343"/>
+                    <a:ext cx="404278" cy="369332"/>
+                  </a:xfrm>
+                  <a:prstGeom prst="rect">
+                    <a:avLst/>
+                  </a:prstGeom>
+                  <a:noFill/>
+                </p:spPr>
+                <p:txBody>
+                  <a:bodyPr wrap="none" rtlCol="0">
+                    <a:spAutoFit/>
+                  </a:bodyPr>
+                  <a:lstStyle/>
+                  <a:p>
+                    <a:pPr/>
+                    <a14:m>
+                      <m:oMathPara xmlns:m="http://schemas.openxmlformats.org/officeDocument/2006/math">
+                        <m:oMathParaPr>
+                          <m:jc m:val="centerGroup"/>
+                        </m:oMathParaPr>
+                        <m:oMath xmlns:m="http://schemas.openxmlformats.org/officeDocument/2006/math">
+                          <m:r>
+                            <a:rPr lang="en-US" altLang="ko-KR" b="1" i="1" smtClean="0">
+                              <a:latin typeface="Cambria Math" panose="02040503050406030204" pitchFamily="18" charset="0"/>
+                            </a:rPr>
+                            <m:t>𝒚</m:t>
+                          </m:r>
+                        </m:oMath>
+                      </m:oMathPara>
+                    </a14:m>
+                    <a:endParaRPr lang="ko-KR" altLang="en-US" b="1" dirty="0"/>
+                  </a:p>
+                </p:txBody>
+              </p:sp>
+            </mc:Choice>
+            <mc:Fallback>
+              <p:sp>
+                <p:nvSpPr>
+                  <p:cNvPr id="28" name="TextBox 27">
+                    <a:extLst>
+                      <a:ext uri="{FF2B5EF4-FFF2-40B4-BE49-F238E27FC236}">
+                        <a16:creationId xmlns:a16="http://schemas.microsoft.com/office/drawing/2014/main" id="{2ECAAD22-C39F-4D7E-959E-57A4A5A0BB1C}"/>
+                      </a:ext>
+                    </a:extLst>
+                  </p:cNvPr>
+                  <p:cNvSpPr txBox="1">
+                    <a:spLocks noRot="1" noChangeAspect="1" noMove="1" noResize="1" noEditPoints="1" noAdjustHandles="1" noChangeArrowheads="1" noChangeShapeType="1" noTextEdit="1"/>
+                  </p:cNvSpPr>
+                  <p:nvPr/>
+                </p:nvSpPr>
+                <p:spPr>
+                  <a:xfrm>
+                    <a:off x="8551582" y="1939343"/>
+                    <a:ext cx="404278" cy="369332"/>
+                  </a:xfrm>
+                  <a:prstGeom prst="rect">
+                    <a:avLst/>
+                  </a:prstGeom>
+                  <a:blipFill>
+                    <a:blip r:embed="rId9"/>
+                    <a:stretch>
+                      <a:fillRect b="-10000"/>
+                    </a:stretch>
+                  </a:blipFill>
+                </p:spPr>
+                <p:txBody>
+                  <a:bodyPr/>
+                  <a:lstStyle/>
+                  <a:p>
+                    <a:r>
+                      <a:rPr lang="ko-KR" altLang="en-US">
+                        <a:noFill/>
+                      </a:rPr>
+                      <a:t> </a:t>
+                    </a:r>
+                  </a:p>
+                </p:txBody>
+              </p:sp>
+            </mc:Fallback>
+          </mc:AlternateContent>
+          <mc:AlternateContent xmlns:mc="http://schemas.openxmlformats.org/markup-compatibility/2006">
+            <mc:Choice xmlns:a14="http://schemas.microsoft.com/office/drawing/2010/main" Requires="a14">
+              <p:sp>
+                <p:nvSpPr>
+                  <p:cNvPr id="29" name="TextBox 28">
+                    <a:extLst>
+                      <a:ext uri="{FF2B5EF4-FFF2-40B4-BE49-F238E27FC236}">
+                        <a16:creationId xmlns:a16="http://schemas.microsoft.com/office/drawing/2014/main" id="{8161E73D-94FC-4DB1-8C3B-A1FCA2ED9B1F}"/>
+                      </a:ext>
+                    </a:extLst>
+                  </p:cNvPr>
+                  <p:cNvSpPr txBox="1"/>
+                  <p:nvPr/>
+                </p:nvSpPr>
+                <p:spPr>
+                  <a:xfrm>
+                    <a:off x="6746410" y="658527"/>
+                    <a:ext cx="396839" cy="369332"/>
+                  </a:xfrm>
+                  <a:prstGeom prst="rect">
+                    <a:avLst/>
+                  </a:prstGeom>
+                  <a:noFill/>
+                </p:spPr>
+                <p:txBody>
+                  <a:bodyPr wrap="none" rtlCol="0">
+                    <a:spAutoFit/>
+                  </a:bodyPr>
+                  <a:lstStyle/>
+                  <a:p>
+                    <a:pPr/>
+                    <a14:m>
+                      <m:oMathPara xmlns:m="http://schemas.openxmlformats.org/officeDocument/2006/math">
+                        <m:oMathParaPr>
+                          <m:jc m:val="centerGroup"/>
+                        </m:oMathParaPr>
+                        <m:oMath xmlns:m="http://schemas.openxmlformats.org/officeDocument/2006/math">
+                          <m:r>
+                            <a:rPr lang="en-US" altLang="ko-KR" b="1" i="1" smtClean="0">
+                              <a:latin typeface="Cambria Math" panose="02040503050406030204" pitchFamily="18" charset="0"/>
+                            </a:rPr>
+                            <m:t>𝒛</m:t>
+                          </m:r>
+                        </m:oMath>
+                      </m:oMathPara>
+                    </a14:m>
+                    <a:endParaRPr lang="ko-KR" altLang="en-US" b="1" dirty="0"/>
+                  </a:p>
+                </p:txBody>
+              </p:sp>
+            </mc:Choice>
+            <mc:Fallback>
+              <p:sp>
+                <p:nvSpPr>
+                  <p:cNvPr id="29" name="TextBox 28">
+                    <a:extLst>
+                      <a:ext uri="{FF2B5EF4-FFF2-40B4-BE49-F238E27FC236}">
+                        <a16:creationId xmlns:a16="http://schemas.microsoft.com/office/drawing/2014/main" id="{8161E73D-94FC-4DB1-8C3B-A1FCA2ED9B1F}"/>
+                      </a:ext>
+                    </a:extLst>
+                  </p:cNvPr>
+                  <p:cNvSpPr txBox="1">
+                    <a:spLocks noRot="1" noChangeAspect="1" noMove="1" noResize="1" noEditPoints="1" noAdjustHandles="1" noChangeArrowheads="1" noChangeShapeType="1" noTextEdit="1"/>
+                  </p:cNvSpPr>
+                  <p:nvPr/>
+                </p:nvSpPr>
+                <p:spPr>
+                  <a:xfrm>
+                    <a:off x="6746410" y="658527"/>
+                    <a:ext cx="396839" cy="369332"/>
+                  </a:xfrm>
+                  <a:prstGeom prst="rect">
+                    <a:avLst/>
+                  </a:prstGeom>
+                  <a:blipFill>
+                    <a:blip r:embed="rId10"/>
+                    <a:stretch>
+                      <a:fillRect/>
+                    </a:stretch>
+                  </a:blipFill>
+                </p:spPr>
+                <p:txBody>
+                  <a:bodyPr/>
+                  <a:lstStyle/>
+                  <a:p>
+                    <a:r>
+                      <a:rPr lang="ko-KR" altLang="en-US">
+                        <a:noFill/>
+                      </a:rPr>
+                      <a:t> </a:t>
+                    </a:r>
+                  </a:p>
+                </p:txBody>
+              </p:sp>
+            </mc:Fallback>
+          </mc:AlternateContent>
+          <p:sp>
+            <p:nvSpPr>
+              <p:cNvPr id="2" name="자유형: 도형 1">
+                <a:extLst>
+                  <a:ext uri="{FF2B5EF4-FFF2-40B4-BE49-F238E27FC236}">
+                    <a16:creationId xmlns:a16="http://schemas.microsoft.com/office/drawing/2014/main" id="{BA901E2E-2172-4045-A95C-5817BF8D6397}"/>
+                  </a:ext>
+                </a:extLst>
+              </p:cNvPr>
+              <p:cNvSpPr/>
+              <p:nvPr/>
+            </p:nvSpPr>
+            <p:spPr>
+              <a:xfrm>
+                <a:off x="6850380" y="1424940"/>
+                <a:ext cx="1203960" cy="304800"/>
+              </a:xfrm>
+              <a:custGeom>
+                <a:avLst/>
+                <a:gdLst>
+                  <a:gd name="connsiteX0" fmla="*/ 308610 w 1203960"/>
+                  <a:gd name="connsiteY0" fmla="*/ 0 h 304800"/>
+                  <a:gd name="connsiteX1" fmla="*/ 0 w 1203960"/>
+                  <a:gd name="connsiteY1" fmla="*/ 304800 h 304800"/>
+                  <a:gd name="connsiteX2" fmla="*/ 910590 w 1203960"/>
+                  <a:gd name="connsiteY2" fmla="*/ 304800 h 304800"/>
+                  <a:gd name="connsiteX3" fmla="*/ 1203960 w 1203960"/>
+                  <a:gd name="connsiteY3" fmla="*/ 7620 h 304800"/>
+                  <a:gd name="connsiteX4" fmla="*/ 308610 w 1203960"/>
+                  <a:gd name="connsiteY4" fmla="*/ 0 h 304800"/>
+                </a:gdLst>
+                <a:ahLst/>
+                <a:cxnLst>
+                  <a:cxn ang="0">
+                    <a:pos x="connsiteX0" y="connsiteY0"/>
+                  </a:cxn>
+                  <a:cxn ang="0">
+                    <a:pos x="connsiteX1" y="connsiteY1"/>
+                  </a:cxn>
+                  <a:cxn ang="0">
+                    <a:pos x="connsiteX2" y="connsiteY2"/>
+                  </a:cxn>
+                  <a:cxn ang="0">
+                    <a:pos x="connsiteX3" y="connsiteY3"/>
+                  </a:cxn>
+                  <a:cxn ang="0">
+                    <a:pos x="connsiteX4" y="connsiteY4"/>
+                  </a:cxn>
+                </a:cxnLst>
+                <a:rect l="l" t="t" r="r" b="b"/>
+                <a:pathLst>
+                  <a:path w="1203960" h="304800">
+                    <a:moveTo>
+                      <a:pt x="308610" y="0"/>
+                    </a:moveTo>
+                    <a:lnTo>
+                      <a:pt x="0" y="304800"/>
+                    </a:lnTo>
+                    <a:lnTo>
+                      <a:pt x="910590" y="304800"/>
+                    </a:lnTo>
+                    <a:lnTo>
+                      <a:pt x="1203960" y="7620"/>
+                    </a:lnTo>
+                    <a:lnTo>
+                      <a:pt x="308610" y="0"/>
+                    </a:lnTo>
+                    <a:close/>
+                  </a:path>
+                </a:pathLst>
+              </a:custGeom>
+              <a:solidFill>
+                <a:schemeClr val="accent3">
+                  <a:alpha val="40000"/>
+                </a:schemeClr>
+              </a:solidFill>
+              <a:ln>
+                <a:noFill/>
+              </a:ln>
+            </p:spPr>
+            <p:style>
+              <a:lnRef idx="2">
+                <a:schemeClr val="accent1">
+                  <a:shade val="50000"/>
+                </a:schemeClr>
+              </a:lnRef>
+              <a:fillRef idx="1">
+                <a:schemeClr val="accent1"/>
+              </a:fillRef>
+              <a:effectRef idx="0">
+                <a:schemeClr val="accent1"/>
+              </a:effectRef>
+              <a:fontRef idx="minor">
+                <a:schemeClr val="lt1"/>
+              </a:fontRef>
+            </p:style>
+            <p:txBody>
+              <a:bodyPr rtlCol="0" anchor="ctr"/>
+              <a:lstStyle/>
+              <a:p>
+                <a:pPr algn="ctr"/>
+                <a:endParaRPr lang="ko-KR" altLang="en-US" b="1"/>
+              </a:p>
+            </p:txBody>
+          </p:sp>
+          <p:sp>
+            <p:nvSpPr>
+              <p:cNvPr id="32" name="자유형: 도형 31">
+                <a:extLst>
+                  <a:ext uri="{FF2B5EF4-FFF2-40B4-BE49-F238E27FC236}">
+                    <a16:creationId xmlns:a16="http://schemas.microsoft.com/office/drawing/2014/main" id="{A1789C5E-4D61-4A21-8693-FABFFB8A5EB8}"/>
+                  </a:ext>
+                </a:extLst>
+              </p:cNvPr>
+              <p:cNvSpPr/>
+              <p:nvPr/>
+            </p:nvSpPr>
+            <p:spPr>
+              <a:xfrm>
+                <a:off x="6850380" y="2342844"/>
+                <a:ext cx="1203960" cy="304800"/>
+              </a:xfrm>
+              <a:custGeom>
+                <a:avLst/>
+                <a:gdLst>
+                  <a:gd name="connsiteX0" fmla="*/ 308610 w 1203960"/>
+                  <a:gd name="connsiteY0" fmla="*/ 0 h 304800"/>
+                  <a:gd name="connsiteX1" fmla="*/ 0 w 1203960"/>
+                  <a:gd name="connsiteY1" fmla="*/ 304800 h 304800"/>
+                  <a:gd name="connsiteX2" fmla="*/ 910590 w 1203960"/>
+                  <a:gd name="connsiteY2" fmla="*/ 304800 h 304800"/>
+                  <a:gd name="connsiteX3" fmla="*/ 1203960 w 1203960"/>
+                  <a:gd name="connsiteY3" fmla="*/ 7620 h 304800"/>
+                  <a:gd name="connsiteX4" fmla="*/ 308610 w 1203960"/>
+                  <a:gd name="connsiteY4" fmla="*/ 0 h 304800"/>
+                </a:gdLst>
+                <a:ahLst/>
+                <a:cxnLst>
+                  <a:cxn ang="0">
+                    <a:pos x="connsiteX0" y="connsiteY0"/>
+                  </a:cxn>
+                  <a:cxn ang="0">
+                    <a:pos x="connsiteX1" y="connsiteY1"/>
+                  </a:cxn>
+                  <a:cxn ang="0">
+                    <a:pos x="connsiteX2" y="connsiteY2"/>
+                  </a:cxn>
+                  <a:cxn ang="0">
+                    <a:pos x="connsiteX3" y="connsiteY3"/>
+                  </a:cxn>
+                  <a:cxn ang="0">
+                    <a:pos x="connsiteX4" y="connsiteY4"/>
+                  </a:cxn>
+                </a:cxnLst>
+                <a:rect l="l" t="t" r="r" b="b"/>
+                <a:pathLst>
+                  <a:path w="1203960" h="304800">
+                    <a:moveTo>
+                      <a:pt x="308610" y="0"/>
+                    </a:moveTo>
+                    <a:lnTo>
+                      <a:pt x="0" y="304800"/>
+                    </a:lnTo>
+                    <a:lnTo>
+                      <a:pt x="910590" y="304800"/>
+                    </a:lnTo>
+                    <a:lnTo>
+                      <a:pt x="1203960" y="7620"/>
+                    </a:lnTo>
+                    <a:lnTo>
+                      <a:pt x="308610" y="0"/>
+                    </a:lnTo>
+                    <a:close/>
+                  </a:path>
+                </a:pathLst>
+              </a:custGeom>
+              <a:solidFill>
+                <a:schemeClr val="accent3">
+                  <a:alpha val="40000"/>
+                </a:schemeClr>
+              </a:solidFill>
+              <a:ln>
+                <a:noFill/>
+              </a:ln>
+            </p:spPr>
+            <p:style>
+              <a:lnRef idx="2">
+                <a:schemeClr val="accent1">
+                  <a:shade val="50000"/>
+                </a:schemeClr>
+              </a:lnRef>
+              <a:fillRef idx="1">
+                <a:schemeClr val="accent1"/>
+              </a:fillRef>
+              <a:effectRef idx="0">
+                <a:schemeClr val="accent1"/>
+              </a:effectRef>
+              <a:fontRef idx="minor">
+                <a:schemeClr val="lt1"/>
+              </a:fontRef>
+            </p:style>
+            <p:txBody>
+              <a:bodyPr rtlCol="0" anchor="ctr"/>
+              <a:lstStyle/>
+              <a:p>
+                <a:pPr algn="ctr"/>
+                <a:endParaRPr lang="ko-KR" altLang="en-US" b="1"/>
+              </a:p>
+            </p:txBody>
+          </p:sp>
+        </p:grpSp>
+      </p:grpSp>
+    </p:spTree>
+    <p:extLst>
+      <p:ext uri="{BB962C8B-B14F-4D97-AF65-F5344CB8AC3E}">
+        <p14:creationId xmlns:p14="http://schemas.microsoft.com/office/powerpoint/2010/main" val="1561196107"/>
+      </p:ext>
+    </p:extLst>
+  </p:cSld>
+  <p:clrMapOvr>
+    <a:masterClrMapping/>
+  </p:clrMapOvr>
+</p:sld>
+</file>
+
+<file path=ppt/slides/slide2.xml><?xml version="1.0" encoding="utf-8"?>
+<p:sld xmlns:a="http://schemas.openxmlformats.org/drawingml/2006/main" xmlns:r="http://schemas.openxmlformats.org/officeDocument/2006/relationships" xmlns:p="http://schemas.openxmlformats.org/presentationml/2006/main">
+  <p:cSld>
+    <p:spTree>
+      <p:nvGrpSpPr>
+        <p:cNvPr id="1" name=""/>
+        <p:cNvGrpSpPr/>
+        <p:nvPr/>
+      </p:nvGrpSpPr>
+      <p:grpSpPr>
+        <a:xfrm>
+          <a:off x="0" y="0"/>
+          <a:ext cx="0" cy="0"/>
+          <a:chOff x="0" y="0"/>
+          <a:chExt cx="0" cy="0"/>
+        </a:xfrm>
+      </p:grpSpPr>
       <p:cxnSp>
         <p:nvCxnSpPr>
           <p:cNvPr id="5" name="직선 화살표 연결선 4"/>
@@ -3587,8 +5626,8 @@
           </a:p>
         </p:txBody>
       </p:sp>
-      <mc:AlternateContent xmlns:mc="http://schemas.openxmlformats.org/markup-compatibility/2006">
-        <mc:Choice xmlns:a14="http://schemas.microsoft.com/office/drawing/2010/main" Requires="a14">
+      <mc:AlternateContent xmlns:mc="http://schemas.openxmlformats.org/markup-compatibility/2006" xmlns:a14="http://schemas.microsoft.com/office/drawing/2010/main">
+        <mc:Choice Requires="a14">
           <p:sp>
             <p:nvSpPr>
               <p:cNvPr id="30" name="TextBox 29"/>
@@ -3611,6 +5650,7 @@
               </a:bodyPr>
               <a:lstStyle/>
               <a:p>
+                <a:pPr/>
                 <a14:m>
                   <m:oMathPara xmlns:m="http://schemas.openxmlformats.org/officeDocument/2006/math">
                     <m:oMathParaPr>
@@ -3624,7 +5664,7 @@
                               <a:solidFill>
                                 <a:srgbClr val="FF0000"/>
                               </a:solidFill>
-                              <a:latin typeface="Cambria Math"/>
+                              <a:latin typeface="Cambria Math" panose="02040503050406030204" pitchFamily="18" charset="0"/>
                             </a:rPr>
                           </m:ctrlPr>
                         </m:sSubPr>
@@ -3708,7 +5748,7 @@
             </p:txBody>
           </p:sp>
         </mc:Choice>
-        <mc:Fallback>
+        <mc:Fallback xmlns="">
           <p:sp>
             <p:nvSpPr>
               <p:cNvPr id="30" name="TextBox 29"/>
@@ -3747,8 +5787,8 @@
           </p:sp>
         </mc:Fallback>
       </mc:AlternateContent>
-      <mc:AlternateContent xmlns:mc="http://schemas.openxmlformats.org/markup-compatibility/2006">
-        <mc:Choice xmlns:a14="http://schemas.microsoft.com/office/drawing/2010/main" Requires="a14">
+      <mc:AlternateContent xmlns:mc="http://schemas.openxmlformats.org/markup-compatibility/2006" xmlns:a14="http://schemas.microsoft.com/office/drawing/2010/main">
+        <mc:Choice Requires="a14">
           <p:sp>
             <p:nvSpPr>
               <p:cNvPr id="31" name="TextBox 30"/>
@@ -3771,6 +5811,7 @@
               </a:bodyPr>
               <a:lstStyle/>
               <a:p>
+                <a:pPr/>
                 <a14:m>
                   <m:oMathPara xmlns:m="http://schemas.openxmlformats.org/officeDocument/2006/math">
                     <m:oMathParaPr>
@@ -3784,7 +5825,7 @@
                               <a:solidFill>
                                 <a:schemeClr val="tx2"/>
                               </a:solidFill>
-                              <a:latin typeface="Cambria Math"/>
+                              <a:latin typeface="Cambria Math" panose="02040503050406030204" pitchFamily="18" charset="0"/>
                             </a:rPr>
                           </m:ctrlPr>
                         </m:sSubPr>
@@ -3868,7 +5909,7 @@
             </p:txBody>
           </p:sp>
         </mc:Choice>
-        <mc:Fallback>
+        <mc:Fallback xmlns="">
           <p:sp>
             <p:nvSpPr>
               <p:cNvPr id="31" name="TextBox 30"/>
@@ -3907,8 +5948,8 @@
           </p:sp>
         </mc:Fallback>
       </mc:AlternateContent>
-      <mc:AlternateContent xmlns:mc="http://schemas.openxmlformats.org/markup-compatibility/2006">
-        <mc:Choice xmlns:a14="http://schemas.microsoft.com/office/drawing/2010/main" Requires="a14">
+      <mc:AlternateContent xmlns:mc="http://schemas.openxmlformats.org/markup-compatibility/2006" xmlns:a14="http://schemas.microsoft.com/office/drawing/2010/main">
+        <mc:Choice Requires="a14">
           <p:sp>
             <p:nvSpPr>
               <p:cNvPr id="32" name="TextBox 31"/>
@@ -3931,6 +5972,7 @@
               </a:bodyPr>
               <a:lstStyle/>
               <a:p>
+                <a:pPr/>
                 <a14:m>
                   <m:oMathPara xmlns:m="http://schemas.openxmlformats.org/officeDocument/2006/math">
                     <m:oMathParaPr>
@@ -3958,7 +6000,7 @@
             </p:txBody>
           </p:sp>
         </mc:Choice>
-        <mc:Fallback>
+        <mc:Fallback xmlns="">
           <p:sp>
             <p:nvSpPr>
               <p:cNvPr id="32" name="TextBox 31"/>
@@ -3997,8 +6039,8 @@
           </p:sp>
         </mc:Fallback>
       </mc:AlternateContent>
-      <mc:AlternateContent xmlns:mc="http://schemas.openxmlformats.org/markup-compatibility/2006">
-        <mc:Choice xmlns:a14="http://schemas.microsoft.com/office/drawing/2010/main" Requires="a14">
+      <mc:AlternateContent xmlns:mc="http://schemas.openxmlformats.org/markup-compatibility/2006" xmlns:a14="http://schemas.microsoft.com/office/drawing/2010/main">
+        <mc:Choice Requires="a14">
           <p:sp>
             <p:nvSpPr>
               <p:cNvPr id="33" name="TextBox 32"/>
@@ -4021,6 +6063,7 @@
               </a:bodyPr>
               <a:lstStyle/>
               <a:p>
+                <a:pPr/>
                 <a14:m>
                   <m:oMathPara xmlns:m="http://schemas.openxmlformats.org/officeDocument/2006/math">
                     <m:oMathParaPr>
@@ -4048,7 +6091,7 @@
             </p:txBody>
           </p:sp>
         </mc:Choice>
-        <mc:Fallback>
+        <mc:Fallback xmlns="">
           <p:sp>
             <p:nvSpPr>
               <p:cNvPr id="33" name="TextBox 32"/>
@@ -4087,8 +6130,8 @@
           </p:sp>
         </mc:Fallback>
       </mc:AlternateContent>
-      <mc:AlternateContent xmlns:mc="http://schemas.openxmlformats.org/markup-compatibility/2006">
-        <mc:Choice xmlns:a14="http://schemas.microsoft.com/office/drawing/2010/main" Requires="a14">
+      <mc:AlternateContent xmlns:mc="http://schemas.openxmlformats.org/markup-compatibility/2006" xmlns:a14="http://schemas.microsoft.com/office/drawing/2010/main">
+        <mc:Choice Requires="a14">
           <p:sp>
             <p:nvSpPr>
               <p:cNvPr id="34" name="TextBox 33"/>
@@ -4111,6 +6154,7 @@
               </a:bodyPr>
               <a:lstStyle/>
               <a:p>
+                <a:pPr/>
                 <a14:m>
                   <m:oMathPara xmlns:m="http://schemas.openxmlformats.org/officeDocument/2006/math">
                     <m:oMathParaPr>
@@ -4138,7 +6182,7 @@
             </p:txBody>
           </p:sp>
         </mc:Choice>
-        <mc:Fallback>
+        <mc:Fallback xmlns="">
           <p:sp>
             <p:nvSpPr>
               <p:cNvPr id="34" name="TextBox 33"/>
@@ -4177,8 +6221,8 @@
           </p:sp>
         </mc:Fallback>
       </mc:AlternateContent>
-      <mc:AlternateContent xmlns:mc="http://schemas.openxmlformats.org/markup-compatibility/2006">
-        <mc:Choice xmlns:a14="http://schemas.microsoft.com/office/drawing/2010/main" Requires="a14">
+      <mc:AlternateContent xmlns:mc="http://schemas.openxmlformats.org/markup-compatibility/2006" xmlns:a14="http://schemas.microsoft.com/office/drawing/2010/main">
+        <mc:Choice Requires="a14">
           <p:sp>
             <p:nvSpPr>
               <p:cNvPr id="35" name="TextBox 34"/>
@@ -4201,6 +6245,7 @@
               </a:bodyPr>
               <a:lstStyle/>
               <a:p>
+                <a:pPr/>
                 <a14:m>
                   <m:oMathPara xmlns:m="http://schemas.openxmlformats.org/officeDocument/2006/math">
                     <m:oMathParaPr>
@@ -4228,7 +6273,7 @@
             </p:txBody>
           </p:sp>
         </mc:Choice>
-        <mc:Fallback>
+        <mc:Fallback xmlns="">
           <p:sp>
             <p:nvSpPr>
               <p:cNvPr id="35" name="TextBox 34"/>

</xml_diff>

<commit_message>
pic 6 upload (pic5에 해당하는 영상은 TODO로)
</commit_message>
<xml_diff>
--- a/pics/2020-08-23-divergence_theorem_3D/pics.pptx
+++ b/pics/2020-08-23-divergence_theorem_3D/pics.pptx
@@ -7,7 +7,8 @@
   <p:sldIdLst>
     <p:sldId id="257" r:id="rId2"/>
     <p:sldId id="258" r:id="rId3"/>
-    <p:sldId id="256" r:id="rId4"/>
+    <p:sldId id="259" r:id="rId4"/>
+    <p:sldId id="256" r:id="rId5"/>
   </p:sldIdLst>
   <p:sldSz cx="9144000" cy="6858000" type="screen4x3"/>
   <p:notesSz cx="6858000" cy="9144000"/>
@@ -108,7 +109,7 @@
   </p:defaultTextStyle>
   <p:extLst>
     <p:ext uri="{EFAFB233-063F-42B5-8137-9DF3F51BA10A}">
-      <p15:sldGuideLst xmlns:p15="http://schemas.microsoft.com/office/powerpoint/2012/main" xmlns="">
+      <p15:sldGuideLst xmlns="" xmlns:p15="http://schemas.microsoft.com/office/powerpoint/2012/main">
         <p15:guide id="1" orient="horz" pos="2160">
           <p15:clr>
             <a:srgbClr val="A4A3A4"/>
@@ -3037,7 +3038,7 @@
           <p:cNvPr id="10" name="그룹 9">
             <a:extLst>
               <a:ext uri="{FF2B5EF4-FFF2-40B4-BE49-F238E27FC236}">
-                <a16:creationId xmlns:a16="http://schemas.microsoft.com/office/drawing/2014/main" xmlns="" id="{2CF0DD8C-F195-4200-BAE8-18405280BC9B}"/>
+                <a16:creationId xmlns="" xmlns:a16="http://schemas.microsoft.com/office/drawing/2014/main" id="{2CF0DD8C-F195-4200-BAE8-18405280BC9B}"/>
               </a:ext>
             </a:extLst>
           </p:cNvPr>
@@ -3057,7 +3058,7 @@
             <p:cNvPr id="3" name="그룹 2">
               <a:extLst>
                 <a:ext uri="{FF2B5EF4-FFF2-40B4-BE49-F238E27FC236}">
-                  <a16:creationId xmlns:a16="http://schemas.microsoft.com/office/drawing/2014/main" xmlns="" id="{00F04A40-C8C6-457F-B502-30AFC3435853}"/>
+                  <a16:creationId xmlns="" xmlns:a16="http://schemas.microsoft.com/office/drawing/2014/main" id="{00F04A40-C8C6-457F-B502-30AFC3435853}"/>
                 </a:ext>
               </a:extLst>
             </p:cNvPr>
@@ -3077,7 +3078,7 @@
               <p:cNvPr id="4" name="정육면체 3">
                 <a:extLst>
                   <a:ext uri="{FF2B5EF4-FFF2-40B4-BE49-F238E27FC236}">
-                    <a16:creationId xmlns:a16="http://schemas.microsoft.com/office/drawing/2014/main" xmlns="" id="{79EABEC7-BBB9-4AF2-91EE-CDB9EFEB8A0C}"/>
+                    <a16:creationId xmlns="" xmlns:a16="http://schemas.microsoft.com/office/drawing/2014/main" id="{79EABEC7-BBB9-4AF2-91EE-CDB9EFEB8A0C}"/>
                   </a:ext>
                 </a:extLst>
               </p:cNvPr>
@@ -3124,7 +3125,7 @@
               <p:cNvPr id="6" name="직선 화살표 연결선 5">
                 <a:extLst>
                   <a:ext uri="{FF2B5EF4-FFF2-40B4-BE49-F238E27FC236}">
-                    <a16:creationId xmlns:a16="http://schemas.microsoft.com/office/drawing/2014/main" xmlns="" id="{97B66BE3-E845-41B7-8B0A-B78215A9A6C5}"/>
+                    <a16:creationId xmlns="" xmlns:a16="http://schemas.microsoft.com/office/drawing/2014/main" id="{97B66BE3-E845-41B7-8B0A-B78215A9A6C5}"/>
                   </a:ext>
                 </a:extLst>
               </p:cNvPr>
@@ -3168,7 +3169,7 @@
               <p:cNvPr id="7" name="직선 화살표 연결선 6">
                 <a:extLst>
                   <a:ext uri="{FF2B5EF4-FFF2-40B4-BE49-F238E27FC236}">
-                    <a16:creationId xmlns:a16="http://schemas.microsoft.com/office/drawing/2014/main" xmlns="" id="{B7982D56-2BD5-4F46-B4F4-934A9DEF7E5E}"/>
+                    <a16:creationId xmlns="" xmlns:a16="http://schemas.microsoft.com/office/drawing/2014/main" id="{B7982D56-2BD5-4F46-B4F4-934A9DEF7E5E}"/>
                   </a:ext>
                 </a:extLst>
               </p:cNvPr>
@@ -3212,7 +3213,7 @@
               <p:cNvPr id="9" name="직선 화살표 연결선 8">
                 <a:extLst>
                   <a:ext uri="{FF2B5EF4-FFF2-40B4-BE49-F238E27FC236}">
-                    <a16:creationId xmlns:a16="http://schemas.microsoft.com/office/drawing/2014/main" xmlns="" id="{28E9CB2E-D9C8-4F6A-A8AA-DC9CA5007914}"/>
+                    <a16:creationId xmlns="" xmlns:a16="http://schemas.microsoft.com/office/drawing/2014/main" id="{28E9CB2E-D9C8-4F6A-A8AA-DC9CA5007914}"/>
                   </a:ext>
                 </a:extLst>
               </p:cNvPr>
@@ -3258,7 +3259,7 @@
                   <p:cNvPr id="17" name="TextBox 16">
                     <a:extLst>
                       <a:ext uri="{FF2B5EF4-FFF2-40B4-BE49-F238E27FC236}">
-                        <a16:creationId xmlns:a16="http://schemas.microsoft.com/office/drawing/2014/main" xmlns="" id="{192A37FC-F5F8-4CE6-BE69-2720A1572F41}"/>
+                        <a16:creationId xmlns="" xmlns:a16="http://schemas.microsoft.com/office/drawing/2014/main" id="{192A37FC-F5F8-4CE6-BE69-2720A1572F41}"/>
                       </a:ext>
                     </a:extLst>
                   </p:cNvPr>
@@ -3354,7 +3355,7 @@
                   <p:cNvPr id="18" name="TextBox 17">
                     <a:extLst>
                       <a:ext uri="{FF2B5EF4-FFF2-40B4-BE49-F238E27FC236}">
-                        <a16:creationId xmlns:a16="http://schemas.microsoft.com/office/drawing/2014/main" xmlns="" id="{B3972BF5-318E-42E3-8C00-75E3D174F36F}"/>
+                        <a16:creationId xmlns="" xmlns:a16="http://schemas.microsoft.com/office/drawing/2014/main" id="{B3972BF5-318E-42E3-8C00-75E3D174F36F}"/>
                       </a:ext>
                     </a:extLst>
                   </p:cNvPr>
@@ -3450,7 +3451,7 @@
                   <p:cNvPr id="19" name="TextBox 18">
                     <a:extLst>
                       <a:ext uri="{FF2B5EF4-FFF2-40B4-BE49-F238E27FC236}">
-                        <a16:creationId xmlns:a16="http://schemas.microsoft.com/office/drawing/2014/main" xmlns="" id="{873AF83E-4828-4515-93D3-1FAE2BBF7EE0}"/>
+                        <a16:creationId xmlns="" xmlns:a16="http://schemas.microsoft.com/office/drawing/2014/main" id="{873AF83E-4828-4515-93D3-1FAE2BBF7EE0}"/>
                       </a:ext>
                     </a:extLst>
                   </p:cNvPr>
@@ -3544,7 +3545,7 @@
               <p:cNvPr id="20" name="직사각형 19">
                 <a:extLst>
                   <a:ext uri="{FF2B5EF4-FFF2-40B4-BE49-F238E27FC236}">
-                    <a16:creationId xmlns:a16="http://schemas.microsoft.com/office/drawing/2014/main" xmlns="" id="{73FE66E7-7D25-4A40-9C9B-1419F7833F74}"/>
+                    <a16:creationId xmlns="" xmlns:a16="http://schemas.microsoft.com/office/drawing/2014/main" id="{73FE66E7-7D25-4A40-9C9B-1419F7833F74}"/>
                   </a:ext>
                 </a:extLst>
               </p:cNvPr>
@@ -3598,7 +3599,7 @@
               <p:cNvPr id="21" name="직사각형 20">
                 <a:extLst>
                   <a:ext uri="{FF2B5EF4-FFF2-40B4-BE49-F238E27FC236}">
-                    <a16:creationId xmlns:a16="http://schemas.microsoft.com/office/drawing/2014/main" xmlns="" id="{BB74164F-B477-4FDE-B59B-41336F7C5864}"/>
+                    <a16:creationId xmlns="" xmlns:a16="http://schemas.microsoft.com/office/drawing/2014/main" id="{BB74164F-B477-4FDE-B59B-41336F7C5864}"/>
                   </a:ext>
                 </a:extLst>
               </p:cNvPr>
@@ -3653,7 +3654,7 @@
             <p:cNvPr id="5" name="그룹 4">
               <a:extLst>
                 <a:ext uri="{FF2B5EF4-FFF2-40B4-BE49-F238E27FC236}">
-                  <a16:creationId xmlns:a16="http://schemas.microsoft.com/office/drawing/2014/main" xmlns="" id="{84E3DD46-AD25-49B2-BE94-48B471590B44}"/>
+                  <a16:creationId xmlns="" xmlns:a16="http://schemas.microsoft.com/office/drawing/2014/main" id="{84E3DD46-AD25-49B2-BE94-48B471590B44}"/>
                 </a:ext>
               </a:extLst>
             </p:cNvPr>
@@ -3673,7 +3674,7 @@
               <p:cNvPr id="33" name="정육면체 32">
                 <a:extLst>
                   <a:ext uri="{FF2B5EF4-FFF2-40B4-BE49-F238E27FC236}">
-                    <a16:creationId xmlns:a16="http://schemas.microsoft.com/office/drawing/2014/main" xmlns="" id="{BB4BA1F1-6D30-4D42-9798-EDFC8B29CBD9}"/>
+                    <a16:creationId xmlns="" xmlns:a16="http://schemas.microsoft.com/office/drawing/2014/main" id="{BB4BA1F1-6D30-4D42-9798-EDFC8B29CBD9}"/>
                   </a:ext>
                 </a:extLst>
               </p:cNvPr>
@@ -3720,7 +3721,7 @@
               <p:cNvPr id="34" name="직선 화살표 연결선 33">
                 <a:extLst>
                   <a:ext uri="{FF2B5EF4-FFF2-40B4-BE49-F238E27FC236}">
-                    <a16:creationId xmlns:a16="http://schemas.microsoft.com/office/drawing/2014/main" xmlns="" id="{581C093B-6ADB-47B1-BD7D-9E723EADC660}"/>
+                    <a16:creationId xmlns="" xmlns:a16="http://schemas.microsoft.com/office/drawing/2014/main" id="{581C093B-6ADB-47B1-BD7D-9E723EADC660}"/>
                   </a:ext>
                 </a:extLst>
               </p:cNvPr>
@@ -3764,7 +3765,7 @@
               <p:cNvPr id="35" name="직선 화살표 연결선 34">
                 <a:extLst>
                   <a:ext uri="{FF2B5EF4-FFF2-40B4-BE49-F238E27FC236}">
-                    <a16:creationId xmlns:a16="http://schemas.microsoft.com/office/drawing/2014/main" xmlns="" id="{1F419E52-4105-45EA-B5B1-AF95CC330E3A}"/>
+                    <a16:creationId xmlns="" xmlns:a16="http://schemas.microsoft.com/office/drawing/2014/main" id="{1F419E52-4105-45EA-B5B1-AF95CC330E3A}"/>
                   </a:ext>
                 </a:extLst>
               </p:cNvPr>
@@ -3808,7 +3809,7 @@
               <p:cNvPr id="36" name="직선 화살표 연결선 35">
                 <a:extLst>
                   <a:ext uri="{FF2B5EF4-FFF2-40B4-BE49-F238E27FC236}">
-                    <a16:creationId xmlns:a16="http://schemas.microsoft.com/office/drawing/2014/main" xmlns="" id="{B3451782-A8D3-432F-A0C4-0BCE41597CF1}"/>
+                    <a16:creationId xmlns="" xmlns:a16="http://schemas.microsoft.com/office/drawing/2014/main" id="{B3451782-A8D3-432F-A0C4-0BCE41597CF1}"/>
                   </a:ext>
                 </a:extLst>
               </p:cNvPr>
@@ -3854,7 +3855,7 @@
                   <p:cNvPr id="37" name="TextBox 36">
                     <a:extLst>
                       <a:ext uri="{FF2B5EF4-FFF2-40B4-BE49-F238E27FC236}">
-                        <a16:creationId xmlns:a16="http://schemas.microsoft.com/office/drawing/2014/main" xmlns="" id="{A5B2D496-0AE7-4F5A-82B5-FF3EA656A24C}"/>
+                        <a16:creationId xmlns="" xmlns:a16="http://schemas.microsoft.com/office/drawing/2014/main" id="{A5B2D496-0AE7-4F5A-82B5-FF3EA656A24C}"/>
                       </a:ext>
                     </a:extLst>
                   </p:cNvPr>
@@ -3950,7 +3951,7 @@
                   <p:cNvPr id="38" name="TextBox 37">
                     <a:extLst>
                       <a:ext uri="{FF2B5EF4-FFF2-40B4-BE49-F238E27FC236}">
-                        <a16:creationId xmlns:a16="http://schemas.microsoft.com/office/drawing/2014/main" xmlns="" id="{34206E17-8F44-49AA-8B1B-FDCA46BB027A}"/>
+                        <a16:creationId xmlns="" xmlns:a16="http://schemas.microsoft.com/office/drawing/2014/main" id="{34206E17-8F44-49AA-8B1B-FDCA46BB027A}"/>
                       </a:ext>
                     </a:extLst>
                   </p:cNvPr>
@@ -4046,7 +4047,7 @@
                   <p:cNvPr id="39" name="TextBox 38">
                     <a:extLst>
                       <a:ext uri="{FF2B5EF4-FFF2-40B4-BE49-F238E27FC236}">
-                        <a16:creationId xmlns:a16="http://schemas.microsoft.com/office/drawing/2014/main" xmlns="" id="{52297665-65FE-4A79-B2B1-8E5381AEA4B1}"/>
+                        <a16:creationId xmlns="" xmlns:a16="http://schemas.microsoft.com/office/drawing/2014/main" id="{52297665-65FE-4A79-B2B1-8E5381AEA4B1}"/>
                       </a:ext>
                     </a:extLst>
                   </p:cNvPr>
@@ -4140,7 +4141,7 @@
               <p:cNvPr id="42" name="자유형: 도형 41">
                 <a:extLst>
                   <a:ext uri="{FF2B5EF4-FFF2-40B4-BE49-F238E27FC236}">
-                    <a16:creationId xmlns:a16="http://schemas.microsoft.com/office/drawing/2014/main" xmlns="" id="{EE9DD656-E6E3-4D71-B4E3-229E6500DEAD}"/>
+                    <a16:creationId xmlns="" xmlns:a16="http://schemas.microsoft.com/office/drawing/2014/main" id="{EE9DD656-E6E3-4D71-B4E3-229E6500DEAD}"/>
                   </a:ext>
                 </a:extLst>
               </p:cNvPr>
@@ -4245,7 +4246,7 @@
               <p:cNvPr id="22" name="자유형: 도형 21">
                 <a:extLst>
                   <a:ext uri="{FF2B5EF4-FFF2-40B4-BE49-F238E27FC236}">
-                    <a16:creationId xmlns:a16="http://schemas.microsoft.com/office/drawing/2014/main" xmlns="" id="{C149BC22-E957-46EA-8F98-2C47CC8325B1}"/>
+                    <a16:creationId xmlns="" xmlns:a16="http://schemas.microsoft.com/office/drawing/2014/main" id="{C149BC22-E957-46EA-8F98-2C47CC8325B1}"/>
                   </a:ext>
                 </a:extLst>
               </p:cNvPr>
@@ -4351,7 +4352,7 @@
             <p:cNvPr id="8" name="그룹 7">
               <a:extLst>
                 <a:ext uri="{FF2B5EF4-FFF2-40B4-BE49-F238E27FC236}">
-                  <a16:creationId xmlns:a16="http://schemas.microsoft.com/office/drawing/2014/main" xmlns="" id="{424D334D-595E-484B-BB87-F925354CA244}"/>
+                  <a16:creationId xmlns="" xmlns:a16="http://schemas.microsoft.com/office/drawing/2014/main" id="{424D334D-595E-484B-BB87-F925354CA244}"/>
                 </a:ext>
               </a:extLst>
             </p:cNvPr>
@@ -4371,7 +4372,7 @@
               <p:cNvPr id="23" name="정육면체 22">
                 <a:extLst>
                   <a:ext uri="{FF2B5EF4-FFF2-40B4-BE49-F238E27FC236}">
-                    <a16:creationId xmlns:a16="http://schemas.microsoft.com/office/drawing/2014/main" xmlns="" id="{FEC80E16-9C4B-4DEA-A4DA-3341AFFF5DEB}"/>
+                    <a16:creationId xmlns="" xmlns:a16="http://schemas.microsoft.com/office/drawing/2014/main" id="{FEC80E16-9C4B-4DEA-A4DA-3341AFFF5DEB}"/>
                   </a:ext>
                 </a:extLst>
               </p:cNvPr>
@@ -4418,7 +4419,7 @@
               <p:cNvPr id="24" name="직선 화살표 연결선 23">
                 <a:extLst>
                   <a:ext uri="{FF2B5EF4-FFF2-40B4-BE49-F238E27FC236}">
-                    <a16:creationId xmlns:a16="http://schemas.microsoft.com/office/drawing/2014/main" xmlns="" id="{06A3A62D-67D3-4F94-81FF-37CAD31525D3}"/>
+                    <a16:creationId xmlns="" xmlns:a16="http://schemas.microsoft.com/office/drawing/2014/main" id="{06A3A62D-67D3-4F94-81FF-37CAD31525D3}"/>
                   </a:ext>
                 </a:extLst>
               </p:cNvPr>
@@ -4462,7 +4463,7 @@
               <p:cNvPr id="25" name="직선 화살표 연결선 24">
                 <a:extLst>
                   <a:ext uri="{FF2B5EF4-FFF2-40B4-BE49-F238E27FC236}">
-                    <a16:creationId xmlns:a16="http://schemas.microsoft.com/office/drawing/2014/main" xmlns="" id="{3CEE1469-2880-4506-9E7B-2BB74359456A}"/>
+                    <a16:creationId xmlns="" xmlns:a16="http://schemas.microsoft.com/office/drawing/2014/main" id="{3CEE1469-2880-4506-9E7B-2BB74359456A}"/>
                   </a:ext>
                 </a:extLst>
               </p:cNvPr>
@@ -4506,7 +4507,7 @@
               <p:cNvPr id="26" name="직선 화살표 연결선 25">
                 <a:extLst>
                   <a:ext uri="{FF2B5EF4-FFF2-40B4-BE49-F238E27FC236}">
-                    <a16:creationId xmlns:a16="http://schemas.microsoft.com/office/drawing/2014/main" xmlns="" id="{6E19C15A-1A3D-4165-A509-573282343790}"/>
+                    <a16:creationId xmlns="" xmlns:a16="http://schemas.microsoft.com/office/drawing/2014/main" id="{6E19C15A-1A3D-4165-A509-573282343790}"/>
                   </a:ext>
                 </a:extLst>
               </p:cNvPr>
@@ -4552,7 +4553,7 @@
                   <p:cNvPr id="27" name="TextBox 26">
                     <a:extLst>
                       <a:ext uri="{FF2B5EF4-FFF2-40B4-BE49-F238E27FC236}">
-                        <a16:creationId xmlns:a16="http://schemas.microsoft.com/office/drawing/2014/main" xmlns="" id="{9EE8B88F-3BBE-460B-8C31-24B3873FC655}"/>
+                        <a16:creationId xmlns="" xmlns:a16="http://schemas.microsoft.com/office/drawing/2014/main" id="{9EE8B88F-3BBE-460B-8C31-24B3873FC655}"/>
                       </a:ext>
                     </a:extLst>
                   </p:cNvPr>
@@ -4648,7 +4649,7 @@
                   <p:cNvPr id="28" name="TextBox 27">
                     <a:extLst>
                       <a:ext uri="{FF2B5EF4-FFF2-40B4-BE49-F238E27FC236}">
-                        <a16:creationId xmlns:a16="http://schemas.microsoft.com/office/drawing/2014/main" xmlns="" id="{2ECAAD22-C39F-4D7E-959E-57A4A5A0BB1C}"/>
+                        <a16:creationId xmlns="" xmlns:a16="http://schemas.microsoft.com/office/drawing/2014/main" id="{2ECAAD22-C39F-4D7E-959E-57A4A5A0BB1C}"/>
                       </a:ext>
                     </a:extLst>
                   </p:cNvPr>
@@ -4744,7 +4745,7 @@
                   <p:cNvPr id="29" name="TextBox 28">
                     <a:extLst>
                       <a:ext uri="{FF2B5EF4-FFF2-40B4-BE49-F238E27FC236}">
-                        <a16:creationId xmlns:a16="http://schemas.microsoft.com/office/drawing/2014/main" xmlns="" id="{8161E73D-94FC-4DB1-8C3B-A1FCA2ED9B1F}"/>
+                        <a16:creationId xmlns="" xmlns:a16="http://schemas.microsoft.com/office/drawing/2014/main" id="{8161E73D-94FC-4DB1-8C3B-A1FCA2ED9B1F}"/>
                       </a:ext>
                     </a:extLst>
                   </p:cNvPr>
@@ -4838,7 +4839,7 @@
               <p:cNvPr id="2" name="자유형: 도형 1">
                 <a:extLst>
                   <a:ext uri="{FF2B5EF4-FFF2-40B4-BE49-F238E27FC236}">
-                    <a16:creationId xmlns:a16="http://schemas.microsoft.com/office/drawing/2014/main" xmlns="" id="{BA901E2E-2172-4045-A95C-5817BF8D6397}"/>
+                    <a16:creationId xmlns="" xmlns:a16="http://schemas.microsoft.com/office/drawing/2014/main" id="{BA901E2E-2172-4045-A95C-5817BF8D6397}"/>
                   </a:ext>
                 </a:extLst>
               </p:cNvPr>
@@ -4943,7 +4944,7 @@
               <p:cNvPr id="32" name="자유형: 도형 31">
                 <a:extLst>
                   <a:ext uri="{FF2B5EF4-FFF2-40B4-BE49-F238E27FC236}">
-                    <a16:creationId xmlns:a16="http://schemas.microsoft.com/office/drawing/2014/main" xmlns="" id="{A1789C5E-4D61-4A21-8693-FABFFB8A5EB8}"/>
+                    <a16:creationId xmlns="" xmlns:a16="http://schemas.microsoft.com/office/drawing/2014/main" id="{A1789C5E-4D61-4A21-8693-FABFFB8A5EB8}"/>
                   </a:ext>
                 </a:extLst>
               </p:cNvPr>
@@ -5080,7 +5081,7 @@
           <p:cNvPr id="34" name="직선 화살표 연결선 33">
             <a:extLst>
               <a:ext uri="{FF2B5EF4-FFF2-40B4-BE49-F238E27FC236}">
-                <a16:creationId xmlns:a16="http://schemas.microsoft.com/office/drawing/2014/main" xmlns="" id="{581C093B-6ADB-47B1-BD7D-9E723EADC660}"/>
+                <a16:creationId xmlns="" xmlns:a16="http://schemas.microsoft.com/office/drawing/2014/main" id="{581C093B-6ADB-47B1-BD7D-9E723EADC660}"/>
               </a:ext>
             </a:extLst>
           </p:cNvPr>
@@ -5124,7 +5125,7 @@
           <p:cNvPr id="35" name="직선 화살표 연결선 34">
             <a:extLst>
               <a:ext uri="{FF2B5EF4-FFF2-40B4-BE49-F238E27FC236}">
-                <a16:creationId xmlns:a16="http://schemas.microsoft.com/office/drawing/2014/main" xmlns="" id="{1F419E52-4105-45EA-B5B1-AF95CC330E3A}"/>
+                <a16:creationId xmlns="" xmlns:a16="http://schemas.microsoft.com/office/drawing/2014/main" id="{1F419E52-4105-45EA-B5B1-AF95CC330E3A}"/>
               </a:ext>
             </a:extLst>
           </p:cNvPr>
@@ -5168,7 +5169,7 @@
           <p:cNvPr id="36" name="직선 화살표 연결선 35">
             <a:extLst>
               <a:ext uri="{FF2B5EF4-FFF2-40B4-BE49-F238E27FC236}">
-                <a16:creationId xmlns:a16="http://schemas.microsoft.com/office/drawing/2014/main" xmlns="" id="{B3451782-A8D3-432F-A0C4-0BCE41597CF1}"/>
+                <a16:creationId xmlns="" xmlns:a16="http://schemas.microsoft.com/office/drawing/2014/main" id="{B3451782-A8D3-432F-A0C4-0BCE41597CF1}"/>
               </a:ext>
             </a:extLst>
           </p:cNvPr>
@@ -5207,14 +5208,14 @@
           </a:fontRef>
         </p:style>
       </p:cxnSp>
-      <mc:AlternateContent xmlns:mc="http://schemas.openxmlformats.org/markup-compatibility/2006">
-        <mc:Choice xmlns:a14="http://schemas.microsoft.com/office/drawing/2010/main" Requires="a14">
+      <mc:AlternateContent xmlns:mc="http://schemas.openxmlformats.org/markup-compatibility/2006" xmlns:a14="http://schemas.microsoft.com/office/drawing/2010/main">
+        <mc:Choice Requires="a14">
           <p:sp>
             <p:nvSpPr>
               <p:cNvPr id="37" name="TextBox 36">
                 <a:extLst>
                   <a:ext uri="{FF2B5EF4-FFF2-40B4-BE49-F238E27FC236}">
-                    <a16:creationId xmlns:a16="http://schemas.microsoft.com/office/drawing/2014/main" xmlns="" id="{A5B2D496-0AE7-4F5A-82B5-FF3EA656A24C}"/>
+                    <a16:creationId xmlns="" xmlns:a16="http://schemas.microsoft.com/office/drawing/2014/main" id="{A5B2D496-0AE7-4F5A-82B5-FF3EA656A24C}"/>
                   </a:ext>
                 </a:extLst>
               </p:cNvPr>
@@ -5258,7 +5259,7 @@
             </p:txBody>
           </p:sp>
         </mc:Choice>
-        <mc:Fallback>
+        <mc:Fallback xmlns="">
           <p:sp>
             <p:nvSpPr>
               <p:cNvPr id="37" name="TextBox 36">
@@ -5303,14 +5304,14 @@
           </p:sp>
         </mc:Fallback>
       </mc:AlternateContent>
-      <mc:AlternateContent xmlns:mc="http://schemas.openxmlformats.org/markup-compatibility/2006">
-        <mc:Choice xmlns:a14="http://schemas.microsoft.com/office/drawing/2010/main" Requires="a14">
+      <mc:AlternateContent xmlns:mc="http://schemas.openxmlformats.org/markup-compatibility/2006" xmlns:a14="http://schemas.microsoft.com/office/drawing/2010/main">
+        <mc:Choice Requires="a14">
           <p:sp>
             <p:nvSpPr>
               <p:cNvPr id="38" name="TextBox 37">
                 <a:extLst>
                   <a:ext uri="{FF2B5EF4-FFF2-40B4-BE49-F238E27FC236}">
-                    <a16:creationId xmlns:a16="http://schemas.microsoft.com/office/drawing/2014/main" xmlns="" id="{34206E17-8F44-49AA-8B1B-FDCA46BB027A}"/>
+                    <a16:creationId xmlns="" xmlns:a16="http://schemas.microsoft.com/office/drawing/2014/main" id="{34206E17-8F44-49AA-8B1B-FDCA46BB027A}"/>
                   </a:ext>
                 </a:extLst>
               </p:cNvPr>
@@ -5354,7 +5355,7 @@
             </p:txBody>
           </p:sp>
         </mc:Choice>
-        <mc:Fallback>
+        <mc:Fallback xmlns="">
           <p:sp>
             <p:nvSpPr>
               <p:cNvPr id="38" name="TextBox 37">
@@ -5399,14 +5400,14 @@
           </p:sp>
         </mc:Fallback>
       </mc:AlternateContent>
-      <mc:AlternateContent xmlns:mc="http://schemas.openxmlformats.org/markup-compatibility/2006">
-        <mc:Choice xmlns:a14="http://schemas.microsoft.com/office/drawing/2010/main" Requires="a14">
+      <mc:AlternateContent xmlns:mc="http://schemas.openxmlformats.org/markup-compatibility/2006" xmlns:a14="http://schemas.microsoft.com/office/drawing/2010/main">
+        <mc:Choice Requires="a14">
           <p:sp>
             <p:nvSpPr>
               <p:cNvPr id="39" name="TextBox 38">
                 <a:extLst>
                   <a:ext uri="{FF2B5EF4-FFF2-40B4-BE49-F238E27FC236}">
-                    <a16:creationId xmlns:a16="http://schemas.microsoft.com/office/drawing/2014/main" xmlns="" id="{52297665-65FE-4A79-B2B1-8E5381AEA4B1}"/>
+                    <a16:creationId xmlns="" xmlns:a16="http://schemas.microsoft.com/office/drawing/2014/main" id="{52297665-65FE-4A79-B2B1-8E5381AEA4B1}"/>
                   </a:ext>
                 </a:extLst>
               </p:cNvPr>
@@ -5450,7 +5451,7 @@
             </p:txBody>
           </p:sp>
         </mc:Choice>
-        <mc:Fallback>
+        <mc:Fallback xmlns="">
           <p:sp>
             <p:nvSpPr>
               <p:cNvPr id="39" name="TextBox 38">
@@ -5500,7 +5501,7 @@
           <p:cNvPr id="42" name="자유형: 도형 41">
             <a:extLst>
               <a:ext uri="{FF2B5EF4-FFF2-40B4-BE49-F238E27FC236}">
-                <a16:creationId xmlns:a16="http://schemas.microsoft.com/office/drawing/2014/main" xmlns="" id="{EE9DD656-E6E3-4D71-B4E3-229E6500DEAD}"/>
+                <a16:creationId xmlns="" xmlns:a16="http://schemas.microsoft.com/office/drawing/2014/main" id="{EE9DD656-E6E3-4D71-B4E3-229E6500DEAD}"/>
               </a:ext>
             </a:extLst>
           </p:cNvPr>
@@ -5605,7 +5606,7 @@
           <p:cNvPr id="22" name="자유형: 도형 21">
             <a:extLst>
               <a:ext uri="{FF2B5EF4-FFF2-40B4-BE49-F238E27FC236}">
-                <a16:creationId xmlns:a16="http://schemas.microsoft.com/office/drawing/2014/main" xmlns="" id="{C149BC22-E957-46EA-8F98-2C47CC8325B1}"/>
+                <a16:creationId xmlns="" xmlns:a16="http://schemas.microsoft.com/office/drawing/2014/main" id="{C149BC22-E957-46EA-8F98-2C47CC8325B1}"/>
               </a:ext>
             </a:extLst>
           </p:cNvPr>
@@ -5710,7 +5711,7 @@
           <p:cNvPr id="45" name="자유형: 도형 44">
             <a:extLst>
               <a:ext uri="{FF2B5EF4-FFF2-40B4-BE49-F238E27FC236}">
-                <a16:creationId xmlns:a16="http://schemas.microsoft.com/office/drawing/2014/main" xmlns="" id="{6B4EDD9E-2815-496C-BC1B-E28FDF6A33C1}"/>
+                <a16:creationId xmlns="" xmlns:a16="http://schemas.microsoft.com/office/drawing/2014/main" id="{6B4EDD9E-2815-496C-BC1B-E28FDF6A33C1}"/>
               </a:ext>
             </a:extLst>
           </p:cNvPr>
@@ -5815,7 +5816,7 @@
           <p:cNvPr id="33" name="정육면체 32">
             <a:extLst>
               <a:ext uri="{FF2B5EF4-FFF2-40B4-BE49-F238E27FC236}">
-                <a16:creationId xmlns:a16="http://schemas.microsoft.com/office/drawing/2014/main" xmlns="" id="{BB4BA1F1-6D30-4D42-9798-EDFC8B29CBD9}"/>
+                <a16:creationId xmlns="" xmlns:a16="http://schemas.microsoft.com/office/drawing/2014/main" id="{BB4BA1F1-6D30-4D42-9798-EDFC8B29CBD9}"/>
               </a:ext>
             </a:extLst>
           </p:cNvPr>
@@ -5862,7 +5863,7 @@
           <p:cNvPr id="40" name="직선 화살표 연결선 39">
             <a:extLst>
               <a:ext uri="{FF2B5EF4-FFF2-40B4-BE49-F238E27FC236}">
-                <a16:creationId xmlns:a16="http://schemas.microsoft.com/office/drawing/2014/main" xmlns="" id="{706DAAA9-F59A-40C1-B6A2-E0394CE84EF2}"/>
+                <a16:creationId xmlns="" xmlns:a16="http://schemas.microsoft.com/office/drawing/2014/main" id="{706DAAA9-F59A-40C1-B6A2-E0394CE84EF2}"/>
               </a:ext>
             </a:extLst>
           </p:cNvPr>
@@ -5901,14 +5902,14 @@
           </a:fontRef>
         </p:style>
       </p:cxnSp>
-      <mc:AlternateContent xmlns:mc="http://schemas.openxmlformats.org/markup-compatibility/2006">
-        <mc:Choice xmlns:a14="http://schemas.microsoft.com/office/drawing/2010/main" Requires="a14">
+      <mc:AlternateContent xmlns:mc="http://schemas.openxmlformats.org/markup-compatibility/2006" xmlns:a14="http://schemas.microsoft.com/office/drawing/2010/main">
+        <mc:Choice Requires="a14">
           <p:sp>
             <p:nvSpPr>
               <p:cNvPr id="41" name="TextBox 40">
                 <a:extLst>
                   <a:ext uri="{FF2B5EF4-FFF2-40B4-BE49-F238E27FC236}">
-                    <a16:creationId xmlns:a16="http://schemas.microsoft.com/office/drawing/2014/main" xmlns="" id="{083334AD-CE2F-43DD-BEFF-ECA67F9062BC}"/>
+                    <a16:creationId xmlns="" xmlns:a16="http://schemas.microsoft.com/office/drawing/2014/main" id="{083334AD-CE2F-43DD-BEFF-ECA67F9062BC}"/>
                   </a:ext>
                 </a:extLst>
               </p:cNvPr>
@@ -5952,7 +5953,7 @@
             </p:txBody>
           </p:sp>
         </mc:Choice>
-        <mc:Fallback>
+        <mc:Fallback xmlns="">
           <p:sp>
             <p:nvSpPr>
               <p:cNvPr id="41" name="TextBox 40">
@@ -6002,7 +6003,7 @@
           <p:cNvPr id="43" name="직선 화살표 연결선 42">
             <a:extLst>
               <a:ext uri="{FF2B5EF4-FFF2-40B4-BE49-F238E27FC236}">
-                <a16:creationId xmlns:a16="http://schemas.microsoft.com/office/drawing/2014/main" xmlns="" id="{3FAC8454-190E-4E23-9791-FA3DDA612AC2}"/>
+                <a16:creationId xmlns="" xmlns:a16="http://schemas.microsoft.com/office/drawing/2014/main" id="{3FAC8454-190E-4E23-9791-FA3DDA612AC2}"/>
               </a:ext>
             </a:extLst>
           </p:cNvPr>
@@ -6041,14 +6042,14 @@
           </a:fontRef>
         </p:style>
       </p:cxnSp>
-      <mc:AlternateContent xmlns:mc="http://schemas.openxmlformats.org/markup-compatibility/2006">
-        <mc:Choice xmlns:a14="http://schemas.microsoft.com/office/drawing/2010/main" Requires="a14">
+      <mc:AlternateContent xmlns:mc="http://schemas.openxmlformats.org/markup-compatibility/2006" xmlns:a14="http://schemas.microsoft.com/office/drawing/2010/main">
+        <mc:Choice Requires="a14">
           <p:sp>
             <p:nvSpPr>
               <p:cNvPr id="44" name="TextBox 43">
                 <a:extLst>
                   <a:ext uri="{FF2B5EF4-FFF2-40B4-BE49-F238E27FC236}">
-                    <a16:creationId xmlns:a16="http://schemas.microsoft.com/office/drawing/2014/main" xmlns="" id="{7E13409B-B9F0-47B1-9090-4210ACB450B5}"/>
+                    <a16:creationId xmlns="" xmlns:a16="http://schemas.microsoft.com/office/drawing/2014/main" id="{7E13409B-B9F0-47B1-9090-4210ACB450B5}"/>
                   </a:ext>
                 </a:extLst>
               </p:cNvPr>
@@ -6092,7 +6093,7 @@
             </p:txBody>
           </p:sp>
         </mc:Choice>
-        <mc:Fallback>
+        <mc:Fallback xmlns="">
           <p:sp>
             <p:nvSpPr>
               <p:cNvPr id="44" name="TextBox 43">
@@ -6142,7 +6143,7 @@
           <p:cNvPr id="13" name="직사각형 12">
             <a:extLst>
               <a:ext uri="{FF2B5EF4-FFF2-40B4-BE49-F238E27FC236}">
-                <a16:creationId xmlns:a16="http://schemas.microsoft.com/office/drawing/2014/main" xmlns="" id="{1A67DD87-3044-406F-8EB5-98DE69D8BBB9}"/>
+                <a16:creationId xmlns="" xmlns:a16="http://schemas.microsoft.com/office/drawing/2014/main" id="{1A67DD87-3044-406F-8EB5-98DE69D8BBB9}"/>
               </a:ext>
             </a:extLst>
           </p:cNvPr>
@@ -6194,7 +6195,7 @@
           <p:cNvPr id="15" name="직선 연결선 14">
             <a:extLst>
               <a:ext uri="{FF2B5EF4-FFF2-40B4-BE49-F238E27FC236}">
-                <a16:creationId xmlns:a16="http://schemas.microsoft.com/office/drawing/2014/main" xmlns="" id="{E49FE921-22E1-459E-801B-623A4E640F5C}"/>
+                <a16:creationId xmlns="" xmlns:a16="http://schemas.microsoft.com/office/drawing/2014/main" id="{E49FE921-22E1-459E-801B-623A4E640F5C}"/>
               </a:ext>
             </a:extLst>
           </p:cNvPr>
@@ -6235,7 +6236,7 @@
           <p:cNvPr id="46" name="직선 연결선 45">
             <a:extLst>
               <a:ext uri="{FF2B5EF4-FFF2-40B4-BE49-F238E27FC236}">
-                <a16:creationId xmlns:a16="http://schemas.microsoft.com/office/drawing/2014/main" xmlns="" id="{6958972E-5AB2-4564-BD86-289280003A80}"/>
+                <a16:creationId xmlns="" xmlns:a16="http://schemas.microsoft.com/office/drawing/2014/main" id="{6958972E-5AB2-4564-BD86-289280003A80}"/>
               </a:ext>
             </a:extLst>
           </p:cNvPr>
@@ -6276,7 +6277,7 @@
           <p:cNvPr id="47" name="직선 연결선 46">
             <a:extLst>
               <a:ext uri="{FF2B5EF4-FFF2-40B4-BE49-F238E27FC236}">
-                <a16:creationId xmlns:a16="http://schemas.microsoft.com/office/drawing/2014/main" xmlns="" id="{B076CBE9-2464-4DDF-BB08-D17B16179956}"/>
+                <a16:creationId xmlns="" xmlns:a16="http://schemas.microsoft.com/office/drawing/2014/main" id="{B076CBE9-2464-4DDF-BB08-D17B16179956}"/>
               </a:ext>
             </a:extLst>
           </p:cNvPr>
@@ -6687,8 +6688,8 @@
           </a:p>
         </p:txBody>
       </p:sp>
-      <mc:AlternateContent xmlns:mc="http://schemas.openxmlformats.org/markup-compatibility/2006">
-        <mc:Choice xmlns:a14="http://schemas.microsoft.com/office/drawing/2010/main" Requires="a14">
+      <mc:AlternateContent xmlns:mc="http://schemas.openxmlformats.org/markup-compatibility/2006" xmlns:a14="http://schemas.microsoft.com/office/drawing/2010/main">
+        <mc:Choice Requires="a14">
           <p:sp>
             <p:nvSpPr>
               <p:cNvPr id="10" name="TextBox 9"/>
@@ -6731,7 +6732,7 @@
             </p:txBody>
           </p:sp>
         </mc:Choice>
-        <mc:Fallback>
+        <mc:Fallback xmlns="">
           <p:sp>
             <p:nvSpPr>
               <p:cNvPr id="10" name="TextBox 9"/>
@@ -6770,8 +6771,8 @@
           </p:sp>
         </mc:Fallback>
       </mc:AlternateContent>
-      <mc:AlternateContent xmlns:mc="http://schemas.openxmlformats.org/markup-compatibility/2006">
-        <mc:Choice xmlns:a14="http://schemas.microsoft.com/office/drawing/2010/main" Requires="a14">
+      <mc:AlternateContent xmlns:mc="http://schemas.openxmlformats.org/markup-compatibility/2006" xmlns:a14="http://schemas.microsoft.com/office/drawing/2010/main">
+        <mc:Choice Requires="a14">
           <p:sp>
             <p:nvSpPr>
               <p:cNvPr id="11" name="TextBox 10"/>
@@ -6794,6 +6795,7 @@
               </a:bodyPr>
               <a:lstStyle/>
               <a:p>
+                <a:pPr/>
                 <a14:m>
                   <m:oMathPara xmlns:m="http://schemas.openxmlformats.org/officeDocument/2006/math">
                     <m:oMathParaPr>
@@ -6833,7 +6835,7 @@
             </p:txBody>
           </p:sp>
         </mc:Choice>
-        <mc:Fallback>
+        <mc:Fallback xmlns="">
           <p:sp>
             <p:nvSpPr>
               <p:cNvPr id="11" name="TextBox 10"/>
@@ -6872,8 +6874,8 @@
           </p:sp>
         </mc:Fallback>
       </mc:AlternateContent>
-      <mc:AlternateContent xmlns:mc="http://schemas.openxmlformats.org/markup-compatibility/2006">
-        <mc:Choice xmlns:a14="http://schemas.microsoft.com/office/drawing/2010/main" Requires="a14">
+      <mc:AlternateContent xmlns:mc="http://schemas.openxmlformats.org/markup-compatibility/2006" xmlns:a14="http://schemas.microsoft.com/office/drawing/2010/main">
+        <mc:Choice Requires="a14">
           <p:sp>
             <p:nvSpPr>
               <p:cNvPr id="48" name="TextBox 47"/>
@@ -6896,6 +6898,7 @@
               </a:bodyPr>
               <a:lstStyle/>
               <a:p>
+                <a:pPr/>
                 <a14:m>
                   <m:oMathPara xmlns:m="http://schemas.openxmlformats.org/officeDocument/2006/math">
                     <m:oMathParaPr>
@@ -6935,7 +6938,7 @@
             </p:txBody>
           </p:sp>
         </mc:Choice>
-        <mc:Fallback>
+        <mc:Fallback xmlns="">
           <p:sp>
             <p:nvSpPr>
               <p:cNvPr id="48" name="TextBox 47"/>
@@ -6988,6 +6991,2630 @@
 </file>
 
 <file path=ppt/slides/slide3.xml><?xml version="1.0" encoding="utf-8"?>
+<p:sld xmlns:a="http://schemas.openxmlformats.org/drawingml/2006/main" xmlns:r="http://schemas.openxmlformats.org/officeDocument/2006/relationships" xmlns:p="http://schemas.openxmlformats.org/presentationml/2006/main">
+  <p:cSld>
+    <p:spTree>
+      <p:nvGrpSpPr>
+        <p:cNvPr id="1" name=""/>
+        <p:cNvGrpSpPr/>
+        <p:nvPr/>
+      </p:nvGrpSpPr>
+      <p:grpSpPr>
+        <a:xfrm>
+          <a:off x="0" y="0"/>
+          <a:ext cx="0" cy="0"/>
+          <a:chOff x="0" y="0"/>
+          <a:chExt cx="0" cy="0"/>
+        </a:xfrm>
+      </p:grpSpPr>
+      <p:sp>
+        <p:nvSpPr>
+          <p:cNvPr id="42" name="자유형: 도형 41">
+            <a:extLst>
+              <a:ext uri="{FF2B5EF4-FFF2-40B4-BE49-F238E27FC236}">
+                <a16:creationId xmlns="" xmlns:a16="http://schemas.microsoft.com/office/drawing/2014/main" id="{EE9DD656-E6E3-4D71-B4E3-229E6500DEAD}"/>
+              </a:ext>
+            </a:extLst>
+          </p:cNvPr>
+          <p:cNvSpPr/>
+          <p:nvPr/>
+        </p:nvSpPr>
+        <p:spPr>
+          <a:xfrm>
+            <a:off x="1397214" y="2708482"/>
+            <a:ext cx="308610" cy="1215390"/>
+          </a:xfrm>
+          <a:custGeom>
+            <a:avLst/>
+            <a:gdLst>
+              <a:gd name="connsiteX0" fmla="*/ 300990 w 308610"/>
+              <a:gd name="connsiteY0" fmla="*/ 0 h 1215390"/>
+              <a:gd name="connsiteX1" fmla="*/ 0 w 308610"/>
+              <a:gd name="connsiteY1" fmla="*/ 308610 h 1215390"/>
+              <a:gd name="connsiteX2" fmla="*/ 0 w 308610"/>
+              <a:gd name="connsiteY2" fmla="*/ 1215390 h 1215390"/>
+              <a:gd name="connsiteX3" fmla="*/ 308610 w 308610"/>
+              <a:gd name="connsiteY3" fmla="*/ 914400 h 1215390"/>
+              <a:gd name="connsiteX4" fmla="*/ 300990 w 308610"/>
+              <a:gd name="connsiteY4" fmla="*/ 0 h 1215390"/>
+            </a:gdLst>
+            <a:ahLst/>
+            <a:cxnLst>
+              <a:cxn ang="0">
+                <a:pos x="connsiteX0" y="connsiteY0"/>
+              </a:cxn>
+              <a:cxn ang="0">
+                <a:pos x="connsiteX1" y="connsiteY1"/>
+              </a:cxn>
+              <a:cxn ang="0">
+                <a:pos x="connsiteX2" y="connsiteY2"/>
+              </a:cxn>
+              <a:cxn ang="0">
+                <a:pos x="connsiteX3" y="connsiteY3"/>
+              </a:cxn>
+              <a:cxn ang="0">
+                <a:pos x="connsiteX4" y="connsiteY4"/>
+              </a:cxn>
+            </a:cxnLst>
+            <a:rect l="l" t="t" r="r" b="b"/>
+            <a:pathLst>
+              <a:path w="308610" h="1215390">
+                <a:moveTo>
+                  <a:pt x="300990" y="0"/>
+                </a:moveTo>
+                <a:lnTo>
+                  <a:pt x="0" y="308610"/>
+                </a:lnTo>
+                <a:lnTo>
+                  <a:pt x="0" y="1215390"/>
+                </a:lnTo>
+                <a:lnTo>
+                  <a:pt x="308610" y="914400"/>
+                </a:lnTo>
+                <a:lnTo>
+                  <a:pt x="300990" y="0"/>
+                </a:lnTo>
+                <a:close/>
+              </a:path>
+            </a:pathLst>
+          </a:custGeom>
+          <a:solidFill>
+            <a:schemeClr val="accent2">
+              <a:alpha val="40000"/>
+            </a:schemeClr>
+          </a:solidFill>
+          <a:ln>
+            <a:noFill/>
+          </a:ln>
+        </p:spPr>
+        <p:style>
+          <a:lnRef idx="2">
+            <a:schemeClr val="accent1">
+              <a:shade val="50000"/>
+            </a:schemeClr>
+          </a:lnRef>
+          <a:fillRef idx="1">
+            <a:schemeClr val="accent1"/>
+          </a:fillRef>
+          <a:effectRef idx="0">
+            <a:schemeClr val="accent1"/>
+          </a:effectRef>
+          <a:fontRef idx="minor">
+            <a:schemeClr val="lt1"/>
+          </a:fontRef>
+        </p:style>
+        <p:txBody>
+          <a:bodyPr rtlCol="0" anchor="ctr"/>
+          <a:lstStyle/>
+          <a:p>
+            <a:pPr algn="ctr"/>
+            <a:endParaRPr lang="ko-KR" altLang="en-US" b="1"/>
+          </a:p>
+        </p:txBody>
+      </p:sp>
+      <p:cxnSp>
+        <p:nvCxnSpPr>
+          <p:cNvPr id="34" name="직선 화살표 연결선 33">
+            <a:extLst>
+              <a:ext uri="{FF2B5EF4-FFF2-40B4-BE49-F238E27FC236}">
+                <a16:creationId xmlns="" xmlns:a16="http://schemas.microsoft.com/office/drawing/2014/main" id="{581C093B-6ADB-47B1-BD7D-9E723EADC660}"/>
+              </a:ext>
+            </a:extLst>
+          </p:cNvPr>
+          <p:cNvCxnSpPr>
+            <a:cxnSpLocks/>
+          </p:cNvCxnSpPr>
+          <p:nvPr/>
+        </p:nvCxnSpPr>
+        <p:spPr>
+          <a:xfrm>
+            <a:off x="1701550" y="3622888"/>
+            <a:ext cx="1490500" cy="0"/>
+          </a:xfrm>
+          <a:prstGeom prst="straightConnector1">
+            <a:avLst/>
+          </a:prstGeom>
+          <a:ln w="19050">
+            <a:solidFill>
+              <a:schemeClr val="tx1"/>
+            </a:solidFill>
+            <a:tailEnd type="triangle"/>
+          </a:ln>
+        </p:spPr>
+        <p:style>
+          <a:lnRef idx="1">
+            <a:schemeClr val="accent1"/>
+          </a:lnRef>
+          <a:fillRef idx="0">
+            <a:schemeClr val="accent1"/>
+          </a:fillRef>
+          <a:effectRef idx="0">
+            <a:schemeClr val="accent1"/>
+          </a:effectRef>
+          <a:fontRef idx="minor">
+            <a:schemeClr val="tx1"/>
+          </a:fontRef>
+        </p:style>
+      </p:cxnSp>
+      <p:cxnSp>
+        <p:nvCxnSpPr>
+          <p:cNvPr id="35" name="직선 화살표 연결선 34">
+            <a:extLst>
+              <a:ext uri="{FF2B5EF4-FFF2-40B4-BE49-F238E27FC236}">
+                <a16:creationId xmlns="" xmlns:a16="http://schemas.microsoft.com/office/drawing/2014/main" id="{1F419E52-4105-45EA-B5B1-AF95CC330E3A}"/>
+              </a:ext>
+            </a:extLst>
+          </p:cNvPr>
+          <p:cNvCxnSpPr>
+            <a:cxnSpLocks/>
+          </p:cNvCxnSpPr>
+          <p:nvPr/>
+        </p:nvCxnSpPr>
+        <p:spPr>
+          <a:xfrm flipV="1">
+            <a:off x="1705282" y="1938259"/>
+            <a:ext cx="0" cy="1684629"/>
+          </a:xfrm>
+          <a:prstGeom prst="straightConnector1">
+            <a:avLst/>
+          </a:prstGeom>
+          <a:ln w="19050">
+            <a:solidFill>
+              <a:schemeClr val="tx1"/>
+            </a:solidFill>
+            <a:tailEnd type="triangle"/>
+          </a:ln>
+        </p:spPr>
+        <p:style>
+          <a:lnRef idx="1">
+            <a:schemeClr val="accent1"/>
+          </a:lnRef>
+          <a:fillRef idx="0">
+            <a:schemeClr val="accent1"/>
+          </a:fillRef>
+          <a:effectRef idx="0">
+            <a:schemeClr val="accent1"/>
+          </a:effectRef>
+          <a:fontRef idx="minor">
+            <a:schemeClr val="tx1"/>
+          </a:fontRef>
+        </p:style>
+      </p:cxnSp>
+      <p:cxnSp>
+        <p:nvCxnSpPr>
+          <p:cNvPr id="36" name="직선 화살표 연결선 35">
+            <a:extLst>
+              <a:ext uri="{FF2B5EF4-FFF2-40B4-BE49-F238E27FC236}">
+                <a16:creationId xmlns="" xmlns:a16="http://schemas.microsoft.com/office/drawing/2014/main" id="{B3451782-A8D3-432F-A0C4-0BCE41597CF1}"/>
+              </a:ext>
+            </a:extLst>
+          </p:cNvPr>
+          <p:cNvCxnSpPr>
+            <a:cxnSpLocks/>
+          </p:cNvCxnSpPr>
+          <p:nvPr/>
+        </p:nvCxnSpPr>
+        <p:spPr>
+          <a:xfrm flipH="1">
+            <a:off x="942891" y="3622888"/>
+            <a:ext cx="758661" cy="767968"/>
+          </a:xfrm>
+          <a:prstGeom prst="straightConnector1">
+            <a:avLst/>
+          </a:prstGeom>
+          <a:ln w="19050">
+            <a:solidFill>
+              <a:schemeClr val="tx1"/>
+            </a:solidFill>
+            <a:tailEnd type="triangle"/>
+          </a:ln>
+        </p:spPr>
+        <p:style>
+          <a:lnRef idx="1">
+            <a:schemeClr val="accent1"/>
+          </a:lnRef>
+          <a:fillRef idx="0">
+            <a:schemeClr val="accent1"/>
+          </a:fillRef>
+          <a:effectRef idx="0">
+            <a:schemeClr val="accent1"/>
+          </a:effectRef>
+          <a:fontRef idx="minor">
+            <a:schemeClr val="tx1"/>
+          </a:fontRef>
+        </p:style>
+      </p:cxnSp>
+      <mc:AlternateContent xmlns:mc="http://schemas.openxmlformats.org/markup-compatibility/2006" xmlns:a14="http://schemas.microsoft.com/office/drawing/2010/main">
+        <mc:Choice Requires="a14">
+          <p:sp>
+            <p:nvSpPr>
+              <p:cNvPr id="37" name="TextBox 36">
+                <a:extLst>
+                  <a:ext uri="{FF2B5EF4-FFF2-40B4-BE49-F238E27FC236}">
+                    <a16:creationId xmlns="" xmlns:a16="http://schemas.microsoft.com/office/drawing/2014/main" id="{A5B2D496-0AE7-4F5A-82B5-FF3EA656A24C}"/>
+                  </a:ext>
+                </a:extLst>
+              </p:cNvPr>
+              <p:cNvSpPr txBox="1"/>
+              <p:nvPr/>
+            </p:nvSpPr>
+            <p:spPr>
+              <a:xfrm>
+                <a:off x="794127" y="3825934"/>
+                <a:ext cx="396839" cy="369332"/>
+              </a:xfrm>
+              <a:prstGeom prst="rect">
+                <a:avLst/>
+              </a:prstGeom>
+              <a:noFill/>
+            </p:spPr>
+            <p:txBody>
+              <a:bodyPr wrap="none" rtlCol="0">
+                <a:spAutoFit/>
+              </a:bodyPr>
+              <a:lstStyle/>
+              <a:p>
+                <a:pPr/>
+                <a14:m>
+                  <m:oMathPara xmlns:m="http://schemas.openxmlformats.org/officeDocument/2006/math">
+                    <m:oMathParaPr>
+                      <m:jc m:val="centerGroup"/>
+                    </m:oMathParaPr>
+                    <m:oMath xmlns:m="http://schemas.openxmlformats.org/officeDocument/2006/math">
+                      <m:r>
+                        <a:rPr lang="en-US" altLang="ko-KR" b="1" i="1" smtClean="0">
+                          <a:latin typeface="Cambria Math" panose="02040503050406030204" pitchFamily="18" charset="0"/>
+                        </a:rPr>
+                        <m:t>𝒙</m:t>
+                      </m:r>
+                    </m:oMath>
+                  </m:oMathPara>
+                </a14:m>
+                <a:endParaRPr lang="ko-KR" altLang="en-US" b="1" dirty="0"/>
+              </a:p>
+            </p:txBody>
+          </p:sp>
+        </mc:Choice>
+        <mc:Fallback xmlns="">
+          <p:sp>
+            <p:nvSpPr>
+              <p:cNvPr id="37" name="TextBox 36">
+                <a:extLst>
+                  <a:ext uri="{FF2B5EF4-FFF2-40B4-BE49-F238E27FC236}">
+                    <a16:creationId xmlns:a16="http://schemas.microsoft.com/office/drawing/2014/main" xmlns:a14="http://schemas.microsoft.com/office/drawing/2010/main" xmlns="" id="{A5B2D496-0AE7-4F5A-82B5-FF3EA656A24C}"/>
+                  </a:ext>
+                </a:extLst>
+              </p:cNvPr>
+              <p:cNvSpPr txBox="1">
+                <a:spLocks noRot="1" noChangeAspect="1" noMove="1" noResize="1" noEditPoints="1" noAdjustHandles="1" noChangeArrowheads="1" noChangeShapeType="1" noTextEdit="1"/>
+              </p:cNvSpPr>
+              <p:nvPr/>
+            </p:nvSpPr>
+            <p:spPr>
+              <a:xfrm>
+                <a:off x="794127" y="3825934"/>
+                <a:ext cx="396839" cy="369332"/>
+              </a:xfrm>
+              <a:prstGeom prst="rect">
+                <a:avLst/>
+              </a:prstGeom>
+              <a:blipFill rotWithShape="1">
+                <a:blip r:embed="rId2"/>
+                <a:stretch>
+                  <a:fillRect/>
+                </a:stretch>
+              </a:blipFill>
+            </p:spPr>
+            <p:txBody>
+              <a:bodyPr/>
+              <a:lstStyle/>
+              <a:p>
+                <a:r>
+                  <a:rPr lang="ko-KR" altLang="en-US">
+                    <a:noFill/>
+                  </a:rPr>
+                  <a:t> </a:t>
+                </a:r>
+              </a:p>
+            </p:txBody>
+          </p:sp>
+        </mc:Fallback>
+      </mc:AlternateContent>
+      <mc:AlternateContent xmlns:mc="http://schemas.openxmlformats.org/markup-compatibility/2006" xmlns:a14="http://schemas.microsoft.com/office/drawing/2010/main">
+        <mc:Choice Requires="a14">
+          <p:sp>
+            <p:nvSpPr>
+              <p:cNvPr id="38" name="TextBox 37">
+                <a:extLst>
+                  <a:ext uri="{FF2B5EF4-FFF2-40B4-BE49-F238E27FC236}">
+                    <a16:creationId xmlns="" xmlns:a16="http://schemas.microsoft.com/office/drawing/2014/main" id="{34206E17-8F44-49AA-8B1B-FDCA46BB027A}"/>
+                  </a:ext>
+                </a:extLst>
+              </p:cNvPr>
+              <p:cNvSpPr txBox="1"/>
+              <p:nvPr/>
+            </p:nvSpPr>
+            <p:spPr>
+              <a:xfrm>
+                <a:off x="3098193" y="3219075"/>
+                <a:ext cx="404278" cy="369332"/>
+              </a:xfrm>
+              <a:prstGeom prst="rect">
+                <a:avLst/>
+              </a:prstGeom>
+              <a:noFill/>
+            </p:spPr>
+            <p:txBody>
+              <a:bodyPr wrap="none" rtlCol="0">
+                <a:spAutoFit/>
+              </a:bodyPr>
+              <a:lstStyle/>
+              <a:p>
+                <a:pPr/>
+                <a14:m>
+                  <m:oMathPara xmlns:m="http://schemas.openxmlformats.org/officeDocument/2006/math">
+                    <m:oMathParaPr>
+                      <m:jc m:val="centerGroup"/>
+                    </m:oMathParaPr>
+                    <m:oMath xmlns:m="http://schemas.openxmlformats.org/officeDocument/2006/math">
+                      <m:r>
+                        <a:rPr lang="en-US" altLang="ko-KR" b="1" i="1" smtClean="0">
+                          <a:latin typeface="Cambria Math" panose="02040503050406030204" pitchFamily="18" charset="0"/>
+                        </a:rPr>
+                        <m:t>𝒚</m:t>
+                      </m:r>
+                    </m:oMath>
+                  </m:oMathPara>
+                </a14:m>
+                <a:endParaRPr lang="ko-KR" altLang="en-US" b="1" dirty="0"/>
+              </a:p>
+            </p:txBody>
+          </p:sp>
+        </mc:Choice>
+        <mc:Fallback xmlns="">
+          <p:sp>
+            <p:nvSpPr>
+              <p:cNvPr id="38" name="TextBox 37">
+                <a:extLst>
+                  <a:ext uri="{FF2B5EF4-FFF2-40B4-BE49-F238E27FC236}">
+                    <a16:creationId xmlns:a16="http://schemas.microsoft.com/office/drawing/2014/main" xmlns:a14="http://schemas.microsoft.com/office/drawing/2010/main" xmlns="" id="{34206E17-8F44-49AA-8B1B-FDCA46BB027A}"/>
+                  </a:ext>
+                </a:extLst>
+              </p:cNvPr>
+              <p:cNvSpPr txBox="1">
+                <a:spLocks noRot="1" noChangeAspect="1" noMove="1" noResize="1" noEditPoints="1" noAdjustHandles="1" noChangeArrowheads="1" noChangeShapeType="1" noTextEdit="1"/>
+              </p:cNvSpPr>
+              <p:nvPr/>
+            </p:nvSpPr>
+            <p:spPr>
+              <a:xfrm>
+                <a:off x="3098193" y="3219075"/>
+                <a:ext cx="404278" cy="369332"/>
+              </a:xfrm>
+              <a:prstGeom prst="rect">
+                <a:avLst/>
+              </a:prstGeom>
+              <a:blipFill rotWithShape="1">
+                <a:blip r:embed="rId3"/>
+                <a:stretch>
+                  <a:fillRect b="-8197"/>
+                </a:stretch>
+              </a:blipFill>
+            </p:spPr>
+            <p:txBody>
+              <a:bodyPr/>
+              <a:lstStyle/>
+              <a:p>
+                <a:r>
+                  <a:rPr lang="ko-KR" altLang="en-US">
+                    <a:noFill/>
+                  </a:rPr>
+                  <a:t> </a:t>
+                </a:r>
+              </a:p>
+            </p:txBody>
+          </p:sp>
+        </mc:Fallback>
+      </mc:AlternateContent>
+      <mc:AlternateContent xmlns:mc="http://schemas.openxmlformats.org/markup-compatibility/2006" xmlns:a14="http://schemas.microsoft.com/office/drawing/2010/main">
+        <mc:Choice Requires="a14">
+          <p:sp>
+            <p:nvSpPr>
+              <p:cNvPr id="39" name="TextBox 38">
+                <a:extLst>
+                  <a:ext uri="{FF2B5EF4-FFF2-40B4-BE49-F238E27FC236}">
+                    <a16:creationId xmlns="" xmlns:a16="http://schemas.microsoft.com/office/drawing/2014/main" id="{52297665-65FE-4A79-B2B1-8E5381AEA4B1}"/>
+                  </a:ext>
+                </a:extLst>
+              </p:cNvPr>
+              <p:cNvSpPr txBox="1"/>
+              <p:nvPr/>
+            </p:nvSpPr>
+            <p:spPr>
+              <a:xfrm>
+                <a:off x="1293021" y="1938259"/>
+                <a:ext cx="396839" cy="369332"/>
+              </a:xfrm>
+              <a:prstGeom prst="rect">
+                <a:avLst/>
+              </a:prstGeom>
+              <a:noFill/>
+            </p:spPr>
+            <p:txBody>
+              <a:bodyPr wrap="none" rtlCol="0">
+                <a:spAutoFit/>
+              </a:bodyPr>
+              <a:lstStyle/>
+              <a:p>
+                <a:pPr/>
+                <a14:m>
+                  <m:oMathPara xmlns:m="http://schemas.openxmlformats.org/officeDocument/2006/math">
+                    <m:oMathParaPr>
+                      <m:jc m:val="centerGroup"/>
+                    </m:oMathParaPr>
+                    <m:oMath xmlns:m="http://schemas.openxmlformats.org/officeDocument/2006/math">
+                      <m:r>
+                        <a:rPr lang="en-US" altLang="ko-KR" b="1" i="1" smtClean="0">
+                          <a:latin typeface="Cambria Math" panose="02040503050406030204" pitchFamily="18" charset="0"/>
+                        </a:rPr>
+                        <m:t>𝒛</m:t>
+                      </m:r>
+                    </m:oMath>
+                  </m:oMathPara>
+                </a14:m>
+                <a:endParaRPr lang="ko-KR" altLang="en-US" b="1" dirty="0"/>
+              </a:p>
+            </p:txBody>
+          </p:sp>
+        </mc:Choice>
+        <mc:Fallback xmlns="">
+          <p:sp>
+            <p:nvSpPr>
+              <p:cNvPr id="39" name="TextBox 38">
+                <a:extLst>
+                  <a:ext uri="{FF2B5EF4-FFF2-40B4-BE49-F238E27FC236}">
+                    <a16:creationId xmlns:a16="http://schemas.microsoft.com/office/drawing/2014/main" xmlns:a14="http://schemas.microsoft.com/office/drawing/2010/main" xmlns="" id="{52297665-65FE-4A79-B2B1-8E5381AEA4B1}"/>
+                  </a:ext>
+                </a:extLst>
+              </p:cNvPr>
+              <p:cNvSpPr txBox="1">
+                <a:spLocks noRot="1" noChangeAspect="1" noMove="1" noResize="1" noEditPoints="1" noAdjustHandles="1" noChangeArrowheads="1" noChangeShapeType="1" noTextEdit="1"/>
+              </p:cNvSpPr>
+              <p:nvPr/>
+            </p:nvSpPr>
+            <p:spPr>
+              <a:xfrm>
+                <a:off x="1293021" y="1938259"/>
+                <a:ext cx="396839" cy="369332"/>
+              </a:xfrm>
+              <a:prstGeom prst="rect">
+                <a:avLst/>
+              </a:prstGeom>
+              <a:blipFill rotWithShape="1">
+                <a:blip r:embed="rId4"/>
+                <a:stretch>
+                  <a:fillRect/>
+                </a:stretch>
+              </a:blipFill>
+            </p:spPr>
+            <p:txBody>
+              <a:bodyPr/>
+              <a:lstStyle/>
+              <a:p>
+                <a:r>
+                  <a:rPr lang="ko-KR" altLang="en-US">
+                    <a:noFill/>
+                  </a:rPr>
+                  <a:t> </a:t>
+                </a:r>
+              </a:p>
+            </p:txBody>
+          </p:sp>
+        </mc:Fallback>
+      </mc:AlternateContent>
+      <p:sp>
+        <p:nvSpPr>
+          <p:cNvPr id="45" name="자유형: 도형 44">
+            <a:extLst>
+              <a:ext uri="{FF2B5EF4-FFF2-40B4-BE49-F238E27FC236}">
+                <a16:creationId xmlns="" xmlns:a16="http://schemas.microsoft.com/office/drawing/2014/main" id="{6B4EDD9E-2815-496C-BC1B-E28FDF6A33C1}"/>
+              </a:ext>
+            </a:extLst>
+          </p:cNvPr>
+          <p:cNvSpPr/>
+          <p:nvPr/>
+        </p:nvSpPr>
+        <p:spPr>
+          <a:xfrm>
+            <a:off x="1848439" y="2708482"/>
+            <a:ext cx="308610" cy="1215390"/>
+          </a:xfrm>
+          <a:custGeom>
+            <a:avLst/>
+            <a:gdLst>
+              <a:gd name="connsiteX0" fmla="*/ 300990 w 308610"/>
+              <a:gd name="connsiteY0" fmla="*/ 0 h 1215390"/>
+              <a:gd name="connsiteX1" fmla="*/ 0 w 308610"/>
+              <a:gd name="connsiteY1" fmla="*/ 308610 h 1215390"/>
+              <a:gd name="connsiteX2" fmla="*/ 0 w 308610"/>
+              <a:gd name="connsiteY2" fmla="*/ 1215390 h 1215390"/>
+              <a:gd name="connsiteX3" fmla="*/ 308610 w 308610"/>
+              <a:gd name="connsiteY3" fmla="*/ 914400 h 1215390"/>
+              <a:gd name="connsiteX4" fmla="*/ 300990 w 308610"/>
+              <a:gd name="connsiteY4" fmla="*/ 0 h 1215390"/>
+            </a:gdLst>
+            <a:ahLst/>
+            <a:cxnLst>
+              <a:cxn ang="0">
+                <a:pos x="connsiteX0" y="connsiteY0"/>
+              </a:cxn>
+              <a:cxn ang="0">
+                <a:pos x="connsiteX1" y="connsiteY1"/>
+              </a:cxn>
+              <a:cxn ang="0">
+                <a:pos x="connsiteX2" y="connsiteY2"/>
+              </a:cxn>
+              <a:cxn ang="0">
+                <a:pos x="connsiteX3" y="connsiteY3"/>
+              </a:cxn>
+              <a:cxn ang="0">
+                <a:pos x="connsiteX4" y="connsiteY4"/>
+              </a:cxn>
+            </a:cxnLst>
+            <a:rect l="l" t="t" r="r" b="b"/>
+            <a:pathLst>
+              <a:path w="308610" h="1215390">
+                <a:moveTo>
+                  <a:pt x="300990" y="0"/>
+                </a:moveTo>
+                <a:lnTo>
+                  <a:pt x="0" y="308610"/>
+                </a:lnTo>
+                <a:lnTo>
+                  <a:pt x="0" y="1215390"/>
+                </a:lnTo>
+                <a:lnTo>
+                  <a:pt x="308610" y="914400"/>
+                </a:lnTo>
+                <a:lnTo>
+                  <a:pt x="300990" y="0"/>
+                </a:lnTo>
+                <a:close/>
+              </a:path>
+            </a:pathLst>
+          </a:custGeom>
+          <a:solidFill>
+            <a:schemeClr val="accent3">
+              <a:alpha val="40000"/>
+            </a:schemeClr>
+          </a:solidFill>
+          <a:ln>
+            <a:noFill/>
+          </a:ln>
+        </p:spPr>
+        <p:style>
+          <a:lnRef idx="2">
+            <a:schemeClr val="accent1">
+              <a:shade val="50000"/>
+            </a:schemeClr>
+          </a:lnRef>
+          <a:fillRef idx="1">
+            <a:schemeClr val="accent1"/>
+          </a:fillRef>
+          <a:effectRef idx="0">
+            <a:schemeClr val="accent1"/>
+          </a:effectRef>
+          <a:fontRef idx="minor">
+            <a:schemeClr val="lt1"/>
+          </a:fontRef>
+        </p:style>
+        <p:txBody>
+          <a:bodyPr rtlCol="0" anchor="ctr"/>
+          <a:lstStyle/>
+          <a:p>
+            <a:pPr algn="ctr"/>
+            <a:endParaRPr lang="ko-KR" altLang="en-US" b="1" dirty="0"/>
+          </a:p>
+        </p:txBody>
+      </p:sp>
+      <p:cxnSp>
+        <p:nvCxnSpPr>
+          <p:cNvPr id="40" name="직선 화살표 연결선 39">
+            <a:extLst>
+              <a:ext uri="{FF2B5EF4-FFF2-40B4-BE49-F238E27FC236}">
+                <a16:creationId xmlns="" xmlns:a16="http://schemas.microsoft.com/office/drawing/2014/main" id="{706DAAA9-F59A-40C1-B6A2-E0394CE84EF2}"/>
+              </a:ext>
+            </a:extLst>
+          </p:cNvPr>
+          <p:cNvCxnSpPr>
+            <a:cxnSpLocks/>
+          </p:cNvCxnSpPr>
+          <p:nvPr/>
+        </p:nvCxnSpPr>
+        <p:spPr>
+          <a:xfrm>
+            <a:off x="5569383" y="2264750"/>
+            <a:ext cx="2403599" cy="0"/>
+          </a:xfrm>
+          <a:prstGeom prst="straightConnector1">
+            <a:avLst/>
+          </a:prstGeom>
+          <a:ln w="19050">
+            <a:solidFill>
+              <a:schemeClr val="tx1"/>
+            </a:solidFill>
+            <a:tailEnd type="triangle"/>
+          </a:ln>
+        </p:spPr>
+        <p:style>
+          <a:lnRef idx="1">
+            <a:schemeClr val="accent1"/>
+          </a:lnRef>
+          <a:fillRef idx="0">
+            <a:schemeClr val="accent1"/>
+          </a:fillRef>
+          <a:effectRef idx="0">
+            <a:schemeClr val="accent1"/>
+          </a:effectRef>
+          <a:fontRef idx="minor">
+            <a:schemeClr val="tx1"/>
+          </a:fontRef>
+        </p:style>
+      </p:cxnSp>
+      <mc:AlternateContent xmlns:mc="http://schemas.openxmlformats.org/markup-compatibility/2006" xmlns:a14="http://schemas.microsoft.com/office/drawing/2010/main">
+        <mc:Choice Requires="a14">
+          <p:sp>
+            <p:nvSpPr>
+              <p:cNvPr id="41" name="TextBox 40">
+                <a:extLst>
+                  <a:ext uri="{FF2B5EF4-FFF2-40B4-BE49-F238E27FC236}">
+                    <a16:creationId xmlns="" xmlns:a16="http://schemas.microsoft.com/office/drawing/2014/main" id="{083334AD-CE2F-43DD-BEFF-ECA67F9062BC}"/>
+                  </a:ext>
+                </a:extLst>
+              </p:cNvPr>
+              <p:cNvSpPr txBox="1"/>
+              <p:nvPr/>
+            </p:nvSpPr>
+            <p:spPr>
+              <a:xfrm>
+                <a:off x="7797760" y="1809672"/>
+                <a:ext cx="651944" cy="595589"/>
+              </a:xfrm>
+              <a:prstGeom prst="rect">
+                <a:avLst/>
+              </a:prstGeom>
+              <a:noFill/>
+            </p:spPr>
+            <p:txBody>
+              <a:bodyPr wrap="none" rtlCol="0">
+                <a:spAutoFit/>
+              </a:bodyPr>
+              <a:lstStyle/>
+              <a:p>
+                <a:pPr/>
+                <a14:m>
+                  <m:oMathPara xmlns:m="http://schemas.openxmlformats.org/officeDocument/2006/math">
+                    <m:oMathParaPr>
+                      <m:jc m:val="centerGroup"/>
+                    </m:oMathParaPr>
+                    <m:oMath xmlns:m="http://schemas.openxmlformats.org/officeDocument/2006/math">
+                      <m:r>
+                        <a:rPr lang="en-US" altLang="ko-KR" b="1" i="1" smtClean="0">
+                          <a:latin typeface="Cambria Math" panose="02040503050406030204" pitchFamily="18" charset="0"/>
+                        </a:rPr>
+                        <m:t>𝒚</m:t>
+                      </m:r>
+                    </m:oMath>
+                  </m:oMathPara>
+                </a14:m>
+                <a:endParaRPr lang="ko-KR" altLang="en-US" b="1" dirty="0"/>
+              </a:p>
+            </p:txBody>
+          </p:sp>
+        </mc:Choice>
+        <mc:Fallback xmlns="">
+          <p:sp>
+            <p:nvSpPr>
+              <p:cNvPr id="41" name="TextBox 40">
+                <a:extLst>
+                  <a:ext uri="{FF2B5EF4-FFF2-40B4-BE49-F238E27FC236}">
+                    <a16:creationId xmlns:a16="http://schemas.microsoft.com/office/drawing/2014/main" xmlns:a14="http://schemas.microsoft.com/office/drawing/2010/main" xmlns="" id="{083334AD-CE2F-43DD-BEFF-ECA67F9062BC}"/>
+                  </a:ext>
+                </a:extLst>
+              </p:cNvPr>
+              <p:cNvSpPr txBox="1">
+                <a:spLocks noRot="1" noChangeAspect="1" noMove="1" noResize="1" noEditPoints="1" noAdjustHandles="1" noChangeArrowheads="1" noChangeShapeType="1" noTextEdit="1"/>
+              </p:cNvSpPr>
+              <p:nvPr/>
+            </p:nvSpPr>
+            <p:spPr>
+              <a:xfrm>
+                <a:off x="7797760" y="1809672"/>
+                <a:ext cx="651944" cy="595589"/>
+              </a:xfrm>
+              <a:prstGeom prst="rect">
+                <a:avLst/>
+              </a:prstGeom>
+              <a:blipFill rotWithShape="1">
+                <a:blip r:embed="rId5"/>
+                <a:stretch>
+                  <a:fillRect/>
+                </a:stretch>
+              </a:blipFill>
+            </p:spPr>
+            <p:txBody>
+              <a:bodyPr/>
+              <a:lstStyle/>
+              <a:p>
+                <a:r>
+                  <a:rPr lang="ko-KR" altLang="en-US">
+                    <a:noFill/>
+                  </a:rPr>
+                  <a:t> </a:t>
+                </a:r>
+              </a:p>
+            </p:txBody>
+          </p:sp>
+        </mc:Fallback>
+      </mc:AlternateContent>
+      <p:cxnSp>
+        <p:nvCxnSpPr>
+          <p:cNvPr id="43" name="직선 화살표 연결선 42">
+            <a:extLst>
+              <a:ext uri="{FF2B5EF4-FFF2-40B4-BE49-F238E27FC236}">
+                <a16:creationId xmlns="" xmlns:a16="http://schemas.microsoft.com/office/drawing/2014/main" id="{3FAC8454-190E-4E23-9791-FA3DDA612AC2}"/>
+              </a:ext>
+            </a:extLst>
+          </p:cNvPr>
+          <p:cNvCxnSpPr>
+            <a:cxnSpLocks/>
+          </p:cNvCxnSpPr>
+          <p:nvPr/>
+        </p:nvCxnSpPr>
+        <p:spPr>
+          <a:xfrm flipH="1">
+            <a:off x="5569385" y="2264750"/>
+            <a:ext cx="2" cy="2180366"/>
+          </a:xfrm>
+          <a:prstGeom prst="straightConnector1">
+            <a:avLst/>
+          </a:prstGeom>
+          <a:ln w="19050">
+            <a:solidFill>
+              <a:schemeClr val="tx1"/>
+            </a:solidFill>
+            <a:tailEnd type="triangle"/>
+          </a:ln>
+        </p:spPr>
+        <p:style>
+          <a:lnRef idx="1">
+            <a:schemeClr val="accent1"/>
+          </a:lnRef>
+          <a:fillRef idx="0">
+            <a:schemeClr val="accent1"/>
+          </a:fillRef>
+          <a:effectRef idx="0">
+            <a:schemeClr val="accent1"/>
+          </a:effectRef>
+          <a:fontRef idx="minor">
+            <a:schemeClr val="tx1"/>
+          </a:fontRef>
+        </p:style>
+      </p:cxnSp>
+      <mc:AlternateContent xmlns:mc="http://schemas.openxmlformats.org/markup-compatibility/2006" xmlns:a14="http://schemas.microsoft.com/office/drawing/2010/main">
+        <mc:Choice Requires="a14">
+          <p:sp>
+            <p:nvSpPr>
+              <p:cNvPr id="44" name="TextBox 43">
+                <a:extLst>
+                  <a:ext uri="{FF2B5EF4-FFF2-40B4-BE49-F238E27FC236}">
+                    <a16:creationId xmlns="" xmlns:a16="http://schemas.microsoft.com/office/drawing/2014/main" id="{7E13409B-B9F0-47B1-9090-4210ACB450B5}"/>
+                  </a:ext>
+                </a:extLst>
+              </p:cNvPr>
+              <p:cNvSpPr txBox="1"/>
+              <p:nvPr/>
+            </p:nvSpPr>
+            <p:spPr>
+              <a:xfrm>
+                <a:off x="4979690" y="4138594"/>
+                <a:ext cx="639947" cy="595589"/>
+              </a:xfrm>
+              <a:prstGeom prst="rect">
+                <a:avLst/>
+              </a:prstGeom>
+              <a:noFill/>
+            </p:spPr>
+            <p:txBody>
+              <a:bodyPr wrap="none" rtlCol="0">
+                <a:spAutoFit/>
+              </a:bodyPr>
+              <a:lstStyle/>
+              <a:p>
+                <a:pPr/>
+                <a14:m>
+                  <m:oMathPara xmlns:m="http://schemas.openxmlformats.org/officeDocument/2006/math">
+                    <m:oMathParaPr>
+                      <m:jc m:val="centerGroup"/>
+                    </m:oMathParaPr>
+                    <m:oMath xmlns:m="http://schemas.openxmlformats.org/officeDocument/2006/math">
+                      <m:r>
+                        <a:rPr lang="en-US" altLang="ko-KR" b="1" i="1" smtClean="0">
+                          <a:latin typeface="Cambria Math" panose="02040503050406030204" pitchFamily="18" charset="0"/>
+                        </a:rPr>
+                        <m:t>𝒙</m:t>
+                      </m:r>
+                    </m:oMath>
+                  </m:oMathPara>
+                </a14:m>
+                <a:endParaRPr lang="ko-KR" altLang="en-US" b="1" dirty="0"/>
+              </a:p>
+            </p:txBody>
+          </p:sp>
+        </mc:Choice>
+        <mc:Fallback xmlns="">
+          <p:sp>
+            <p:nvSpPr>
+              <p:cNvPr id="44" name="TextBox 43">
+                <a:extLst>
+                  <a:ext uri="{FF2B5EF4-FFF2-40B4-BE49-F238E27FC236}">
+                    <a16:creationId xmlns:a16="http://schemas.microsoft.com/office/drawing/2014/main" xmlns:a14="http://schemas.microsoft.com/office/drawing/2010/main" xmlns="" id="{7E13409B-B9F0-47B1-9090-4210ACB450B5}"/>
+                  </a:ext>
+                </a:extLst>
+              </p:cNvPr>
+              <p:cNvSpPr txBox="1">
+                <a:spLocks noRot="1" noChangeAspect="1" noMove="1" noResize="1" noEditPoints="1" noAdjustHandles="1" noChangeArrowheads="1" noChangeShapeType="1" noTextEdit="1"/>
+              </p:cNvSpPr>
+              <p:nvPr/>
+            </p:nvSpPr>
+            <p:spPr>
+              <a:xfrm>
+                <a:off x="4979690" y="4138594"/>
+                <a:ext cx="639947" cy="595589"/>
+              </a:xfrm>
+              <a:prstGeom prst="rect">
+                <a:avLst/>
+              </a:prstGeom>
+              <a:blipFill rotWithShape="1">
+                <a:blip r:embed="rId6"/>
+                <a:stretch>
+                  <a:fillRect/>
+                </a:stretch>
+              </a:blipFill>
+            </p:spPr>
+            <p:txBody>
+              <a:bodyPr/>
+              <a:lstStyle/>
+              <a:p>
+                <a:r>
+                  <a:rPr lang="ko-KR" altLang="en-US">
+                    <a:noFill/>
+                  </a:rPr>
+                  <a:t> </a:t>
+                </a:r>
+              </a:p>
+            </p:txBody>
+          </p:sp>
+        </mc:Fallback>
+      </mc:AlternateContent>
+      <p:sp>
+        <p:nvSpPr>
+          <p:cNvPr id="13" name="직사각형 12">
+            <a:extLst>
+              <a:ext uri="{FF2B5EF4-FFF2-40B4-BE49-F238E27FC236}">
+                <a16:creationId xmlns="" xmlns:a16="http://schemas.microsoft.com/office/drawing/2014/main" id="{1A67DD87-3044-406F-8EB5-98DE69D8BBB9}"/>
+              </a:ext>
+            </a:extLst>
+          </p:cNvPr>
+          <p:cNvSpPr/>
+          <p:nvPr/>
+        </p:nvSpPr>
+        <p:spPr>
+          <a:xfrm>
+            <a:off x="5566392" y="2273029"/>
+            <a:ext cx="1873844" cy="1873844"/>
+          </a:xfrm>
+          <a:prstGeom prst="rect">
+            <a:avLst/>
+          </a:prstGeom>
+          <a:solidFill>
+            <a:schemeClr val="accent1">
+              <a:lumMod val="20000"/>
+              <a:lumOff val="80000"/>
+            </a:schemeClr>
+          </a:solidFill>
+        </p:spPr>
+        <p:style>
+          <a:lnRef idx="2">
+            <a:schemeClr val="accent1">
+              <a:shade val="50000"/>
+            </a:schemeClr>
+          </a:lnRef>
+          <a:fillRef idx="1">
+            <a:schemeClr val="accent1"/>
+          </a:fillRef>
+          <a:effectRef idx="0">
+            <a:schemeClr val="accent1"/>
+          </a:effectRef>
+          <a:fontRef idx="minor">
+            <a:schemeClr val="lt1"/>
+          </a:fontRef>
+        </p:style>
+        <p:txBody>
+          <a:bodyPr rtlCol="0" anchor="ctr"/>
+          <a:lstStyle/>
+          <a:p>
+            <a:pPr algn="ctr"/>
+            <a:endParaRPr lang="ko-KR" altLang="en-US" dirty="0"/>
+          </a:p>
+        </p:txBody>
+      </p:sp>
+      <p:cxnSp>
+        <p:nvCxnSpPr>
+          <p:cNvPr id="47" name="직선 연결선 46">
+            <a:extLst>
+              <a:ext uri="{FF2B5EF4-FFF2-40B4-BE49-F238E27FC236}">
+                <a16:creationId xmlns="" xmlns:a16="http://schemas.microsoft.com/office/drawing/2014/main" id="{B076CBE9-2464-4DDF-BB08-D17B16179956}"/>
+              </a:ext>
+            </a:extLst>
+          </p:cNvPr>
+          <p:cNvCxnSpPr>
+            <a:stCxn id="13" idx="0"/>
+            <a:endCxn id="13" idx="2"/>
+          </p:cNvCxnSpPr>
+          <p:nvPr/>
+        </p:nvCxnSpPr>
+        <p:spPr>
+          <a:xfrm>
+            <a:off x="6503314" y="2273029"/>
+            <a:ext cx="0" cy="1873844"/>
+          </a:xfrm>
+          <a:prstGeom prst="line">
+            <a:avLst/>
+          </a:prstGeom>
+          <a:ln w="76200">
+            <a:solidFill>
+              <a:schemeClr val="accent3"/>
+            </a:solidFill>
+          </a:ln>
+        </p:spPr>
+        <p:style>
+          <a:lnRef idx="1">
+            <a:schemeClr val="accent1"/>
+          </a:lnRef>
+          <a:fillRef idx="0">
+            <a:schemeClr val="accent1"/>
+          </a:fillRef>
+          <a:effectRef idx="0">
+            <a:schemeClr val="accent1"/>
+          </a:effectRef>
+          <a:fontRef idx="minor">
+            <a:schemeClr val="tx1"/>
+          </a:fontRef>
+        </p:style>
+      </p:cxnSp>
+      <p:sp>
+        <p:nvSpPr>
+          <p:cNvPr id="6" name="TextBox 5"/>
+          <p:cNvSpPr txBox="1"/>
+          <p:nvPr/>
+        </p:nvSpPr>
+        <p:spPr>
+          <a:xfrm>
+            <a:off x="5370845" y="4880338"/>
+            <a:ext cx="2311851" cy="261610"/>
+          </a:xfrm>
+          <a:prstGeom prst="rect">
+            <a:avLst/>
+          </a:prstGeom>
+          <a:noFill/>
+        </p:spPr>
+        <p:txBody>
+          <a:bodyPr wrap="none" rtlCol="0">
+            <a:spAutoFit/>
+          </a:bodyPr>
+          <a:lstStyle/>
+          <a:p>
+            <a:pPr algn="ctr"/>
+            <a:r>
+              <a:rPr lang="en-US" altLang="ko-KR" sz="1100" dirty="0" smtClean="0"/>
+              <a:t>※ z-</a:t>
+            </a:r>
+            <a:r>
+              <a:rPr lang="ko-KR" altLang="en-US" sz="1100" dirty="0" smtClean="0"/>
+              <a:t>축 방향으로의 면벡터는 생략</a:t>
+            </a:r>
+            <a:endParaRPr lang="ko-KR" altLang="en-US" sz="1100" dirty="0"/>
+          </a:p>
+        </p:txBody>
+      </p:sp>
+      <p:sp>
+        <p:nvSpPr>
+          <p:cNvPr id="7" name="오른쪽 화살표 6"/>
+          <p:cNvSpPr/>
+          <p:nvPr/>
+        </p:nvSpPr>
+        <p:spPr>
+          <a:xfrm>
+            <a:off x="3635896" y="2922241"/>
+            <a:ext cx="978408" cy="484632"/>
+          </a:xfrm>
+          <a:prstGeom prst="rightArrow">
+            <a:avLst/>
+          </a:prstGeom>
+          <a:solidFill>
+            <a:schemeClr val="accent1">
+              <a:lumMod val="20000"/>
+              <a:lumOff val="80000"/>
+            </a:schemeClr>
+          </a:solidFill>
+        </p:spPr>
+        <p:style>
+          <a:lnRef idx="2">
+            <a:schemeClr val="accent1">
+              <a:shade val="50000"/>
+            </a:schemeClr>
+          </a:lnRef>
+          <a:fillRef idx="1">
+            <a:schemeClr val="accent1"/>
+          </a:fillRef>
+          <a:effectRef idx="0">
+            <a:schemeClr val="accent1"/>
+          </a:effectRef>
+          <a:fontRef idx="minor">
+            <a:schemeClr val="lt1"/>
+          </a:fontRef>
+        </p:style>
+        <p:txBody>
+          <a:bodyPr rtlCol="0" anchor="ctr"/>
+          <a:lstStyle/>
+          <a:p>
+            <a:pPr algn="ctr"/>
+            <a:endParaRPr lang="ko-KR" altLang="en-US"/>
+          </a:p>
+        </p:txBody>
+      </p:sp>
+      <mc:AlternateContent xmlns:mc="http://schemas.openxmlformats.org/markup-compatibility/2006" xmlns:a14="http://schemas.microsoft.com/office/drawing/2010/main">
+        <mc:Choice Requires="a14">
+          <p:sp>
+            <p:nvSpPr>
+              <p:cNvPr id="10" name="TextBox 9"/>
+              <p:cNvSpPr txBox="1"/>
+              <p:nvPr/>
+            </p:nvSpPr>
+            <p:spPr>
+              <a:xfrm>
+                <a:off x="3328311" y="2554593"/>
+                <a:ext cx="1593577" cy="307777"/>
+              </a:xfrm>
+              <a:prstGeom prst="rect">
+                <a:avLst/>
+              </a:prstGeom>
+              <a:noFill/>
+            </p:spPr>
+            <p:txBody>
+              <a:bodyPr wrap="none" rtlCol="0">
+                <a:spAutoFit/>
+              </a:bodyPr>
+              <a:lstStyle/>
+              <a:p>
+                <a:pPr algn="ctr"/>
+                <a14:m>
+                  <m:oMath xmlns:m="http://schemas.openxmlformats.org/officeDocument/2006/math">
+                    <m:r>
+                      <a:rPr lang="en-US" altLang="ko-KR" sz="1400" b="0" i="1" smtClean="0">
+                        <a:latin typeface="Cambria Math"/>
+                      </a:rPr>
+                      <m:t>𝑧</m:t>
+                    </m:r>
+                  </m:oMath>
+                </a14:m>
+                <a:r>
+                  <a:rPr lang="ko-KR" altLang="en-US" sz="1400" dirty="0" smtClean="0"/>
+                  <a:t>축에서의 조감도</a:t>
+                </a:r>
+                <a:endParaRPr lang="ko-KR" altLang="en-US" sz="1400" dirty="0"/>
+              </a:p>
+            </p:txBody>
+          </p:sp>
+        </mc:Choice>
+        <mc:Fallback xmlns="">
+          <p:sp>
+            <p:nvSpPr>
+              <p:cNvPr id="10" name="TextBox 9"/>
+              <p:cNvSpPr txBox="1">
+                <a:spLocks noRot="1" noChangeAspect="1" noMove="1" noResize="1" noEditPoints="1" noAdjustHandles="1" noChangeArrowheads="1" noChangeShapeType="1" noTextEdit="1"/>
+              </p:cNvSpPr>
+              <p:nvPr/>
+            </p:nvSpPr>
+            <p:spPr>
+              <a:xfrm>
+                <a:off x="3328311" y="2554593"/>
+                <a:ext cx="1593577" cy="307777"/>
+              </a:xfrm>
+              <a:prstGeom prst="rect">
+                <a:avLst/>
+              </a:prstGeom>
+              <a:blipFill rotWithShape="1">
+                <a:blip r:embed="rId7"/>
+                <a:stretch>
+                  <a:fillRect t="-1961" r="-1149" b="-17647"/>
+                </a:stretch>
+              </a:blipFill>
+            </p:spPr>
+            <p:txBody>
+              <a:bodyPr/>
+              <a:lstStyle/>
+              <a:p>
+                <a:r>
+                  <a:rPr lang="ko-KR" altLang="en-US">
+                    <a:noFill/>
+                  </a:rPr>
+                  <a:t> </a:t>
+                </a:r>
+              </a:p>
+            </p:txBody>
+          </p:sp>
+        </mc:Fallback>
+      </mc:AlternateContent>
+      <mc:AlternateContent xmlns:mc="http://schemas.openxmlformats.org/markup-compatibility/2006">
+        <mc:Choice xmlns:a14="http://schemas.microsoft.com/office/drawing/2010/main" Requires="a14">
+          <p:sp>
+            <p:nvSpPr>
+              <p:cNvPr id="11" name="TextBox 10"/>
+              <p:cNvSpPr txBox="1"/>
+              <p:nvPr/>
+            </p:nvSpPr>
+            <p:spPr>
+              <a:xfrm>
+                <a:off x="5796458" y="2528788"/>
+                <a:ext cx="482055" cy="369332"/>
+              </a:xfrm>
+              <a:prstGeom prst="rect">
+                <a:avLst/>
+              </a:prstGeom>
+              <a:noFill/>
+            </p:spPr>
+            <p:txBody>
+              <a:bodyPr wrap="none" rtlCol="0">
+                <a:spAutoFit/>
+              </a:bodyPr>
+              <a:lstStyle/>
+              <a:p>
+                <a:pPr/>
+                <a14:m>
+                  <m:oMathPara xmlns:m="http://schemas.openxmlformats.org/officeDocument/2006/math">
+                    <m:oMathParaPr>
+                      <m:jc m:val="centerGroup"/>
+                    </m:oMathParaPr>
+                    <m:oMath xmlns:m="http://schemas.openxmlformats.org/officeDocument/2006/math">
+                      <m:sSub>
+                        <m:sSubPr>
+                          <m:ctrlPr>
+                            <a:rPr lang="en-US" altLang="ko-KR" b="0" i="1" smtClean="0">
+                              <a:solidFill>
+                                <a:srgbClr val="FF0000"/>
+                              </a:solidFill>
+                              <a:latin typeface="Cambria Math"/>
+                            </a:rPr>
+                          </m:ctrlPr>
+                        </m:sSubPr>
+                        <m:e>
+                          <m:r>
+                            <a:rPr lang="en-US" altLang="ko-KR" b="0" i="1" smtClean="0">
+                              <a:solidFill>
+                                <a:srgbClr val="FF0000"/>
+                              </a:solidFill>
+                              <a:latin typeface="Cambria Math"/>
+                            </a:rPr>
+                            <m:t>𝑉</m:t>
+                          </m:r>
+                        </m:e>
+                        <m:sub>
+                          <m:r>
+                            <a:rPr lang="en-US" altLang="ko-KR" b="0" i="1" smtClean="0">
+                              <a:solidFill>
+                                <a:srgbClr val="FF0000"/>
+                              </a:solidFill>
+                              <a:latin typeface="Cambria Math"/>
+                            </a:rPr>
+                            <m:t>1</m:t>
+                          </m:r>
+                        </m:sub>
+                      </m:sSub>
+                    </m:oMath>
+                  </m:oMathPara>
+                </a14:m>
+                <a:endParaRPr lang="ko-KR" altLang="en-US" dirty="0">
+                  <a:solidFill>
+                    <a:srgbClr val="FF0000"/>
+                  </a:solidFill>
+                </a:endParaRPr>
+              </a:p>
+            </p:txBody>
+          </p:sp>
+        </mc:Choice>
+        <mc:Fallback>
+          <p:sp>
+            <p:nvSpPr>
+              <p:cNvPr id="11" name="TextBox 10"/>
+              <p:cNvSpPr txBox="1">
+                <a:spLocks noRot="1" noChangeAspect="1" noMove="1" noResize="1" noEditPoints="1" noAdjustHandles="1" noChangeArrowheads="1" noChangeShapeType="1" noTextEdit="1"/>
+              </p:cNvSpPr>
+              <p:nvPr/>
+            </p:nvSpPr>
+            <p:spPr>
+              <a:xfrm>
+                <a:off x="5796458" y="2528788"/>
+                <a:ext cx="482055" cy="369332"/>
+              </a:xfrm>
+              <a:prstGeom prst="rect">
+                <a:avLst/>
+              </a:prstGeom>
+              <a:blipFill rotWithShape="1">
+                <a:blip r:embed="rId8"/>
+                <a:stretch>
+                  <a:fillRect b="-3333"/>
+                </a:stretch>
+              </a:blipFill>
+            </p:spPr>
+            <p:txBody>
+              <a:bodyPr/>
+              <a:lstStyle/>
+              <a:p>
+                <a:r>
+                  <a:rPr lang="ko-KR" altLang="en-US">
+                    <a:noFill/>
+                  </a:rPr>
+                  <a:t> </a:t>
+                </a:r>
+              </a:p>
+            </p:txBody>
+          </p:sp>
+        </mc:Fallback>
+      </mc:AlternateContent>
+      <mc:AlternateContent xmlns:mc="http://schemas.openxmlformats.org/markup-compatibility/2006">
+        <mc:Choice xmlns:a14="http://schemas.microsoft.com/office/drawing/2010/main" Requires="a14">
+          <p:sp>
+            <p:nvSpPr>
+              <p:cNvPr id="48" name="TextBox 47"/>
+              <p:cNvSpPr txBox="1"/>
+              <p:nvPr/>
+            </p:nvSpPr>
+            <p:spPr>
+              <a:xfrm>
+                <a:off x="6742569" y="2528788"/>
+                <a:ext cx="487377" cy="369332"/>
+              </a:xfrm>
+              <a:prstGeom prst="rect">
+                <a:avLst/>
+              </a:prstGeom>
+              <a:noFill/>
+            </p:spPr>
+            <p:txBody>
+              <a:bodyPr wrap="none" rtlCol="0">
+                <a:spAutoFit/>
+              </a:bodyPr>
+              <a:lstStyle/>
+              <a:p>
+                <a:pPr/>
+                <a14:m>
+                  <m:oMathPara xmlns:m="http://schemas.openxmlformats.org/officeDocument/2006/math">
+                    <m:oMathParaPr>
+                      <m:jc m:val="centerGroup"/>
+                    </m:oMathParaPr>
+                    <m:oMath xmlns:m="http://schemas.openxmlformats.org/officeDocument/2006/math">
+                      <m:sSub>
+                        <m:sSubPr>
+                          <m:ctrlPr>
+                            <a:rPr lang="en-US" altLang="ko-KR" b="0" i="1" smtClean="0">
+                              <a:solidFill>
+                                <a:schemeClr val="accent1"/>
+                              </a:solidFill>
+                              <a:latin typeface="Cambria Math"/>
+                            </a:rPr>
+                          </m:ctrlPr>
+                        </m:sSubPr>
+                        <m:e>
+                          <m:r>
+                            <a:rPr lang="en-US" altLang="ko-KR" b="0" i="1" smtClean="0">
+                              <a:solidFill>
+                                <a:schemeClr val="accent1"/>
+                              </a:solidFill>
+                              <a:latin typeface="Cambria Math"/>
+                            </a:rPr>
+                            <m:t>𝑉</m:t>
+                          </m:r>
+                        </m:e>
+                        <m:sub>
+                          <m:r>
+                            <a:rPr lang="en-US" altLang="ko-KR" b="0" i="1" smtClean="0">
+                              <a:solidFill>
+                                <a:schemeClr val="accent1"/>
+                              </a:solidFill>
+                              <a:latin typeface="Cambria Math"/>
+                            </a:rPr>
+                            <m:t>2</m:t>
+                          </m:r>
+                        </m:sub>
+                      </m:sSub>
+                    </m:oMath>
+                  </m:oMathPara>
+                </a14:m>
+                <a:endParaRPr lang="ko-KR" altLang="en-US" dirty="0">
+                  <a:solidFill>
+                    <a:schemeClr val="accent1"/>
+                  </a:solidFill>
+                </a:endParaRPr>
+              </a:p>
+            </p:txBody>
+          </p:sp>
+        </mc:Choice>
+        <mc:Fallback>
+          <p:sp>
+            <p:nvSpPr>
+              <p:cNvPr id="48" name="TextBox 47"/>
+              <p:cNvSpPr txBox="1">
+                <a:spLocks noRot="1" noChangeAspect="1" noMove="1" noResize="1" noEditPoints="1" noAdjustHandles="1" noChangeArrowheads="1" noChangeShapeType="1" noTextEdit="1"/>
+              </p:cNvSpPr>
+              <p:nvPr/>
+            </p:nvSpPr>
+            <p:spPr>
+              <a:xfrm>
+                <a:off x="6742569" y="2528788"/>
+                <a:ext cx="487377" cy="369332"/>
+              </a:xfrm>
+              <a:prstGeom prst="rect">
+                <a:avLst/>
+              </a:prstGeom>
+              <a:blipFill rotWithShape="1">
+                <a:blip r:embed="rId9"/>
+                <a:stretch>
+                  <a:fillRect b="-3333"/>
+                </a:stretch>
+              </a:blipFill>
+            </p:spPr>
+            <p:txBody>
+              <a:bodyPr/>
+              <a:lstStyle/>
+              <a:p>
+                <a:r>
+                  <a:rPr lang="ko-KR" altLang="en-US">
+                    <a:noFill/>
+                  </a:rPr>
+                  <a:t> </a:t>
+                </a:r>
+              </a:p>
+            </p:txBody>
+          </p:sp>
+        </mc:Fallback>
+      </mc:AlternateContent>
+      <p:sp>
+        <p:nvSpPr>
+          <p:cNvPr id="51" name="직사각형 50">
+            <a:extLst>
+              <a:ext uri="{FF2B5EF4-FFF2-40B4-BE49-F238E27FC236}">
+                <a16:creationId xmlns="" xmlns:a16="http://schemas.microsoft.com/office/drawing/2014/main" id="{BB74164F-B477-4FDE-B59B-41336F7C5864}"/>
+              </a:ext>
+            </a:extLst>
+          </p:cNvPr>
+          <p:cNvSpPr/>
+          <p:nvPr/>
+        </p:nvSpPr>
+        <p:spPr>
+          <a:xfrm>
+            <a:off x="1551519" y="2862370"/>
+            <a:ext cx="899577" cy="900825"/>
+          </a:xfrm>
+          <a:prstGeom prst="rect">
+            <a:avLst/>
+          </a:prstGeom>
+          <a:solidFill>
+            <a:schemeClr val="accent3">
+              <a:alpha val="40000"/>
+            </a:schemeClr>
+          </a:solidFill>
+          <a:ln>
+            <a:noFill/>
+          </a:ln>
+        </p:spPr>
+        <p:style>
+          <a:lnRef idx="2">
+            <a:schemeClr val="accent1">
+              <a:shade val="50000"/>
+            </a:schemeClr>
+          </a:lnRef>
+          <a:fillRef idx="1">
+            <a:schemeClr val="accent1"/>
+          </a:fillRef>
+          <a:effectRef idx="0">
+            <a:schemeClr val="accent1"/>
+          </a:effectRef>
+          <a:fontRef idx="minor">
+            <a:schemeClr val="lt1"/>
+          </a:fontRef>
+        </p:style>
+        <p:txBody>
+          <a:bodyPr rtlCol="0" anchor="ctr"/>
+          <a:lstStyle/>
+          <a:p>
+            <a:pPr algn="ctr"/>
+            <a:endParaRPr lang="ko-KR" altLang="en-US" b="1"/>
+          </a:p>
+        </p:txBody>
+      </p:sp>
+      <p:sp>
+        <p:nvSpPr>
+          <p:cNvPr id="33" name="정육면체 32">
+            <a:extLst>
+              <a:ext uri="{FF2B5EF4-FFF2-40B4-BE49-F238E27FC236}">
+                <a16:creationId xmlns="" xmlns:a16="http://schemas.microsoft.com/office/drawing/2014/main" id="{BB4BA1F1-6D30-4D42-9798-EDFC8B29CBD9}"/>
+              </a:ext>
+            </a:extLst>
+          </p:cNvPr>
+          <p:cNvSpPr/>
+          <p:nvPr/>
+        </p:nvSpPr>
+        <p:spPr>
+          <a:xfrm>
+            <a:off x="1391850" y="2707104"/>
+            <a:ext cx="1216152" cy="1216152"/>
+          </a:xfrm>
+          <a:prstGeom prst="cube">
+            <a:avLst/>
+          </a:prstGeom>
+          <a:noFill/>
+        </p:spPr>
+        <p:style>
+          <a:lnRef idx="2">
+            <a:schemeClr val="accent1">
+              <a:shade val="50000"/>
+            </a:schemeClr>
+          </a:lnRef>
+          <a:fillRef idx="1">
+            <a:schemeClr val="accent1"/>
+          </a:fillRef>
+          <a:effectRef idx="0">
+            <a:schemeClr val="accent1"/>
+          </a:effectRef>
+          <a:fontRef idx="minor">
+            <a:schemeClr val="lt1"/>
+          </a:fontRef>
+        </p:style>
+        <p:txBody>
+          <a:bodyPr rtlCol="0" anchor="ctr"/>
+          <a:lstStyle/>
+          <a:p>
+            <a:pPr algn="ctr"/>
+            <a:endParaRPr lang="ko-KR" altLang="en-US" b="1"/>
+          </a:p>
+        </p:txBody>
+      </p:sp>
+      <p:cxnSp>
+        <p:nvCxnSpPr>
+          <p:cNvPr id="4" name="직선 연결선 3"/>
+          <p:cNvCxnSpPr>
+            <a:stCxn id="51" idx="0"/>
+            <a:endCxn id="51" idx="2"/>
+          </p:cNvCxnSpPr>
+          <p:nvPr/>
+        </p:nvCxnSpPr>
+        <p:spPr>
+          <a:xfrm>
+            <a:off x="2001308" y="2862370"/>
+            <a:ext cx="0" cy="900825"/>
+          </a:xfrm>
+          <a:prstGeom prst="line">
+            <a:avLst/>
+          </a:prstGeom>
+          <a:ln>
+            <a:solidFill>
+              <a:schemeClr val="accent3"/>
+            </a:solidFill>
+            <a:prstDash val="dash"/>
+          </a:ln>
+        </p:spPr>
+        <p:style>
+          <a:lnRef idx="1">
+            <a:schemeClr val="accent1"/>
+          </a:lnRef>
+          <a:fillRef idx="0">
+            <a:schemeClr val="accent1"/>
+          </a:fillRef>
+          <a:effectRef idx="0">
+            <a:schemeClr val="accent1"/>
+          </a:effectRef>
+          <a:fontRef idx="minor">
+            <a:schemeClr val="tx1"/>
+          </a:fontRef>
+        </p:style>
+      </p:cxnSp>
+      <p:sp>
+        <p:nvSpPr>
+          <p:cNvPr id="22" name="자유형: 도형 21">
+            <a:extLst>
+              <a:ext uri="{FF2B5EF4-FFF2-40B4-BE49-F238E27FC236}">
+                <a16:creationId xmlns="" xmlns:a16="http://schemas.microsoft.com/office/drawing/2014/main" id="{C149BC22-E957-46EA-8F98-2C47CC8325B1}"/>
+              </a:ext>
+            </a:extLst>
+          </p:cNvPr>
+          <p:cNvSpPr/>
+          <p:nvPr/>
+        </p:nvSpPr>
+        <p:spPr>
+          <a:xfrm>
+            <a:off x="2299663" y="2708482"/>
+            <a:ext cx="308610" cy="1215390"/>
+          </a:xfrm>
+          <a:custGeom>
+            <a:avLst/>
+            <a:gdLst>
+              <a:gd name="connsiteX0" fmla="*/ 300990 w 308610"/>
+              <a:gd name="connsiteY0" fmla="*/ 0 h 1215390"/>
+              <a:gd name="connsiteX1" fmla="*/ 0 w 308610"/>
+              <a:gd name="connsiteY1" fmla="*/ 308610 h 1215390"/>
+              <a:gd name="connsiteX2" fmla="*/ 0 w 308610"/>
+              <a:gd name="connsiteY2" fmla="*/ 1215390 h 1215390"/>
+              <a:gd name="connsiteX3" fmla="*/ 308610 w 308610"/>
+              <a:gd name="connsiteY3" fmla="*/ 914400 h 1215390"/>
+              <a:gd name="connsiteX4" fmla="*/ 300990 w 308610"/>
+              <a:gd name="connsiteY4" fmla="*/ 0 h 1215390"/>
+            </a:gdLst>
+            <a:ahLst/>
+            <a:cxnLst>
+              <a:cxn ang="0">
+                <a:pos x="connsiteX0" y="connsiteY0"/>
+              </a:cxn>
+              <a:cxn ang="0">
+                <a:pos x="connsiteX1" y="connsiteY1"/>
+              </a:cxn>
+              <a:cxn ang="0">
+                <a:pos x="connsiteX2" y="connsiteY2"/>
+              </a:cxn>
+              <a:cxn ang="0">
+                <a:pos x="connsiteX3" y="connsiteY3"/>
+              </a:cxn>
+              <a:cxn ang="0">
+                <a:pos x="connsiteX4" y="connsiteY4"/>
+              </a:cxn>
+            </a:cxnLst>
+            <a:rect l="l" t="t" r="r" b="b"/>
+            <a:pathLst>
+              <a:path w="308610" h="1215390">
+                <a:moveTo>
+                  <a:pt x="300990" y="0"/>
+                </a:moveTo>
+                <a:lnTo>
+                  <a:pt x="0" y="308610"/>
+                </a:lnTo>
+                <a:lnTo>
+                  <a:pt x="0" y="1215390"/>
+                </a:lnTo>
+                <a:lnTo>
+                  <a:pt x="308610" y="914400"/>
+                </a:lnTo>
+                <a:lnTo>
+                  <a:pt x="300990" y="0"/>
+                </a:lnTo>
+                <a:close/>
+              </a:path>
+            </a:pathLst>
+          </a:custGeom>
+          <a:solidFill>
+            <a:schemeClr val="accent2">
+              <a:alpha val="40000"/>
+            </a:schemeClr>
+          </a:solidFill>
+          <a:ln>
+            <a:noFill/>
+          </a:ln>
+        </p:spPr>
+        <p:style>
+          <a:lnRef idx="2">
+            <a:schemeClr val="accent1">
+              <a:shade val="50000"/>
+            </a:schemeClr>
+          </a:lnRef>
+          <a:fillRef idx="1">
+            <a:schemeClr val="accent1"/>
+          </a:fillRef>
+          <a:effectRef idx="0">
+            <a:schemeClr val="accent1"/>
+          </a:effectRef>
+          <a:fontRef idx="minor">
+            <a:schemeClr val="lt1"/>
+          </a:fontRef>
+        </p:style>
+        <p:txBody>
+          <a:bodyPr rtlCol="0" anchor="ctr"/>
+          <a:lstStyle/>
+          <a:p>
+            <a:pPr algn="ctr"/>
+            <a:endParaRPr lang="ko-KR" altLang="en-US" b="1"/>
+          </a:p>
+        </p:txBody>
+      </p:sp>
+      <p:cxnSp>
+        <p:nvCxnSpPr>
+          <p:cNvPr id="52" name="직선 연결선 51">
+            <a:extLst>
+              <a:ext uri="{FF2B5EF4-FFF2-40B4-BE49-F238E27FC236}">
+                <a16:creationId xmlns="" xmlns:a16="http://schemas.microsoft.com/office/drawing/2014/main" id="{B076CBE9-2464-4DDF-BB08-D17B16179956}"/>
+              </a:ext>
+            </a:extLst>
+          </p:cNvPr>
+          <p:cNvCxnSpPr/>
+          <p:nvPr/>
+        </p:nvCxnSpPr>
+        <p:spPr>
+          <a:xfrm rot="16200000">
+            <a:off x="6486791" y="2245919"/>
+            <a:ext cx="0" cy="1911508"/>
+          </a:xfrm>
+          <a:prstGeom prst="line">
+            <a:avLst/>
+          </a:prstGeom>
+          <a:ln w="76200">
+            <a:solidFill>
+              <a:schemeClr val="accent3"/>
+            </a:solidFill>
+          </a:ln>
+        </p:spPr>
+        <p:style>
+          <a:lnRef idx="1">
+            <a:schemeClr val="accent1"/>
+          </a:lnRef>
+          <a:fillRef idx="0">
+            <a:schemeClr val="accent1"/>
+          </a:fillRef>
+          <a:effectRef idx="0">
+            <a:schemeClr val="accent1"/>
+          </a:effectRef>
+          <a:fontRef idx="minor">
+            <a:schemeClr val="tx1"/>
+          </a:fontRef>
+        </p:style>
+      </p:cxnSp>
+      <p:cxnSp>
+        <p:nvCxnSpPr>
+          <p:cNvPr id="15" name="직선 연결선 14">
+            <a:extLst>
+              <a:ext uri="{FF2B5EF4-FFF2-40B4-BE49-F238E27FC236}">
+                <a16:creationId xmlns="" xmlns:a16="http://schemas.microsoft.com/office/drawing/2014/main" id="{E49FE921-22E1-459E-801B-623A4E640F5C}"/>
+              </a:ext>
+            </a:extLst>
+          </p:cNvPr>
+          <p:cNvCxnSpPr/>
+          <p:nvPr/>
+        </p:nvCxnSpPr>
+        <p:spPr>
+          <a:xfrm>
+            <a:off x="5569383" y="2245918"/>
+            <a:ext cx="0" cy="1911508"/>
+          </a:xfrm>
+          <a:prstGeom prst="line">
+            <a:avLst/>
+          </a:prstGeom>
+          <a:ln w="76200">
+            <a:solidFill>
+              <a:srgbClr val="C00000"/>
+            </a:solidFill>
+          </a:ln>
+        </p:spPr>
+        <p:style>
+          <a:lnRef idx="1">
+            <a:schemeClr val="accent1"/>
+          </a:lnRef>
+          <a:fillRef idx="0">
+            <a:schemeClr val="accent1"/>
+          </a:fillRef>
+          <a:effectRef idx="0">
+            <a:schemeClr val="accent1"/>
+          </a:effectRef>
+          <a:fontRef idx="minor">
+            <a:schemeClr val="tx1"/>
+          </a:fontRef>
+        </p:style>
+      </p:cxnSp>
+      <p:cxnSp>
+        <p:nvCxnSpPr>
+          <p:cNvPr id="46" name="직선 연결선 45">
+            <a:extLst>
+              <a:ext uri="{FF2B5EF4-FFF2-40B4-BE49-F238E27FC236}">
+                <a16:creationId xmlns="" xmlns:a16="http://schemas.microsoft.com/office/drawing/2014/main" id="{6958972E-5AB2-4564-BD86-289280003A80}"/>
+              </a:ext>
+            </a:extLst>
+          </p:cNvPr>
+          <p:cNvCxnSpPr/>
+          <p:nvPr/>
+        </p:nvCxnSpPr>
+        <p:spPr>
+          <a:xfrm>
+            <a:off x="7440236" y="2245918"/>
+            <a:ext cx="0" cy="1911508"/>
+          </a:xfrm>
+          <a:prstGeom prst="line">
+            <a:avLst/>
+          </a:prstGeom>
+          <a:ln w="76200">
+            <a:solidFill>
+              <a:srgbClr val="C00000"/>
+            </a:solidFill>
+          </a:ln>
+        </p:spPr>
+        <p:style>
+          <a:lnRef idx="1">
+            <a:schemeClr val="accent1"/>
+          </a:lnRef>
+          <a:fillRef idx="0">
+            <a:schemeClr val="accent1"/>
+          </a:fillRef>
+          <a:effectRef idx="0">
+            <a:schemeClr val="accent1"/>
+          </a:effectRef>
+          <a:fontRef idx="minor">
+            <a:schemeClr val="tx1"/>
+          </a:fontRef>
+        </p:style>
+      </p:cxnSp>
+      <mc:AlternateContent xmlns:mc="http://schemas.openxmlformats.org/markup-compatibility/2006">
+        <mc:Choice xmlns:a14="http://schemas.microsoft.com/office/drawing/2010/main" Requires="a14">
+          <p:sp>
+            <p:nvSpPr>
+              <p:cNvPr id="53" name="TextBox 52"/>
+              <p:cNvSpPr txBox="1"/>
+              <p:nvPr/>
+            </p:nvSpPr>
+            <p:spPr>
+              <a:xfrm>
+                <a:off x="5793797" y="3501008"/>
+                <a:ext cx="487377" cy="369332"/>
+              </a:xfrm>
+              <a:prstGeom prst="rect">
+                <a:avLst/>
+              </a:prstGeom>
+              <a:noFill/>
+            </p:spPr>
+            <p:txBody>
+              <a:bodyPr wrap="none" rtlCol="0">
+                <a:spAutoFit/>
+              </a:bodyPr>
+              <a:lstStyle/>
+              <a:p>
+                <a:pPr/>
+                <a14:m>
+                  <m:oMathPara xmlns:m="http://schemas.openxmlformats.org/officeDocument/2006/math">
+                    <m:oMathParaPr>
+                      <m:jc m:val="centerGroup"/>
+                    </m:oMathParaPr>
+                    <m:oMath xmlns:m="http://schemas.openxmlformats.org/officeDocument/2006/math">
+                      <m:sSub>
+                        <m:sSubPr>
+                          <m:ctrlPr>
+                            <a:rPr lang="en-US" altLang="ko-KR" b="0" i="1" smtClean="0">
+                              <a:solidFill>
+                                <a:schemeClr val="accent5"/>
+                              </a:solidFill>
+                              <a:latin typeface="Cambria Math"/>
+                            </a:rPr>
+                          </m:ctrlPr>
+                        </m:sSubPr>
+                        <m:e>
+                          <m:r>
+                            <a:rPr lang="en-US" altLang="ko-KR" b="0" i="1" smtClean="0">
+                              <a:solidFill>
+                                <a:schemeClr val="accent5"/>
+                              </a:solidFill>
+                              <a:latin typeface="Cambria Math"/>
+                            </a:rPr>
+                            <m:t>𝑉</m:t>
+                          </m:r>
+                        </m:e>
+                        <m:sub>
+                          <m:r>
+                            <a:rPr lang="en-US" altLang="ko-KR" b="0" i="1" smtClean="0">
+                              <a:solidFill>
+                                <a:schemeClr val="accent5"/>
+                              </a:solidFill>
+                              <a:latin typeface="Cambria Math"/>
+                            </a:rPr>
+                            <m:t>3</m:t>
+                          </m:r>
+                        </m:sub>
+                      </m:sSub>
+                    </m:oMath>
+                  </m:oMathPara>
+                </a14:m>
+                <a:endParaRPr lang="ko-KR" altLang="en-US" dirty="0">
+                  <a:solidFill>
+                    <a:schemeClr val="accent5"/>
+                  </a:solidFill>
+                </a:endParaRPr>
+              </a:p>
+            </p:txBody>
+          </p:sp>
+        </mc:Choice>
+        <mc:Fallback>
+          <p:sp>
+            <p:nvSpPr>
+              <p:cNvPr id="53" name="TextBox 52"/>
+              <p:cNvSpPr txBox="1">
+                <a:spLocks noRot="1" noChangeAspect="1" noMove="1" noResize="1" noEditPoints="1" noAdjustHandles="1" noChangeArrowheads="1" noChangeShapeType="1" noTextEdit="1"/>
+              </p:cNvSpPr>
+              <p:nvPr/>
+            </p:nvSpPr>
+            <p:spPr>
+              <a:xfrm>
+                <a:off x="5793797" y="3501008"/>
+                <a:ext cx="487377" cy="369332"/>
+              </a:xfrm>
+              <a:prstGeom prst="rect">
+                <a:avLst/>
+              </a:prstGeom>
+              <a:blipFill rotWithShape="1">
+                <a:blip r:embed="rId10"/>
+                <a:stretch>
+                  <a:fillRect b="-1639"/>
+                </a:stretch>
+              </a:blipFill>
+            </p:spPr>
+            <p:txBody>
+              <a:bodyPr/>
+              <a:lstStyle/>
+              <a:p>
+                <a:r>
+                  <a:rPr lang="ko-KR" altLang="en-US">
+                    <a:noFill/>
+                  </a:rPr>
+                  <a:t> </a:t>
+                </a:r>
+              </a:p>
+            </p:txBody>
+          </p:sp>
+        </mc:Fallback>
+      </mc:AlternateContent>
+      <mc:AlternateContent xmlns:mc="http://schemas.openxmlformats.org/markup-compatibility/2006">
+        <mc:Choice xmlns:a14="http://schemas.microsoft.com/office/drawing/2010/main" Requires="a14">
+          <p:sp>
+            <p:nvSpPr>
+              <p:cNvPr id="54" name="TextBox 53"/>
+              <p:cNvSpPr txBox="1"/>
+              <p:nvPr/>
+            </p:nvSpPr>
+            <p:spPr>
+              <a:xfrm>
+                <a:off x="6742569" y="3501008"/>
+                <a:ext cx="487377" cy="369332"/>
+              </a:xfrm>
+              <a:prstGeom prst="rect">
+                <a:avLst/>
+              </a:prstGeom>
+              <a:noFill/>
+            </p:spPr>
+            <p:txBody>
+              <a:bodyPr wrap="none" rtlCol="0">
+                <a:spAutoFit/>
+              </a:bodyPr>
+              <a:lstStyle/>
+              <a:p>
+                <a:pPr/>
+                <a14:m>
+                  <m:oMathPara xmlns:m="http://schemas.openxmlformats.org/officeDocument/2006/math">
+                    <m:oMathParaPr>
+                      <m:jc m:val="centerGroup"/>
+                    </m:oMathParaPr>
+                    <m:oMath xmlns:m="http://schemas.openxmlformats.org/officeDocument/2006/math">
+                      <m:sSub>
+                        <m:sSubPr>
+                          <m:ctrlPr>
+                            <a:rPr lang="en-US" altLang="ko-KR" b="0" i="1" smtClean="0">
+                              <a:solidFill>
+                                <a:schemeClr val="accent6"/>
+                              </a:solidFill>
+                              <a:latin typeface="Cambria Math"/>
+                            </a:rPr>
+                          </m:ctrlPr>
+                        </m:sSubPr>
+                        <m:e>
+                          <m:r>
+                            <a:rPr lang="en-US" altLang="ko-KR" b="0" i="1" smtClean="0">
+                              <a:solidFill>
+                                <a:schemeClr val="accent6"/>
+                              </a:solidFill>
+                              <a:latin typeface="Cambria Math"/>
+                            </a:rPr>
+                            <m:t>𝑉</m:t>
+                          </m:r>
+                        </m:e>
+                        <m:sub>
+                          <m:r>
+                            <a:rPr lang="en-US" altLang="ko-KR" b="0" i="1" smtClean="0">
+                              <a:solidFill>
+                                <a:schemeClr val="accent6"/>
+                              </a:solidFill>
+                              <a:latin typeface="Cambria Math"/>
+                            </a:rPr>
+                            <m:t>4</m:t>
+                          </m:r>
+                        </m:sub>
+                      </m:sSub>
+                    </m:oMath>
+                  </m:oMathPara>
+                </a14:m>
+                <a:endParaRPr lang="ko-KR" altLang="en-US" dirty="0">
+                  <a:solidFill>
+                    <a:schemeClr val="accent6"/>
+                  </a:solidFill>
+                </a:endParaRPr>
+              </a:p>
+            </p:txBody>
+          </p:sp>
+        </mc:Choice>
+        <mc:Fallback>
+          <p:sp>
+            <p:nvSpPr>
+              <p:cNvPr id="54" name="TextBox 53"/>
+              <p:cNvSpPr txBox="1">
+                <a:spLocks noRot="1" noChangeAspect="1" noMove="1" noResize="1" noEditPoints="1" noAdjustHandles="1" noChangeArrowheads="1" noChangeShapeType="1" noTextEdit="1"/>
+              </p:cNvSpPr>
+              <p:nvPr/>
+            </p:nvSpPr>
+            <p:spPr>
+              <a:xfrm>
+                <a:off x="6742569" y="3501008"/>
+                <a:ext cx="487377" cy="369332"/>
+              </a:xfrm>
+              <a:prstGeom prst="rect">
+                <a:avLst/>
+              </a:prstGeom>
+              <a:blipFill rotWithShape="1">
+                <a:blip r:embed="rId11"/>
+                <a:stretch>
+                  <a:fillRect b="-1639"/>
+                </a:stretch>
+              </a:blipFill>
+            </p:spPr>
+            <p:txBody>
+              <a:bodyPr/>
+              <a:lstStyle/>
+              <a:p>
+                <a:r>
+                  <a:rPr lang="ko-KR" altLang="en-US">
+                    <a:noFill/>
+                  </a:rPr>
+                  <a:t> </a:t>
+                </a:r>
+              </a:p>
+            </p:txBody>
+          </p:sp>
+        </mc:Fallback>
+      </mc:AlternateContent>
+      <p:cxnSp>
+        <p:nvCxnSpPr>
+          <p:cNvPr id="55" name="직선 화살표 연결선 54"/>
+          <p:cNvCxnSpPr/>
+          <p:nvPr/>
+        </p:nvCxnSpPr>
+        <p:spPr>
+          <a:xfrm>
+            <a:off x="6037485" y="1993906"/>
+            <a:ext cx="0" cy="262800"/>
+          </a:xfrm>
+          <a:prstGeom prst="straightConnector1">
+            <a:avLst/>
+          </a:prstGeom>
+          <a:ln w="38100">
+            <a:solidFill>
+              <a:srgbClr val="FF0000"/>
+            </a:solidFill>
+            <a:headEnd type="arrow" w="med" len="med"/>
+            <a:tailEnd type="none" w="med" len="med"/>
+          </a:ln>
+        </p:spPr>
+        <p:style>
+          <a:lnRef idx="1">
+            <a:schemeClr val="accent1"/>
+          </a:lnRef>
+          <a:fillRef idx="0">
+            <a:schemeClr val="accent1"/>
+          </a:fillRef>
+          <a:effectRef idx="0">
+            <a:schemeClr val="accent1"/>
+          </a:effectRef>
+          <a:fontRef idx="minor">
+            <a:schemeClr val="tx1"/>
+          </a:fontRef>
+        </p:style>
+      </p:cxnSp>
+      <p:cxnSp>
+        <p:nvCxnSpPr>
+          <p:cNvPr id="56" name="직선 화살표 연결선 55"/>
+          <p:cNvCxnSpPr/>
+          <p:nvPr/>
+        </p:nvCxnSpPr>
+        <p:spPr>
+          <a:xfrm rot="16200000">
+            <a:off x="5402018" y="2582054"/>
+            <a:ext cx="0" cy="262800"/>
+          </a:xfrm>
+          <a:prstGeom prst="straightConnector1">
+            <a:avLst/>
+          </a:prstGeom>
+          <a:ln w="38100">
+            <a:solidFill>
+              <a:srgbClr val="FF0000"/>
+            </a:solidFill>
+            <a:headEnd type="arrow" w="med" len="med"/>
+            <a:tailEnd type="none" w="med" len="med"/>
+          </a:ln>
+        </p:spPr>
+        <p:style>
+          <a:lnRef idx="1">
+            <a:schemeClr val="accent1"/>
+          </a:lnRef>
+          <a:fillRef idx="0">
+            <a:schemeClr val="accent1"/>
+          </a:fillRef>
+          <a:effectRef idx="0">
+            <a:schemeClr val="accent1"/>
+          </a:effectRef>
+          <a:fontRef idx="minor">
+            <a:schemeClr val="tx1"/>
+          </a:fontRef>
+        </p:style>
+      </p:cxnSp>
+      <p:cxnSp>
+        <p:nvCxnSpPr>
+          <p:cNvPr id="57" name="직선 화살표 연결선 56"/>
+          <p:cNvCxnSpPr/>
+          <p:nvPr/>
+        </p:nvCxnSpPr>
+        <p:spPr>
+          <a:xfrm rot="5400000" flipH="1">
+            <a:off x="6672004" y="2582054"/>
+            <a:ext cx="0" cy="262800"/>
+          </a:xfrm>
+          <a:prstGeom prst="straightConnector1">
+            <a:avLst/>
+          </a:prstGeom>
+          <a:ln w="38100">
+            <a:solidFill>
+              <a:srgbClr val="FF0000"/>
+            </a:solidFill>
+            <a:headEnd type="arrow" w="med" len="med"/>
+            <a:tailEnd type="none" w="med" len="med"/>
+          </a:ln>
+        </p:spPr>
+        <p:style>
+          <a:lnRef idx="1">
+            <a:schemeClr val="accent1"/>
+          </a:lnRef>
+          <a:fillRef idx="0">
+            <a:schemeClr val="accent1"/>
+          </a:fillRef>
+          <a:effectRef idx="0">
+            <a:schemeClr val="accent1"/>
+          </a:effectRef>
+          <a:fontRef idx="minor">
+            <a:schemeClr val="tx1"/>
+          </a:fontRef>
+        </p:style>
+      </p:cxnSp>
+      <p:cxnSp>
+        <p:nvCxnSpPr>
+          <p:cNvPr id="58" name="직선 화살표 연결선 57"/>
+          <p:cNvCxnSpPr/>
+          <p:nvPr/>
+        </p:nvCxnSpPr>
+        <p:spPr>
+          <a:xfrm flipV="1">
+            <a:off x="6037485" y="3241806"/>
+            <a:ext cx="0" cy="263964"/>
+          </a:xfrm>
+          <a:prstGeom prst="straightConnector1">
+            <a:avLst/>
+          </a:prstGeom>
+          <a:ln w="38100">
+            <a:solidFill>
+              <a:srgbClr val="FF0000"/>
+            </a:solidFill>
+            <a:headEnd type="arrow" w="med" len="med"/>
+            <a:tailEnd type="none" w="med" len="med"/>
+          </a:ln>
+        </p:spPr>
+        <p:style>
+          <a:lnRef idx="1">
+            <a:schemeClr val="accent1"/>
+          </a:lnRef>
+          <a:fillRef idx="0">
+            <a:schemeClr val="accent1"/>
+          </a:fillRef>
+          <a:effectRef idx="0">
+            <a:schemeClr val="accent1"/>
+          </a:effectRef>
+          <a:fontRef idx="minor">
+            <a:schemeClr val="tx1"/>
+          </a:fontRef>
+        </p:style>
+      </p:cxnSp>
+      <p:cxnSp>
+        <p:nvCxnSpPr>
+          <p:cNvPr id="59" name="직선 화살표 연결선 58"/>
+          <p:cNvCxnSpPr/>
+          <p:nvPr/>
+        </p:nvCxnSpPr>
+        <p:spPr>
+          <a:xfrm rot="16200000">
+            <a:off x="6330434" y="2582055"/>
+            <a:ext cx="0" cy="262800"/>
+          </a:xfrm>
+          <a:prstGeom prst="straightConnector1">
+            <a:avLst/>
+          </a:prstGeom>
+          <a:ln w="38100">
+            <a:solidFill>
+              <a:schemeClr val="accent1"/>
+            </a:solidFill>
+            <a:headEnd type="arrow" w="med" len="med"/>
+            <a:tailEnd type="none" w="med" len="med"/>
+          </a:ln>
+        </p:spPr>
+        <p:style>
+          <a:lnRef idx="1">
+            <a:schemeClr val="accent1"/>
+          </a:lnRef>
+          <a:fillRef idx="0">
+            <a:schemeClr val="accent1"/>
+          </a:fillRef>
+          <a:effectRef idx="0">
+            <a:schemeClr val="accent1"/>
+          </a:effectRef>
+          <a:fontRef idx="minor">
+            <a:schemeClr val="tx1"/>
+          </a:fontRef>
+        </p:style>
+      </p:cxnSp>
+      <p:cxnSp>
+        <p:nvCxnSpPr>
+          <p:cNvPr id="60" name="직선 화살표 연결선 59"/>
+          <p:cNvCxnSpPr/>
+          <p:nvPr/>
+        </p:nvCxnSpPr>
+        <p:spPr>
+          <a:xfrm>
+            <a:off x="6986257" y="1993602"/>
+            <a:ext cx="0" cy="262800"/>
+          </a:xfrm>
+          <a:prstGeom prst="straightConnector1">
+            <a:avLst/>
+          </a:prstGeom>
+          <a:ln w="38100">
+            <a:solidFill>
+              <a:schemeClr val="accent1"/>
+            </a:solidFill>
+            <a:headEnd type="arrow" w="med" len="med"/>
+            <a:tailEnd type="none" w="med" len="med"/>
+          </a:ln>
+        </p:spPr>
+        <p:style>
+          <a:lnRef idx="1">
+            <a:schemeClr val="accent1"/>
+          </a:lnRef>
+          <a:fillRef idx="0">
+            <a:schemeClr val="accent1"/>
+          </a:fillRef>
+          <a:effectRef idx="0">
+            <a:schemeClr val="accent1"/>
+          </a:effectRef>
+          <a:fontRef idx="minor">
+            <a:schemeClr val="tx1"/>
+          </a:fontRef>
+        </p:style>
+      </p:cxnSp>
+      <p:cxnSp>
+        <p:nvCxnSpPr>
+          <p:cNvPr id="61" name="직선 화살표 연결선 60"/>
+          <p:cNvCxnSpPr/>
+          <p:nvPr/>
+        </p:nvCxnSpPr>
+        <p:spPr>
+          <a:xfrm rot="5400000" flipH="1">
+            <a:off x="7608952" y="2582054"/>
+            <a:ext cx="0" cy="262800"/>
+          </a:xfrm>
+          <a:prstGeom prst="straightConnector1">
+            <a:avLst/>
+          </a:prstGeom>
+          <a:ln w="38100">
+            <a:solidFill>
+              <a:schemeClr val="accent1"/>
+            </a:solidFill>
+            <a:headEnd type="arrow" w="med" len="med"/>
+            <a:tailEnd type="none" w="med" len="med"/>
+          </a:ln>
+        </p:spPr>
+        <p:style>
+          <a:lnRef idx="1">
+            <a:schemeClr val="accent1"/>
+          </a:lnRef>
+          <a:fillRef idx="0">
+            <a:schemeClr val="accent1"/>
+          </a:fillRef>
+          <a:effectRef idx="0">
+            <a:schemeClr val="accent1"/>
+          </a:effectRef>
+          <a:fontRef idx="minor">
+            <a:schemeClr val="tx1"/>
+          </a:fontRef>
+        </p:style>
+      </p:cxnSp>
+      <p:cxnSp>
+        <p:nvCxnSpPr>
+          <p:cNvPr id="62" name="직선 화살표 연결선 61"/>
+          <p:cNvCxnSpPr/>
+          <p:nvPr/>
+        </p:nvCxnSpPr>
+        <p:spPr>
+          <a:xfrm flipV="1">
+            <a:off x="6986257" y="3239425"/>
+            <a:ext cx="0" cy="263964"/>
+          </a:xfrm>
+          <a:prstGeom prst="straightConnector1">
+            <a:avLst/>
+          </a:prstGeom>
+          <a:ln w="38100">
+            <a:solidFill>
+              <a:schemeClr val="accent1"/>
+            </a:solidFill>
+            <a:headEnd type="arrow" w="med" len="med"/>
+            <a:tailEnd type="none" w="med" len="med"/>
+          </a:ln>
+        </p:spPr>
+        <p:style>
+          <a:lnRef idx="1">
+            <a:schemeClr val="accent1"/>
+          </a:lnRef>
+          <a:fillRef idx="0">
+            <a:schemeClr val="accent1"/>
+          </a:fillRef>
+          <a:effectRef idx="0">
+            <a:schemeClr val="accent1"/>
+          </a:effectRef>
+          <a:fontRef idx="minor">
+            <a:schemeClr val="tx1"/>
+          </a:fontRef>
+        </p:style>
+      </p:cxnSp>
+      <p:cxnSp>
+        <p:nvCxnSpPr>
+          <p:cNvPr id="63" name="직선 화살표 연결선 62"/>
+          <p:cNvCxnSpPr/>
+          <p:nvPr/>
+        </p:nvCxnSpPr>
+        <p:spPr>
+          <a:xfrm>
+            <a:off x="6037485" y="2901757"/>
+            <a:ext cx="0" cy="262800"/>
+          </a:xfrm>
+          <a:prstGeom prst="straightConnector1">
+            <a:avLst/>
+          </a:prstGeom>
+          <a:ln w="38100">
+            <a:solidFill>
+              <a:schemeClr val="accent5"/>
+            </a:solidFill>
+            <a:headEnd type="arrow" w="med" len="med"/>
+            <a:tailEnd type="none" w="med" len="med"/>
+          </a:ln>
+        </p:spPr>
+        <p:style>
+          <a:lnRef idx="1">
+            <a:schemeClr val="accent1"/>
+          </a:lnRef>
+          <a:fillRef idx="0">
+            <a:schemeClr val="accent1"/>
+          </a:fillRef>
+          <a:effectRef idx="0">
+            <a:schemeClr val="accent1"/>
+          </a:effectRef>
+          <a:fontRef idx="minor">
+            <a:schemeClr val="tx1"/>
+          </a:fontRef>
+        </p:style>
+      </p:cxnSp>
+      <p:cxnSp>
+        <p:nvCxnSpPr>
+          <p:cNvPr id="64" name="직선 화살표 연결선 63"/>
+          <p:cNvCxnSpPr/>
+          <p:nvPr/>
+        </p:nvCxnSpPr>
+        <p:spPr>
+          <a:xfrm rot="16200000">
+            <a:off x="5402018" y="3554275"/>
+            <a:ext cx="0" cy="262800"/>
+          </a:xfrm>
+          <a:prstGeom prst="straightConnector1">
+            <a:avLst/>
+          </a:prstGeom>
+          <a:ln w="38100">
+            <a:solidFill>
+              <a:schemeClr val="accent5"/>
+            </a:solidFill>
+            <a:headEnd type="arrow" w="med" len="med"/>
+            <a:tailEnd type="none" w="med" len="med"/>
+          </a:ln>
+        </p:spPr>
+        <p:style>
+          <a:lnRef idx="1">
+            <a:schemeClr val="accent1"/>
+          </a:lnRef>
+          <a:fillRef idx="0">
+            <a:schemeClr val="accent1"/>
+          </a:fillRef>
+          <a:effectRef idx="0">
+            <a:schemeClr val="accent1"/>
+          </a:effectRef>
+          <a:fontRef idx="minor">
+            <a:schemeClr val="tx1"/>
+          </a:fontRef>
+        </p:style>
+      </p:cxnSp>
+      <p:cxnSp>
+        <p:nvCxnSpPr>
+          <p:cNvPr id="65" name="직선 화살표 연결선 64"/>
+          <p:cNvCxnSpPr/>
+          <p:nvPr/>
+        </p:nvCxnSpPr>
+        <p:spPr>
+          <a:xfrm rot="5400000" flipH="1">
+            <a:off x="6670075" y="3554274"/>
+            <a:ext cx="0" cy="262800"/>
+          </a:xfrm>
+          <a:prstGeom prst="straightConnector1">
+            <a:avLst/>
+          </a:prstGeom>
+          <a:ln w="38100">
+            <a:solidFill>
+              <a:schemeClr val="accent5"/>
+            </a:solidFill>
+            <a:headEnd type="arrow" w="med" len="med"/>
+            <a:tailEnd type="none" w="med" len="med"/>
+          </a:ln>
+        </p:spPr>
+        <p:style>
+          <a:lnRef idx="1">
+            <a:schemeClr val="accent1"/>
+          </a:lnRef>
+          <a:fillRef idx="0">
+            <a:schemeClr val="accent1"/>
+          </a:fillRef>
+          <a:effectRef idx="0">
+            <a:schemeClr val="accent1"/>
+          </a:effectRef>
+          <a:fontRef idx="minor">
+            <a:schemeClr val="tx1"/>
+          </a:fontRef>
+        </p:style>
+      </p:cxnSp>
+      <p:cxnSp>
+        <p:nvCxnSpPr>
+          <p:cNvPr id="66" name="직선 화살표 연결선 65"/>
+          <p:cNvCxnSpPr/>
+          <p:nvPr/>
+        </p:nvCxnSpPr>
+        <p:spPr>
+          <a:xfrm flipV="1">
+            <a:off x="6037485" y="4159807"/>
+            <a:ext cx="0" cy="262800"/>
+          </a:xfrm>
+          <a:prstGeom prst="straightConnector1">
+            <a:avLst/>
+          </a:prstGeom>
+          <a:ln w="38100">
+            <a:solidFill>
+              <a:schemeClr val="accent5"/>
+            </a:solidFill>
+            <a:headEnd type="arrow" w="med" len="med"/>
+            <a:tailEnd type="none" w="med" len="med"/>
+          </a:ln>
+        </p:spPr>
+        <p:style>
+          <a:lnRef idx="1">
+            <a:schemeClr val="accent1"/>
+          </a:lnRef>
+          <a:fillRef idx="0">
+            <a:schemeClr val="accent1"/>
+          </a:fillRef>
+          <a:effectRef idx="0">
+            <a:schemeClr val="accent1"/>
+          </a:effectRef>
+          <a:fontRef idx="minor">
+            <a:schemeClr val="tx1"/>
+          </a:fontRef>
+        </p:style>
+      </p:cxnSp>
+      <p:cxnSp>
+        <p:nvCxnSpPr>
+          <p:cNvPr id="67" name="직선 화살표 연결선 66"/>
+          <p:cNvCxnSpPr/>
+          <p:nvPr/>
+        </p:nvCxnSpPr>
+        <p:spPr>
+          <a:xfrm rot="16200000">
+            <a:off x="6330434" y="3554275"/>
+            <a:ext cx="0" cy="262800"/>
+          </a:xfrm>
+          <a:prstGeom prst="straightConnector1">
+            <a:avLst/>
+          </a:prstGeom>
+          <a:ln w="38100">
+            <a:solidFill>
+              <a:schemeClr val="accent6"/>
+            </a:solidFill>
+            <a:headEnd type="arrow" w="med" len="med"/>
+            <a:tailEnd type="none" w="med" len="med"/>
+          </a:ln>
+        </p:spPr>
+        <p:style>
+          <a:lnRef idx="1">
+            <a:schemeClr val="accent1"/>
+          </a:lnRef>
+          <a:fillRef idx="0">
+            <a:schemeClr val="accent1"/>
+          </a:fillRef>
+          <a:effectRef idx="0">
+            <a:schemeClr val="accent1"/>
+          </a:effectRef>
+          <a:fontRef idx="minor">
+            <a:schemeClr val="tx1"/>
+          </a:fontRef>
+        </p:style>
+      </p:cxnSp>
+      <p:cxnSp>
+        <p:nvCxnSpPr>
+          <p:cNvPr id="68" name="직선 화살표 연결선 67"/>
+          <p:cNvCxnSpPr/>
+          <p:nvPr/>
+        </p:nvCxnSpPr>
+        <p:spPr>
+          <a:xfrm>
+            <a:off x="6986257" y="2901757"/>
+            <a:ext cx="0" cy="262800"/>
+          </a:xfrm>
+          <a:prstGeom prst="straightConnector1">
+            <a:avLst/>
+          </a:prstGeom>
+          <a:ln w="38100">
+            <a:solidFill>
+              <a:schemeClr val="accent6"/>
+            </a:solidFill>
+            <a:headEnd type="arrow" w="med" len="med"/>
+            <a:tailEnd type="none" w="med" len="med"/>
+          </a:ln>
+        </p:spPr>
+        <p:style>
+          <a:lnRef idx="1">
+            <a:schemeClr val="accent1"/>
+          </a:lnRef>
+          <a:fillRef idx="0">
+            <a:schemeClr val="accent1"/>
+          </a:fillRef>
+          <a:effectRef idx="0">
+            <a:schemeClr val="accent1"/>
+          </a:effectRef>
+          <a:fontRef idx="minor">
+            <a:schemeClr val="tx1"/>
+          </a:fontRef>
+        </p:style>
+      </p:cxnSp>
+      <p:cxnSp>
+        <p:nvCxnSpPr>
+          <p:cNvPr id="69" name="직선 화살표 연결선 68"/>
+          <p:cNvCxnSpPr/>
+          <p:nvPr/>
+        </p:nvCxnSpPr>
+        <p:spPr>
+          <a:xfrm rot="5400000" flipH="1">
+            <a:off x="7608952" y="3554274"/>
+            <a:ext cx="0" cy="262800"/>
+          </a:xfrm>
+          <a:prstGeom prst="straightConnector1">
+            <a:avLst/>
+          </a:prstGeom>
+          <a:ln w="38100">
+            <a:solidFill>
+              <a:schemeClr val="accent6"/>
+            </a:solidFill>
+            <a:headEnd type="arrow" w="med" len="med"/>
+            <a:tailEnd type="none" w="med" len="med"/>
+          </a:ln>
+        </p:spPr>
+        <p:style>
+          <a:lnRef idx="1">
+            <a:schemeClr val="accent1"/>
+          </a:lnRef>
+          <a:fillRef idx="0">
+            <a:schemeClr val="accent1"/>
+          </a:fillRef>
+          <a:effectRef idx="0">
+            <a:schemeClr val="accent1"/>
+          </a:effectRef>
+          <a:fontRef idx="minor">
+            <a:schemeClr val="tx1"/>
+          </a:fontRef>
+        </p:style>
+      </p:cxnSp>
+      <p:cxnSp>
+        <p:nvCxnSpPr>
+          <p:cNvPr id="70" name="직선 화살표 연결선 69"/>
+          <p:cNvCxnSpPr/>
+          <p:nvPr/>
+        </p:nvCxnSpPr>
+        <p:spPr>
+          <a:xfrm flipV="1">
+            <a:off x="6986257" y="4147580"/>
+            <a:ext cx="0" cy="263964"/>
+          </a:xfrm>
+          <a:prstGeom prst="straightConnector1">
+            <a:avLst/>
+          </a:prstGeom>
+          <a:ln w="38100">
+            <a:solidFill>
+              <a:schemeClr val="accent6"/>
+            </a:solidFill>
+            <a:headEnd type="arrow" w="med" len="med"/>
+            <a:tailEnd type="none" w="med" len="med"/>
+          </a:ln>
+        </p:spPr>
+        <p:style>
+          <a:lnRef idx="1">
+            <a:schemeClr val="accent1"/>
+          </a:lnRef>
+          <a:fillRef idx="0">
+            <a:schemeClr val="accent1"/>
+          </a:fillRef>
+          <a:effectRef idx="0">
+            <a:schemeClr val="accent1"/>
+          </a:effectRef>
+          <a:fontRef idx="minor">
+            <a:schemeClr val="tx1"/>
+          </a:fontRef>
+        </p:style>
+      </p:cxnSp>
+    </p:spTree>
+    <p:extLst>
+      <p:ext uri="{BB962C8B-B14F-4D97-AF65-F5344CB8AC3E}">
+        <p14:creationId xmlns:p14="http://schemas.microsoft.com/office/powerpoint/2010/main" val="858382695"/>
+      </p:ext>
+    </p:extLst>
+  </p:cSld>
+  <p:clrMapOvr>
+    <a:masterClrMapping/>
+  </p:clrMapOvr>
+</p:sld>
+</file>
+
+<file path=ppt/slides/slide4.xml><?xml version="1.0" encoding="utf-8"?>
 <p:sld xmlns:a="http://schemas.openxmlformats.org/drawingml/2006/main" xmlns:r="http://schemas.openxmlformats.org/officeDocument/2006/relationships" xmlns:p="http://schemas.openxmlformats.org/presentationml/2006/main">
   <p:cSld>
     <p:spTree>

</xml_diff>